<commit_message>
Added univariate analysis to the ppt
</commit_message>
<xml_diff>
--- a/Lending Case Study.pptx
+++ b/Lending Case Study.pptx
@@ -5,10 +5,10 @@
     <p:sldMasterId id="2147483658" r:id="rId4"/>
   </p:sldMasterIdLst>
   <p:notesMasterIdLst>
-    <p:notesMasterId r:id="rId18"/>
+    <p:notesMasterId r:id="rId20"/>
   </p:notesMasterIdLst>
   <p:handoutMasterIdLst>
-    <p:handoutMasterId r:id="rId19"/>
+    <p:handoutMasterId r:id="rId21"/>
   </p:handoutMasterIdLst>
   <p:sldIdLst>
     <p:sldId id="256" r:id="rId5"/>
@@ -17,13 +17,15 @@
     <p:sldId id="262" r:id="rId8"/>
     <p:sldId id="260" r:id="rId9"/>
     <p:sldId id="261" r:id="rId10"/>
-    <p:sldId id="297" r:id="rId11"/>
-    <p:sldId id="299" r:id="rId12"/>
-    <p:sldId id="300" r:id="rId13"/>
-    <p:sldId id="265" r:id="rId14"/>
-    <p:sldId id="266" r:id="rId15"/>
-    <p:sldId id="267" r:id="rId16"/>
-    <p:sldId id="268" r:id="rId17"/>
+    <p:sldId id="302" r:id="rId11"/>
+    <p:sldId id="301" r:id="rId12"/>
+    <p:sldId id="297" r:id="rId13"/>
+    <p:sldId id="299" r:id="rId14"/>
+    <p:sldId id="300" r:id="rId15"/>
+    <p:sldId id="265" r:id="rId16"/>
+    <p:sldId id="266" r:id="rId17"/>
+    <p:sldId id="267" r:id="rId18"/>
+    <p:sldId id="268" r:id="rId19"/>
   </p:sldIdLst>
   <p:sldSz cx="12192000" cy="6858000"/>
   <p:notesSz cx="6858000" cy="9144000"/>
@@ -136,7 +138,7 @@
 <file path=ppt/revisionInfo.xml><?xml version="1.0" encoding="utf-8"?>
 <p1510:revInfo xmlns:a="http://schemas.openxmlformats.org/drawingml/2006/main" xmlns:r="http://schemas.openxmlformats.org/officeDocument/2006/relationships" xmlns:p1510="http://schemas.microsoft.com/office/powerpoint/2015/10/main">
   <p1510:revLst>
-    <p1510:client id="{DCCB598E-A953-484C-85B5-DBEA1A2F401A}" v="4" dt="2023-07-02T12:54:38.042"/>
+    <p1510:client id="{DCCB598E-A953-484C-85B5-DBEA1A2F401A}" v="26" dt="2023-07-03T17:01:58.838"/>
   </p1510:revLst>
 </p1510:revInfo>
 </file>
@@ -145,8 +147,8 @@
 <pc:chgInfo xmlns:a="http://schemas.openxmlformats.org/drawingml/2006/main" xmlns:r="http://schemas.openxmlformats.org/officeDocument/2006/relationships" xmlns:ac="http://schemas.microsoft.com/office/drawing/2013/main/command" xmlns:pc="http://schemas.microsoft.com/office/powerpoint/2013/main/command">
   <pc:docChgLst>
     <pc:chgData name="Nikhil Mothkuri" userId="d815931bd65b505f" providerId="LiveId" clId="{DCCB598E-A953-484C-85B5-DBEA1A2F401A}"/>
-    <pc:docChg chg="custSel modSld sldOrd">
-      <pc:chgData name="Nikhil Mothkuri" userId="d815931bd65b505f" providerId="LiveId" clId="{DCCB598E-A953-484C-85B5-DBEA1A2F401A}" dt="2023-07-02T13:14:54.149" v="552" actId="20577"/>
+    <pc:docChg chg="undo custSel addSld delSld modSld sldOrd">
+      <pc:chgData name="Nikhil Mothkuri" userId="d815931bd65b505f" providerId="LiveId" clId="{DCCB598E-A953-484C-85B5-DBEA1A2F401A}" dt="2023-07-03T17:06:40.094" v="2411" actId="20577"/>
       <pc:docMkLst>
         <pc:docMk/>
       </pc:docMkLst>
@@ -196,15 +198,103 @@
           </ac:graphicFrameMkLst>
         </pc:graphicFrameChg>
       </pc:sldChg>
-      <pc:sldChg chg="ord">
-        <pc:chgData name="Nikhil Mothkuri" userId="d815931bd65b505f" providerId="LiveId" clId="{DCCB598E-A953-484C-85B5-DBEA1A2F401A}" dt="2023-07-02T13:13:36.161" v="529" actId="20578"/>
+      <pc:sldChg chg="addSp delSp modSp mod ord">
+        <pc:chgData name="Nikhil Mothkuri" userId="d815931bd65b505f" providerId="LiveId" clId="{DCCB598E-A953-484C-85B5-DBEA1A2F401A}" dt="2023-07-03T17:06:40.094" v="2411" actId="20577"/>
         <pc:sldMkLst>
           <pc:docMk/>
           <pc:sldMk cId="1527386939" sldId="261"/>
         </pc:sldMkLst>
+        <pc:spChg chg="mod">
+          <ac:chgData name="Nikhil Mothkuri" userId="d815931bd65b505f" providerId="LiveId" clId="{DCCB598E-A953-484C-85B5-DBEA1A2F401A}" dt="2023-07-02T16:05:11.636" v="927" actId="14100"/>
+          <ac:spMkLst>
+            <pc:docMk/>
+            <pc:sldMk cId="1527386939" sldId="261"/>
+            <ac:spMk id="2" creationId="{D543047E-FBFD-4F79-BCA5-10E69740F030}"/>
+          </ac:spMkLst>
+        </pc:spChg>
+        <pc:spChg chg="add del mod">
+          <ac:chgData name="Nikhil Mothkuri" userId="d815931bd65b505f" providerId="LiveId" clId="{DCCB598E-A953-484C-85B5-DBEA1A2F401A}" dt="2023-07-02T15:33:45.183" v="554"/>
+          <ac:spMkLst>
+            <pc:docMk/>
+            <pc:sldMk cId="1527386939" sldId="261"/>
+            <ac:spMk id="4" creationId="{59948B23-6CDF-6A24-0DDA-4204F65EFE06}"/>
+          </ac:spMkLst>
+        </pc:spChg>
+        <pc:spChg chg="add mod">
+          <ac:chgData name="Nikhil Mothkuri" userId="d815931bd65b505f" providerId="LiveId" clId="{DCCB598E-A953-484C-85B5-DBEA1A2F401A}" dt="2023-07-03T17:06:40.094" v="2411" actId="20577"/>
+          <ac:spMkLst>
+            <pc:docMk/>
+            <pc:sldMk cId="1527386939" sldId="261"/>
+            <ac:spMk id="16" creationId="{98AC38E5-C3A2-8C35-7F7B-DB88A6023153}"/>
+          </ac:spMkLst>
+        </pc:spChg>
+        <pc:graphicFrameChg chg="del">
+          <ac:chgData name="Nikhil Mothkuri" userId="d815931bd65b505f" providerId="LiveId" clId="{DCCB598E-A953-484C-85B5-DBEA1A2F401A}" dt="2023-07-02T15:33:42.473" v="553" actId="478"/>
+          <ac:graphicFrameMkLst>
+            <pc:docMk/>
+            <pc:sldMk cId="1527386939" sldId="261"/>
+            <ac:graphicFrameMk id="6" creationId="{DB23E567-BDB1-4E6F-9EA8-3E4297461AEE}"/>
+          </ac:graphicFrameMkLst>
+        </pc:graphicFrameChg>
+        <pc:picChg chg="add mod">
+          <ac:chgData name="Nikhil Mothkuri" userId="d815931bd65b505f" providerId="LiveId" clId="{DCCB598E-A953-484C-85B5-DBEA1A2F401A}" dt="2023-07-02T15:33:53.584" v="556" actId="14100"/>
+          <ac:picMkLst>
+            <pc:docMk/>
+            <pc:sldMk cId="1527386939" sldId="261"/>
+            <ac:picMk id="5" creationId="{088F397B-312D-0E3E-9B98-3ADDE30FDED7}"/>
+          </ac:picMkLst>
+        </pc:picChg>
+        <pc:picChg chg="add del mod">
+          <ac:chgData name="Nikhil Mothkuri" userId="d815931bd65b505f" providerId="LiveId" clId="{DCCB598E-A953-484C-85B5-DBEA1A2F401A}" dt="2023-07-02T15:40:41.861" v="561" actId="478"/>
+          <ac:picMkLst>
+            <pc:docMk/>
+            <pc:sldMk cId="1527386939" sldId="261"/>
+            <ac:picMk id="7" creationId="{9091F3FD-874D-FC29-E55C-DA476B963E19}"/>
+          </ac:picMkLst>
+        </pc:picChg>
+        <pc:picChg chg="add mod">
+          <ac:chgData name="Nikhil Mothkuri" userId="d815931bd65b505f" providerId="LiveId" clId="{DCCB598E-A953-484C-85B5-DBEA1A2F401A}" dt="2023-07-02T15:40:56.645" v="566" actId="14100"/>
+          <ac:picMkLst>
+            <pc:docMk/>
+            <pc:sldMk cId="1527386939" sldId="261"/>
+            <ac:picMk id="11" creationId="{67A925CC-312F-F4CC-267B-CEED65B97C08}"/>
+          </ac:picMkLst>
+        </pc:picChg>
+        <pc:picChg chg="add mod">
+          <ac:chgData name="Nikhil Mothkuri" userId="d815931bd65b505f" providerId="LiveId" clId="{DCCB598E-A953-484C-85B5-DBEA1A2F401A}" dt="2023-07-02T15:42:10.554" v="572" actId="14100"/>
+          <ac:picMkLst>
+            <pc:docMk/>
+            <pc:sldMk cId="1527386939" sldId="261"/>
+            <ac:picMk id="12" creationId="{DBEC50F9-4CF2-2471-945F-E16B1DD8EB55}"/>
+          </ac:picMkLst>
+        </pc:picChg>
+        <pc:picChg chg="add mod">
+          <ac:chgData name="Nikhil Mothkuri" userId="d815931bd65b505f" providerId="LiveId" clId="{DCCB598E-A953-484C-85B5-DBEA1A2F401A}" dt="2023-07-02T15:43:09.191" v="576" actId="14100"/>
+          <ac:picMkLst>
+            <pc:docMk/>
+            <pc:sldMk cId="1527386939" sldId="261"/>
+            <ac:picMk id="13" creationId="{45A1BB20-EB7E-ABEF-5CA9-EACBDBDD7774}"/>
+          </ac:picMkLst>
+        </pc:picChg>
+        <pc:picChg chg="add mod">
+          <ac:chgData name="Nikhil Mothkuri" userId="d815931bd65b505f" providerId="LiveId" clId="{DCCB598E-A953-484C-85B5-DBEA1A2F401A}" dt="2023-07-02T15:45:38.062" v="580" actId="14100"/>
+          <ac:picMkLst>
+            <pc:docMk/>
+            <pc:sldMk cId="1527386939" sldId="261"/>
+            <ac:picMk id="14" creationId="{FC768EEE-3476-64D1-6828-EB0FDFCB7A6E}"/>
+          </ac:picMkLst>
+        </pc:picChg>
+        <pc:picChg chg="add mod">
+          <ac:chgData name="Nikhil Mothkuri" userId="d815931bd65b505f" providerId="LiveId" clId="{DCCB598E-A953-484C-85B5-DBEA1A2F401A}" dt="2023-07-02T15:46:44.504" v="584" actId="14100"/>
+          <ac:picMkLst>
+            <pc:docMk/>
+            <pc:sldMk cId="1527386939" sldId="261"/>
+            <ac:picMk id="15" creationId="{E919E861-28FC-F876-8B03-0DA9C7A89622}"/>
+          </ac:picMkLst>
+        </pc:picChg>
       </pc:sldChg>
       <pc:sldChg chg="addSp delSp modSp mod">
-        <pc:chgData name="Nikhil Mothkuri" userId="d815931bd65b505f" providerId="LiveId" clId="{DCCB598E-A953-484C-85B5-DBEA1A2F401A}" dt="2023-07-02T12:54:41.407" v="11" actId="27614"/>
+        <pc:chgData name="Nikhil Mothkuri" userId="d815931bd65b505f" providerId="LiveId" clId="{DCCB598E-A953-484C-85B5-DBEA1A2F401A}" dt="2023-07-02T16:19:14.565" v="1212" actId="14100"/>
         <pc:sldMkLst>
           <pc:docMk/>
           <pc:sldMk cId="811730917" sldId="262"/>
@@ -223,6 +313,14 @@
             <pc:docMk/>
             <pc:sldMk cId="811730917" sldId="262"/>
             <ac:spMk id="10" creationId="{0B36A8AA-E514-B3E2-F6B0-C0EDF4C4450D}"/>
+          </ac:spMkLst>
+        </pc:spChg>
+        <pc:spChg chg="add mod">
+          <ac:chgData name="Nikhil Mothkuri" userId="d815931bd65b505f" providerId="LiveId" clId="{DCCB598E-A953-484C-85B5-DBEA1A2F401A}" dt="2023-07-02T16:19:01.079" v="1208" actId="478"/>
+          <ac:spMkLst>
+            <pc:docMk/>
+            <pc:sldMk cId="811730917" sldId="262"/>
+            <ac:spMk id="17" creationId="{09EB7408-EC53-2DB0-E1F3-9F1D829D9C9A}"/>
           </ac:spMkLst>
         </pc:spChg>
         <pc:picChg chg="add mod">
@@ -257,1180 +355,239 @@
             <ac:picMk id="14" creationId="{5C0075ED-C567-4784-9E43-B86220CE1230}"/>
           </ac:picMkLst>
         </pc:picChg>
-        <pc:picChg chg="add mod">
-          <ac:chgData name="Nikhil Mothkuri" userId="d815931bd65b505f" providerId="LiveId" clId="{DCCB598E-A953-484C-85B5-DBEA1A2F401A}" dt="2023-07-02T12:54:41.407" v="11" actId="27614"/>
+        <pc:picChg chg="add del mod">
+          <ac:chgData name="Nikhil Mothkuri" userId="d815931bd65b505f" providerId="LiveId" clId="{DCCB598E-A953-484C-85B5-DBEA1A2F401A}" dt="2023-07-02T16:19:01.079" v="1208" actId="478"/>
           <ac:picMkLst>
             <pc:docMk/>
             <pc:sldMk cId="811730917" sldId="262"/>
             <ac:picMk id="15" creationId="{CCAB684B-1C81-511D-B068-1A7DD18B7C1C}"/>
           </ac:picMkLst>
         </pc:picChg>
+        <pc:picChg chg="add mod">
+          <ac:chgData name="Nikhil Mothkuri" userId="d815931bd65b505f" providerId="LiveId" clId="{DCCB598E-A953-484C-85B5-DBEA1A2F401A}" dt="2023-07-02T16:19:14.565" v="1212" actId="14100"/>
+          <ac:picMkLst>
+            <pc:docMk/>
+            <pc:sldMk cId="811730917" sldId="262"/>
+            <ac:picMk id="18" creationId="{C2168734-BD2A-6A5A-AC1E-6CDEACAF2B59}"/>
+          </ac:picMkLst>
+        </pc:picChg>
+      </pc:sldChg>
+      <pc:sldChg chg="addSp delSp modSp add mod">
+        <pc:chgData name="Nikhil Mothkuri" userId="d815931bd65b505f" providerId="LiveId" clId="{DCCB598E-A953-484C-85B5-DBEA1A2F401A}" dt="2023-07-02T16:20:25.161" v="1217" actId="14100"/>
+        <pc:sldMkLst>
+          <pc:docMk/>
+          <pc:sldMk cId="559115980" sldId="301"/>
+        </pc:sldMkLst>
+        <pc:spChg chg="mod">
+          <ac:chgData name="Nikhil Mothkuri" userId="d815931bd65b505f" providerId="LiveId" clId="{DCCB598E-A953-484C-85B5-DBEA1A2F401A}" dt="2023-07-02T16:05:29.247" v="940" actId="20577"/>
+          <ac:spMkLst>
+            <pc:docMk/>
+            <pc:sldMk cId="559115980" sldId="301"/>
+            <ac:spMk id="2" creationId="{D543047E-FBFD-4F79-BCA5-10E69740F030}"/>
+          </ac:spMkLst>
+        </pc:spChg>
+        <pc:spChg chg="add del mod">
+          <ac:chgData name="Nikhil Mothkuri" userId="d815931bd65b505f" providerId="LiveId" clId="{DCCB598E-A953-484C-85B5-DBEA1A2F401A}" dt="2023-07-02T16:08:21.409" v="960" actId="478"/>
+          <ac:spMkLst>
+            <pc:docMk/>
+            <pc:sldMk cId="559115980" sldId="301"/>
+            <ac:spMk id="4" creationId="{982A48FB-2B9D-25AF-23AC-AAD1C6718E34}"/>
+          </ac:spMkLst>
+        </pc:spChg>
+        <pc:spChg chg="mod">
+          <ac:chgData name="Nikhil Mothkuri" userId="d815931bd65b505f" providerId="LiveId" clId="{DCCB598E-A953-484C-85B5-DBEA1A2F401A}" dt="2023-07-02T16:18:11.092" v="1207" actId="12"/>
+          <ac:spMkLst>
+            <pc:docMk/>
+            <pc:sldMk cId="559115980" sldId="301"/>
+            <ac:spMk id="16" creationId="{98AC38E5-C3A2-8C35-7F7B-DB88A6023153}"/>
+          </ac:spMkLst>
+        </pc:spChg>
+        <pc:picChg chg="del">
+          <ac:chgData name="Nikhil Mothkuri" userId="d815931bd65b505f" providerId="LiveId" clId="{DCCB598E-A953-484C-85B5-DBEA1A2F401A}" dt="2023-07-02T16:05:41.621" v="941" actId="478"/>
+          <ac:picMkLst>
+            <pc:docMk/>
+            <pc:sldMk cId="559115980" sldId="301"/>
+            <ac:picMk id="5" creationId="{088F397B-312D-0E3E-9B98-3ADDE30FDED7}"/>
+          </ac:picMkLst>
+        </pc:picChg>
+        <pc:picChg chg="add mod">
+          <ac:chgData name="Nikhil Mothkuri" userId="d815931bd65b505f" providerId="LiveId" clId="{DCCB598E-A953-484C-85B5-DBEA1A2F401A}" dt="2023-07-02T16:06:08.887" v="952" actId="14100"/>
+          <ac:picMkLst>
+            <pc:docMk/>
+            <pc:sldMk cId="559115980" sldId="301"/>
+            <ac:picMk id="6" creationId="{F5CBB311-6D7C-72FD-B993-1FC883EEEBCF}"/>
+          </ac:picMkLst>
+        </pc:picChg>
+        <pc:picChg chg="add mod">
+          <ac:chgData name="Nikhil Mothkuri" userId="d815931bd65b505f" providerId="LiveId" clId="{DCCB598E-A953-484C-85B5-DBEA1A2F401A}" dt="2023-07-02T16:06:32.241" v="958" actId="14100"/>
+          <ac:picMkLst>
+            <pc:docMk/>
+            <pc:sldMk cId="559115980" sldId="301"/>
+            <ac:picMk id="7" creationId="{3F86DF74-2757-FF0A-DD2E-5E614837D27E}"/>
+          </ac:picMkLst>
+        </pc:picChg>
+        <pc:picChg chg="del">
+          <ac:chgData name="Nikhil Mothkuri" userId="d815931bd65b505f" providerId="LiveId" clId="{DCCB598E-A953-484C-85B5-DBEA1A2F401A}" dt="2023-07-02T16:06:13.326" v="953" actId="478"/>
+          <ac:picMkLst>
+            <pc:docMk/>
+            <pc:sldMk cId="559115980" sldId="301"/>
+            <ac:picMk id="11" creationId="{67A925CC-312F-F4CC-267B-CEED65B97C08}"/>
+          </ac:picMkLst>
+        </pc:picChg>
+        <pc:picChg chg="del">
+          <ac:chgData name="Nikhil Mothkuri" userId="d815931bd65b505f" providerId="LiveId" clId="{DCCB598E-A953-484C-85B5-DBEA1A2F401A}" dt="2023-07-02T16:14:12.204" v="969" actId="478"/>
+          <ac:picMkLst>
+            <pc:docMk/>
+            <pc:sldMk cId="559115980" sldId="301"/>
+            <ac:picMk id="12" creationId="{DBEC50F9-4CF2-2471-945F-E16B1DD8EB55}"/>
+          </ac:picMkLst>
+        </pc:picChg>
+        <pc:picChg chg="del">
+          <ac:chgData name="Nikhil Mothkuri" userId="d815931bd65b505f" providerId="LiveId" clId="{DCCB598E-A953-484C-85B5-DBEA1A2F401A}" dt="2023-07-02T16:08:25.127" v="961" actId="478"/>
+          <ac:picMkLst>
+            <pc:docMk/>
+            <pc:sldMk cId="559115980" sldId="301"/>
+            <ac:picMk id="13" creationId="{45A1BB20-EB7E-ABEF-5CA9-EACBDBDD7774}"/>
+          </ac:picMkLst>
+        </pc:picChg>
+        <pc:picChg chg="del">
+          <ac:chgData name="Nikhil Mothkuri" userId="d815931bd65b505f" providerId="LiveId" clId="{DCCB598E-A953-484C-85B5-DBEA1A2F401A}" dt="2023-07-02T16:08:27.028" v="962" actId="478"/>
+          <ac:picMkLst>
+            <pc:docMk/>
+            <pc:sldMk cId="559115980" sldId="301"/>
+            <ac:picMk id="14" creationId="{FC768EEE-3476-64D1-6828-EB0FDFCB7A6E}"/>
+          </ac:picMkLst>
+        </pc:picChg>
+        <pc:picChg chg="del">
+          <ac:chgData name="Nikhil Mothkuri" userId="d815931bd65b505f" providerId="LiveId" clId="{DCCB598E-A953-484C-85B5-DBEA1A2F401A}" dt="2023-07-02T16:15:41.610" v="974" actId="478"/>
+          <ac:picMkLst>
+            <pc:docMk/>
+            <pc:sldMk cId="559115980" sldId="301"/>
+            <ac:picMk id="15" creationId="{E919E861-28FC-F876-8B03-0DA9C7A89622}"/>
+          </ac:picMkLst>
+        </pc:picChg>
+        <pc:picChg chg="add mod">
+          <ac:chgData name="Nikhil Mothkuri" userId="d815931bd65b505f" providerId="LiveId" clId="{DCCB598E-A953-484C-85B5-DBEA1A2F401A}" dt="2023-07-02T16:13:55.107" v="968" actId="14100"/>
+          <ac:picMkLst>
+            <pc:docMk/>
+            <pc:sldMk cId="559115980" sldId="301"/>
+            <ac:picMk id="18" creationId="{DC4C1730-C3E3-BCA1-7C1A-DE2B4CA64F6C}"/>
+          </ac:picMkLst>
+        </pc:picChg>
+        <pc:picChg chg="add mod">
+          <ac:chgData name="Nikhil Mothkuri" userId="d815931bd65b505f" providerId="LiveId" clId="{DCCB598E-A953-484C-85B5-DBEA1A2F401A}" dt="2023-07-02T16:14:26.541" v="973" actId="14100"/>
+          <ac:picMkLst>
+            <pc:docMk/>
+            <pc:sldMk cId="559115980" sldId="301"/>
+            <ac:picMk id="19" creationId="{C25A72D5-FF84-6D2A-7D89-8A78E7A29106}"/>
+          </ac:picMkLst>
+        </pc:picChg>
+        <pc:picChg chg="add del mod">
+          <ac:chgData name="Nikhil Mothkuri" userId="d815931bd65b505f" providerId="LiveId" clId="{DCCB598E-A953-484C-85B5-DBEA1A2F401A}" dt="2023-07-02T16:20:11.919" v="1213" actId="478"/>
+          <ac:picMkLst>
+            <pc:docMk/>
+            <pc:sldMk cId="559115980" sldId="301"/>
+            <ac:picMk id="20" creationId="{DC34AB5E-9BEB-611F-EF6D-A6FFED9ADD65}"/>
+          </ac:picMkLst>
+        </pc:picChg>
+        <pc:picChg chg="add mod">
+          <ac:chgData name="Nikhil Mothkuri" userId="d815931bd65b505f" providerId="LiveId" clId="{DCCB598E-A953-484C-85B5-DBEA1A2F401A}" dt="2023-07-02T16:20:25.161" v="1217" actId="14100"/>
+          <ac:picMkLst>
+            <pc:docMk/>
+            <pc:sldMk cId="559115980" sldId="301"/>
+            <ac:picMk id="21" creationId="{99A0764E-00DF-6F0B-208F-3574B93775D3}"/>
+          </ac:picMkLst>
+        </pc:picChg>
+      </pc:sldChg>
+      <pc:sldChg chg="addSp delSp modSp add mod">
+        <pc:chgData name="Nikhil Mothkuri" userId="d815931bd65b505f" providerId="LiveId" clId="{DCCB598E-A953-484C-85B5-DBEA1A2F401A}" dt="2023-07-03T17:03:29.729" v="2347" actId="14100"/>
+        <pc:sldMkLst>
+          <pc:docMk/>
+          <pc:sldMk cId="43180716" sldId="302"/>
+        </pc:sldMkLst>
+        <pc:spChg chg="add del mod">
+          <ac:chgData name="Nikhil Mothkuri" userId="d815931bd65b505f" providerId="LiveId" clId="{DCCB598E-A953-484C-85B5-DBEA1A2F401A}" dt="2023-07-03T15:58:19.704" v="1221" actId="478"/>
+          <ac:spMkLst>
+            <pc:docMk/>
+            <pc:sldMk cId="43180716" sldId="302"/>
+            <ac:spMk id="4" creationId="{E2828BC5-304C-044F-A5C9-3D9B79C92CA6}"/>
+          </ac:spMkLst>
+        </pc:spChg>
+        <pc:spChg chg="mod">
+          <ac:chgData name="Nikhil Mothkuri" userId="d815931bd65b505f" providerId="LiveId" clId="{DCCB598E-A953-484C-85B5-DBEA1A2F401A}" dt="2023-07-03T17:03:29.729" v="2347" actId="14100"/>
+          <ac:spMkLst>
+            <pc:docMk/>
+            <pc:sldMk cId="43180716" sldId="302"/>
+            <ac:spMk id="16" creationId="{98AC38E5-C3A2-8C35-7F7B-DB88A6023153}"/>
+          </ac:spMkLst>
+        </pc:spChg>
+        <pc:picChg chg="del">
+          <ac:chgData name="Nikhil Mothkuri" userId="d815931bd65b505f" providerId="LiveId" clId="{DCCB598E-A953-484C-85B5-DBEA1A2F401A}" dt="2023-07-03T15:58:14.033" v="1220" actId="478"/>
+          <ac:picMkLst>
+            <pc:docMk/>
+            <pc:sldMk cId="43180716" sldId="302"/>
+            <ac:picMk id="5" creationId="{088F397B-312D-0E3E-9B98-3ADDE30FDED7}"/>
+          </ac:picMkLst>
+        </pc:picChg>
+        <pc:picChg chg="add mod">
+          <ac:chgData name="Nikhil Mothkuri" userId="d815931bd65b505f" providerId="LiveId" clId="{DCCB598E-A953-484C-85B5-DBEA1A2F401A}" dt="2023-07-03T17:02:30.856" v="2345" actId="14100"/>
+          <ac:picMkLst>
+            <pc:docMk/>
+            <pc:sldMk cId="43180716" sldId="302"/>
+            <ac:picMk id="7" creationId="{13B34DDA-2A91-47C6-74FC-0944FC17D1A4}"/>
+          </ac:picMkLst>
+        </pc:picChg>
+        <pc:picChg chg="del">
+          <ac:chgData name="Nikhil Mothkuri" userId="d815931bd65b505f" providerId="LiveId" clId="{DCCB598E-A953-484C-85B5-DBEA1A2F401A}" dt="2023-07-03T15:58:21.478" v="1222" actId="478"/>
+          <ac:picMkLst>
+            <pc:docMk/>
+            <pc:sldMk cId="43180716" sldId="302"/>
+            <ac:picMk id="11" creationId="{67A925CC-312F-F4CC-267B-CEED65B97C08}"/>
+          </ac:picMkLst>
+        </pc:picChg>
+        <pc:picChg chg="del">
+          <ac:chgData name="Nikhil Mothkuri" userId="d815931bd65b505f" providerId="LiveId" clId="{DCCB598E-A953-484C-85B5-DBEA1A2F401A}" dt="2023-07-03T15:58:23.079" v="1223" actId="478"/>
+          <ac:picMkLst>
+            <pc:docMk/>
+            <pc:sldMk cId="43180716" sldId="302"/>
+            <ac:picMk id="12" creationId="{DBEC50F9-4CF2-2471-945F-E16B1DD8EB55}"/>
+          </ac:picMkLst>
+        </pc:picChg>
+        <pc:picChg chg="del">
+          <ac:chgData name="Nikhil Mothkuri" userId="d815931bd65b505f" providerId="LiveId" clId="{DCCB598E-A953-484C-85B5-DBEA1A2F401A}" dt="2023-07-03T15:58:24.856" v="1224" actId="478"/>
+          <ac:picMkLst>
+            <pc:docMk/>
+            <pc:sldMk cId="43180716" sldId="302"/>
+            <ac:picMk id="13" creationId="{45A1BB20-EB7E-ABEF-5CA9-EACBDBDD7774}"/>
+          </ac:picMkLst>
+        </pc:picChg>
+        <pc:picChg chg="del">
+          <ac:chgData name="Nikhil Mothkuri" userId="d815931bd65b505f" providerId="LiveId" clId="{DCCB598E-A953-484C-85B5-DBEA1A2F401A}" dt="2023-07-03T15:58:26.977" v="1225" actId="478"/>
+          <ac:picMkLst>
+            <pc:docMk/>
+            <pc:sldMk cId="43180716" sldId="302"/>
+            <ac:picMk id="14" creationId="{FC768EEE-3476-64D1-6828-EB0FDFCB7A6E}"/>
+          </ac:picMkLst>
+        </pc:picChg>
+        <pc:picChg chg="del">
+          <ac:chgData name="Nikhil Mothkuri" userId="d815931bd65b505f" providerId="LiveId" clId="{DCCB598E-A953-484C-85B5-DBEA1A2F401A}" dt="2023-07-03T15:58:28.730" v="1226" actId="478"/>
+          <ac:picMkLst>
+            <pc:docMk/>
+            <pc:sldMk cId="43180716" sldId="302"/>
+            <ac:picMk id="15" creationId="{E919E861-28FC-F876-8B03-0DA9C7A89622}"/>
+          </ac:picMkLst>
+        </pc:picChg>
+      </pc:sldChg>
+      <pc:sldChg chg="add del">
+        <pc:chgData name="Nikhil Mothkuri" userId="d815931bd65b505f" providerId="LiveId" clId="{DCCB598E-A953-484C-85B5-DBEA1A2F401A}" dt="2023-07-03T17:00:23.617" v="2338" actId="2696"/>
+        <pc:sldMkLst>
+          <pc:docMk/>
+          <pc:sldMk cId="35738736" sldId="303"/>
+        </pc:sldMkLst>
       </pc:sldChg>
     </pc:docChg>
   </pc:docChgLst>
 </pc:chgInfo>
-</file>
-
-<file path=ppt/charts/chart1.xml><?xml version="1.0" encoding="utf-8"?>
-<c:chartSpace xmlns:c="http://schemas.openxmlformats.org/drawingml/2006/chart" xmlns:a="http://schemas.openxmlformats.org/drawingml/2006/main" xmlns:r="http://schemas.openxmlformats.org/officeDocument/2006/relationships" xmlns:c16r2="http://schemas.microsoft.com/office/drawing/2015/06/chart">
-  <c:date1904 val="0"/>
-  <c:lang val="en-GB"/>
-  <c:roundedCorners val="0"/>
-  <mc:AlternateContent xmlns:mc="http://schemas.openxmlformats.org/markup-compatibility/2006">
-    <mc:Choice xmlns:c14="http://schemas.microsoft.com/office/drawing/2007/8/2/chart" Requires="c14">
-      <c14:style val="102"/>
-    </mc:Choice>
-    <mc:Fallback>
-      <c:style val="2"/>
-    </mc:Fallback>
-  </mc:AlternateContent>
-  <c:chart>
-    <c:autoTitleDeleted val="1"/>
-    <c:plotArea>
-      <c:layout>
-        <c:manualLayout>
-          <c:layoutTarget val="inner"/>
-          <c:xMode val="edge"/>
-          <c:yMode val="edge"/>
-          <c:x val="1.3285024154589372E-2"/>
-          <c:y val="6.9312013913881195E-3"/>
-          <c:w val="0.97342995169082125"/>
-          <c:h val="0.81434584029096335"/>
-        </c:manualLayout>
-      </c:layout>
-      <c:barChart>
-        <c:barDir val="col"/>
-        <c:grouping val="clustered"/>
-        <c:varyColors val="0"/>
-        <c:ser>
-          <c:idx val="0"/>
-          <c:order val="0"/>
-          <c:tx>
-            <c:strRef>
-              <c:f>Sheet1!$B$1</c:f>
-              <c:strCache>
-                <c:ptCount val="1"/>
-                <c:pt idx="0">
-                  <c:v>Series 1</c:v>
-                </c:pt>
-              </c:strCache>
-            </c:strRef>
-          </c:tx>
-          <c:spPr>
-            <a:solidFill>
-              <a:schemeClr val="accent3">
-                <a:lumMod val="75000"/>
-              </a:schemeClr>
-            </a:solidFill>
-            <a:ln>
-              <a:noFill/>
-            </a:ln>
-            <a:effectLst/>
-          </c:spPr>
-          <c:invertIfNegative val="0"/>
-          <c:dLbls>
-            <c:spPr>
-              <a:noFill/>
-              <a:ln>
-                <a:noFill/>
-              </a:ln>
-              <a:effectLst/>
-            </c:spPr>
-            <c:txPr>
-              <a:bodyPr rot="-5400000" spcFirstLastPara="1" vertOverflow="clip" horzOverflow="clip" vert="horz" wrap="square" lIns="38100" tIns="19050" rIns="38100" bIns="19050" anchor="ctr" anchorCtr="1">
-                <a:spAutoFit/>
-              </a:bodyPr>
-              <a:lstStyle/>
-              <a:p>
-                <a:pPr>
-                  <a:defRPr lang="en-GB" sz="1064" b="0" i="0" u="none" strike="noStrike" kern="1200" baseline="0" noProof="0">
-                    <a:solidFill>
-                      <a:schemeClr val="tx1">
-                        <a:lumMod val="50000"/>
-                        <a:lumOff val="50000"/>
-                      </a:schemeClr>
-                    </a:solidFill>
-                    <a:latin typeface="+mn-lt"/>
-                    <a:ea typeface="+mn-ea"/>
-                    <a:cs typeface="+mn-cs"/>
-                  </a:defRPr>
-                </a:pPr>
-                <a:endParaRPr lang="en-US"/>
-              </a:p>
-            </c:txPr>
-            <c:dLblPos val="outEnd"/>
-            <c:showLegendKey val="0"/>
-            <c:showVal val="1"/>
-            <c:showCatName val="0"/>
-            <c:showSerName val="0"/>
-            <c:showPercent val="0"/>
-            <c:showBubbleSize val="0"/>
-            <c:showLeaderLines val="0"/>
-            <c:extLst>
-              <c:ext xmlns:c15="http://schemas.microsoft.com/office/drawing/2012/chart" uri="{CE6537A1-D6FC-4f65-9D91-7224C49458BB}">
-                <c15:showLeaderLines val="1"/>
-                <c15:leaderLines>
-                  <c:spPr>
-                    <a:ln w="9525">
-                      <a:solidFill>
-                        <a:schemeClr val="tx1">
-                          <a:lumMod val="35000"/>
-                          <a:lumOff val="65000"/>
-                        </a:schemeClr>
-                      </a:solidFill>
-                    </a:ln>
-                    <a:effectLst/>
-                  </c:spPr>
-                </c15:leaderLines>
-              </c:ext>
-            </c:extLst>
-          </c:dLbls>
-          <c:cat>
-            <c:strRef>
-              <c:f>Sheet1!$A$2:$A$5</c:f>
-              <c:strCache>
-                <c:ptCount val="4"/>
-                <c:pt idx="0">
-                  <c:v>Category 1</c:v>
-                </c:pt>
-                <c:pt idx="1">
-                  <c:v>Category 2</c:v>
-                </c:pt>
-                <c:pt idx="2">
-                  <c:v>Category 3</c:v>
-                </c:pt>
-                <c:pt idx="3">
-                  <c:v>Category 4</c:v>
-                </c:pt>
-              </c:strCache>
-            </c:strRef>
-          </c:cat>
-          <c:val>
-            <c:numRef>
-              <c:f>Sheet1!$B$2:$B$5</c:f>
-              <c:numCache>
-                <c:formatCode>General</c:formatCode>
-                <c:ptCount val="4"/>
-                <c:pt idx="0">
-                  <c:v>4.3</c:v>
-                </c:pt>
-                <c:pt idx="1">
-                  <c:v>2.5</c:v>
-                </c:pt>
-                <c:pt idx="2">
-                  <c:v>3.5</c:v>
-                </c:pt>
-                <c:pt idx="3">
-                  <c:v>4.5</c:v>
-                </c:pt>
-              </c:numCache>
-            </c:numRef>
-          </c:val>
-          <c:extLst>
-            <c:ext xmlns:c16="http://schemas.microsoft.com/office/drawing/2014/chart" uri="{C3380CC4-5D6E-409C-BE32-E72D297353CC}">
-              <c16:uniqueId val="{00000000-5A55-423E-948E-3543A421E78B}"/>
-            </c:ext>
-          </c:extLst>
-        </c:ser>
-        <c:ser>
-          <c:idx val="1"/>
-          <c:order val="1"/>
-          <c:tx>
-            <c:strRef>
-              <c:f>Sheet1!$C$1</c:f>
-              <c:strCache>
-                <c:ptCount val="1"/>
-                <c:pt idx="0">
-                  <c:v>Series 2</c:v>
-                </c:pt>
-              </c:strCache>
-            </c:strRef>
-          </c:tx>
-          <c:spPr>
-            <a:solidFill>
-              <a:schemeClr val="accent2">
-                <a:lumMod val="75000"/>
-              </a:schemeClr>
-            </a:solidFill>
-            <a:ln>
-              <a:noFill/>
-            </a:ln>
-            <a:effectLst/>
-          </c:spPr>
-          <c:invertIfNegative val="0"/>
-          <c:dLbls>
-            <c:spPr>
-              <a:noFill/>
-              <a:ln>
-                <a:noFill/>
-              </a:ln>
-              <a:effectLst/>
-            </c:spPr>
-            <c:txPr>
-              <a:bodyPr rot="-5400000" spcFirstLastPara="1" vertOverflow="clip" horzOverflow="clip" vert="horz" wrap="square" lIns="38100" tIns="19050" rIns="38100" bIns="19050" anchor="ctr" anchorCtr="1">
-                <a:spAutoFit/>
-              </a:bodyPr>
-              <a:lstStyle/>
-              <a:p>
-                <a:pPr>
-                  <a:defRPr lang="en-GB" sz="1064" b="0" i="0" u="none" strike="noStrike" kern="1200" baseline="0" noProof="0">
-                    <a:solidFill>
-                      <a:schemeClr val="tx1">
-                        <a:lumMod val="50000"/>
-                        <a:lumOff val="50000"/>
-                      </a:schemeClr>
-                    </a:solidFill>
-                    <a:latin typeface="+mn-lt"/>
-                    <a:ea typeface="+mn-ea"/>
-                    <a:cs typeface="+mn-cs"/>
-                  </a:defRPr>
-                </a:pPr>
-                <a:endParaRPr lang="en-US"/>
-              </a:p>
-            </c:txPr>
-            <c:dLblPos val="outEnd"/>
-            <c:showLegendKey val="0"/>
-            <c:showVal val="1"/>
-            <c:showCatName val="0"/>
-            <c:showSerName val="0"/>
-            <c:showPercent val="0"/>
-            <c:showBubbleSize val="0"/>
-            <c:showLeaderLines val="0"/>
-            <c:extLst>
-              <c:ext xmlns:c15="http://schemas.microsoft.com/office/drawing/2012/chart" uri="{CE6537A1-D6FC-4f65-9D91-7224C49458BB}">
-                <c15:showLeaderLines val="1"/>
-                <c15:leaderLines>
-                  <c:spPr>
-                    <a:ln w="9525">
-                      <a:solidFill>
-                        <a:schemeClr val="tx1">
-                          <a:lumMod val="35000"/>
-                          <a:lumOff val="65000"/>
-                        </a:schemeClr>
-                      </a:solidFill>
-                    </a:ln>
-                    <a:effectLst/>
-                  </c:spPr>
-                </c15:leaderLines>
-              </c:ext>
-            </c:extLst>
-          </c:dLbls>
-          <c:cat>
-            <c:strRef>
-              <c:f>Sheet1!$A$2:$A$5</c:f>
-              <c:strCache>
-                <c:ptCount val="4"/>
-                <c:pt idx="0">
-                  <c:v>Category 1</c:v>
-                </c:pt>
-                <c:pt idx="1">
-                  <c:v>Category 2</c:v>
-                </c:pt>
-                <c:pt idx="2">
-                  <c:v>Category 3</c:v>
-                </c:pt>
-                <c:pt idx="3">
-                  <c:v>Category 4</c:v>
-                </c:pt>
-              </c:strCache>
-            </c:strRef>
-          </c:cat>
-          <c:val>
-            <c:numRef>
-              <c:f>Sheet1!$C$2:$C$5</c:f>
-              <c:numCache>
-                <c:formatCode>General</c:formatCode>
-                <c:ptCount val="4"/>
-                <c:pt idx="0">
-                  <c:v>2.4</c:v>
-                </c:pt>
-                <c:pt idx="1">
-                  <c:v>4.4000000000000004</c:v>
-                </c:pt>
-                <c:pt idx="2">
-                  <c:v>1.8</c:v>
-                </c:pt>
-                <c:pt idx="3">
-                  <c:v>2.8</c:v>
-                </c:pt>
-              </c:numCache>
-            </c:numRef>
-          </c:val>
-          <c:extLst>
-            <c:ext xmlns:c16="http://schemas.microsoft.com/office/drawing/2014/chart" uri="{C3380CC4-5D6E-409C-BE32-E72D297353CC}">
-              <c16:uniqueId val="{00000001-5A55-423E-948E-3543A421E78B}"/>
-            </c:ext>
-          </c:extLst>
-        </c:ser>
-        <c:ser>
-          <c:idx val="2"/>
-          <c:order val="2"/>
-          <c:tx>
-            <c:strRef>
-              <c:f>Sheet1!$D$1</c:f>
-              <c:strCache>
-                <c:ptCount val="1"/>
-                <c:pt idx="0">
-                  <c:v>Series 3</c:v>
-                </c:pt>
-              </c:strCache>
-            </c:strRef>
-          </c:tx>
-          <c:spPr>
-            <a:solidFill>
-              <a:schemeClr val="accent1">
-                <a:lumMod val="60000"/>
-                <a:lumOff val="40000"/>
-              </a:schemeClr>
-            </a:solidFill>
-            <a:ln>
-              <a:noFill/>
-            </a:ln>
-            <a:effectLst/>
-          </c:spPr>
-          <c:invertIfNegative val="0"/>
-          <c:dLbls>
-            <c:numFmt formatCode="#,##0.0" sourceLinked="0"/>
-            <c:spPr>
-              <a:noFill/>
-              <a:ln>
-                <a:noFill/>
-              </a:ln>
-              <a:effectLst/>
-            </c:spPr>
-            <c:txPr>
-              <a:bodyPr rot="-5400000" spcFirstLastPara="1" vertOverflow="clip" horzOverflow="clip" vert="horz" wrap="square" lIns="38100" tIns="19050" rIns="38100" bIns="19050" anchor="ctr" anchorCtr="1">
-                <a:spAutoFit/>
-              </a:bodyPr>
-              <a:lstStyle/>
-              <a:p>
-                <a:pPr>
-                  <a:defRPr lang="en-GB" sz="1064" b="0" i="0" u="none" strike="noStrike" kern="1200" baseline="0" noProof="0">
-                    <a:solidFill>
-                      <a:schemeClr val="tx1">
-                        <a:lumMod val="50000"/>
-                        <a:lumOff val="50000"/>
-                      </a:schemeClr>
-                    </a:solidFill>
-                    <a:latin typeface="+mn-lt"/>
-                    <a:ea typeface="+mn-ea"/>
-                    <a:cs typeface="+mn-cs"/>
-                  </a:defRPr>
-                </a:pPr>
-                <a:endParaRPr lang="en-US"/>
-              </a:p>
-            </c:txPr>
-            <c:dLblPos val="outEnd"/>
-            <c:showLegendKey val="0"/>
-            <c:showVal val="1"/>
-            <c:showCatName val="0"/>
-            <c:showSerName val="0"/>
-            <c:showPercent val="0"/>
-            <c:showBubbleSize val="0"/>
-            <c:showLeaderLines val="0"/>
-            <c:extLst>
-              <c:ext xmlns:c15="http://schemas.microsoft.com/office/drawing/2012/chart" uri="{CE6537A1-D6FC-4f65-9D91-7224C49458BB}">
-                <c15:showLeaderLines val="1"/>
-                <c15:leaderLines>
-                  <c:spPr>
-                    <a:ln w="9525">
-                      <a:solidFill>
-                        <a:schemeClr val="tx1">
-                          <a:lumMod val="35000"/>
-                          <a:lumOff val="65000"/>
-                        </a:schemeClr>
-                      </a:solidFill>
-                    </a:ln>
-                    <a:effectLst/>
-                  </c:spPr>
-                </c15:leaderLines>
-              </c:ext>
-            </c:extLst>
-          </c:dLbls>
-          <c:cat>
-            <c:strRef>
-              <c:f>Sheet1!$A$2:$A$5</c:f>
-              <c:strCache>
-                <c:ptCount val="4"/>
-                <c:pt idx="0">
-                  <c:v>Category 1</c:v>
-                </c:pt>
-                <c:pt idx="1">
-                  <c:v>Category 2</c:v>
-                </c:pt>
-                <c:pt idx="2">
-                  <c:v>Category 3</c:v>
-                </c:pt>
-                <c:pt idx="3">
-                  <c:v>Category 4</c:v>
-                </c:pt>
-              </c:strCache>
-            </c:strRef>
-          </c:cat>
-          <c:val>
-            <c:numRef>
-              <c:f>Sheet1!$D$2:$D$5</c:f>
-              <c:numCache>
-                <c:formatCode>General</c:formatCode>
-                <c:ptCount val="4"/>
-                <c:pt idx="0">
-                  <c:v>2</c:v>
-                </c:pt>
-                <c:pt idx="1">
-                  <c:v>2</c:v>
-                </c:pt>
-                <c:pt idx="2">
-                  <c:v>3</c:v>
-                </c:pt>
-                <c:pt idx="3">
-                  <c:v>5</c:v>
-                </c:pt>
-              </c:numCache>
-            </c:numRef>
-          </c:val>
-          <c:extLst>
-            <c:ext xmlns:c16="http://schemas.microsoft.com/office/drawing/2014/chart" uri="{C3380CC4-5D6E-409C-BE32-E72D297353CC}">
-              <c16:uniqueId val="{00000002-5A55-423E-948E-3543A421E78B}"/>
-            </c:ext>
-          </c:extLst>
-        </c:ser>
-        <c:dLbls>
-          <c:dLblPos val="outEnd"/>
-          <c:showLegendKey val="0"/>
-          <c:showVal val="1"/>
-          <c:showCatName val="0"/>
-          <c:showSerName val="0"/>
-          <c:showPercent val="0"/>
-          <c:showBubbleSize val="0"/>
-        </c:dLbls>
-        <c:gapWidth val="444"/>
-        <c:overlap val="-90"/>
-        <c:axId val="1111705064"/>
-        <c:axId val="1111706704"/>
-      </c:barChart>
-      <c:catAx>
-        <c:axId val="1111705064"/>
-        <c:scaling>
-          <c:orientation val="minMax"/>
-        </c:scaling>
-        <c:delete val="0"/>
-        <c:axPos val="b"/>
-        <c:majorGridlines>
-          <c:spPr>
-            <a:ln w="9525" cap="flat" cmpd="sng" algn="ctr">
-              <a:solidFill>
-                <a:schemeClr val="bg2">
-                  <a:lumMod val="50000"/>
-                </a:schemeClr>
-              </a:solidFill>
-              <a:round/>
-            </a:ln>
-            <a:effectLst/>
-          </c:spPr>
-        </c:majorGridlines>
-        <c:numFmt formatCode="General" sourceLinked="1"/>
-        <c:majorTickMark val="none"/>
-        <c:minorTickMark val="none"/>
-        <c:tickLblPos val="nextTo"/>
-        <c:spPr>
-          <a:noFill/>
-          <a:ln w="9525" cap="flat" cmpd="sng" algn="ctr">
-            <a:solidFill>
-              <a:schemeClr val="bg2">
-                <a:lumMod val="50000"/>
-              </a:schemeClr>
-            </a:solidFill>
-            <a:round/>
-          </a:ln>
-          <a:effectLst/>
-        </c:spPr>
-        <c:txPr>
-          <a:bodyPr rot="-60000000" spcFirstLastPara="1" vertOverflow="ellipsis" vert="horz" wrap="square" anchor="ctr" anchorCtr="1"/>
-          <a:lstStyle/>
-          <a:p>
-            <a:pPr>
-              <a:defRPr lang="en-GB" sz="1064" b="0" i="0" u="none" strike="noStrike" kern="1200" cap="all" spc="120" normalizeH="0" baseline="0" noProof="0">
-                <a:solidFill>
-                  <a:schemeClr val="tx1">
-                    <a:lumMod val="65000"/>
-                    <a:lumOff val="35000"/>
-                  </a:schemeClr>
-                </a:solidFill>
-                <a:latin typeface="+mn-lt"/>
-                <a:ea typeface="+mn-ea"/>
-                <a:cs typeface="+mn-cs"/>
-              </a:defRPr>
-            </a:pPr>
-            <a:endParaRPr lang="en-US"/>
-          </a:p>
-        </c:txPr>
-        <c:crossAx val="1111706704"/>
-        <c:crosses val="autoZero"/>
-        <c:auto val="1"/>
-        <c:lblAlgn val="ctr"/>
-        <c:lblOffset val="100"/>
-        <c:noMultiLvlLbl val="0"/>
-      </c:catAx>
-      <c:valAx>
-        <c:axId val="1111706704"/>
-        <c:scaling>
-          <c:orientation val="minMax"/>
-        </c:scaling>
-        <c:delete val="1"/>
-        <c:axPos val="l"/>
-        <c:numFmt formatCode="General" sourceLinked="1"/>
-        <c:majorTickMark val="none"/>
-        <c:minorTickMark val="none"/>
-        <c:tickLblPos val="nextTo"/>
-        <c:crossAx val="1111705064"/>
-        <c:crosses val="autoZero"/>
-        <c:crossBetween val="between"/>
-      </c:valAx>
-      <c:spPr>
-        <a:noFill/>
-        <a:ln>
-          <a:noFill/>
-        </a:ln>
-        <a:effectLst/>
-      </c:spPr>
-    </c:plotArea>
-    <c:legend>
-      <c:legendPos val="t"/>
-      <c:layout>
-        <c:manualLayout>
-          <c:xMode val="edge"/>
-          <c:yMode val="edge"/>
-          <c:x val="0.37811242344706913"/>
-          <c:y val="0.94053323368582264"/>
-          <c:w val="0.24377505800905322"/>
-          <c:h val="5.9466766314177383E-2"/>
-        </c:manualLayout>
-      </c:layout>
-      <c:overlay val="0"/>
-      <c:spPr>
-        <a:noFill/>
-        <a:ln>
-          <a:noFill/>
-        </a:ln>
-        <a:effectLst/>
-      </c:spPr>
-      <c:txPr>
-        <a:bodyPr rot="0" spcFirstLastPara="1" vertOverflow="ellipsis" vert="horz" wrap="square" anchor="ctr" anchorCtr="1"/>
-        <a:lstStyle/>
-        <a:p>
-          <a:pPr>
-            <a:defRPr lang="en-GB" sz="1197" b="0" i="0" u="none" strike="noStrike" kern="1200" baseline="0" noProof="0">
-              <a:solidFill>
-                <a:schemeClr val="tx1">
-                  <a:lumMod val="65000"/>
-                  <a:lumOff val="35000"/>
-                </a:schemeClr>
-              </a:solidFill>
-              <a:latin typeface="+mn-lt"/>
-              <a:ea typeface="+mn-ea"/>
-              <a:cs typeface="+mn-cs"/>
-            </a:defRPr>
-          </a:pPr>
-          <a:endParaRPr lang="en-US"/>
-        </a:p>
-      </c:txPr>
-    </c:legend>
-    <c:plotVisOnly val="1"/>
-    <c:dispBlanksAs val="gap"/>
-    <c:extLst>
-      <c:ext xmlns:c16r3="http://schemas.microsoft.com/office/drawing/2017/03/chart" uri="{56B9EC1D-385E-4148-901F-78D8002777C0}">
-        <c16r3:dataDisplayOptions16>
-          <c16r3:dispNaAsBlank val="1"/>
-        </c16r3:dataDisplayOptions16>
-      </c:ext>
-    </c:extLst>
-    <c:showDLblsOverMax val="0"/>
-  </c:chart>
-  <c:spPr>
-    <a:noFill/>
-    <a:ln>
-      <a:noFill/>
-    </a:ln>
-    <a:effectLst/>
-  </c:spPr>
-  <c:txPr>
-    <a:bodyPr/>
-    <a:lstStyle/>
-    <a:p>
-      <a:pPr>
-        <a:defRPr lang="en-GB" noProof="0"/>
-      </a:pPr>
-      <a:endParaRPr lang="en-US"/>
-    </a:p>
-  </c:txPr>
-  <c:externalData r:id="rId3">
-    <c:autoUpdate val="0"/>
-  </c:externalData>
-</c:chartSpace>
-</file>
-
-<file path=ppt/charts/colors1.xml><?xml version="1.0" encoding="utf-8"?>
-<cs:colorStyle xmlns:cs="http://schemas.microsoft.com/office/drawing/2012/chartStyle" xmlns:a="http://schemas.openxmlformats.org/drawingml/2006/main" meth="cycle" id="10">
-  <a:schemeClr val="accent1"/>
-  <a:schemeClr val="accent2"/>
-  <a:schemeClr val="accent3"/>
-  <a:schemeClr val="accent4"/>
-  <a:schemeClr val="accent5"/>
-  <a:schemeClr val="accent6"/>
-  <cs:variation/>
-  <cs:variation>
-    <a:lumMod val="60000"/>
-  </cs:variation>
-  <cs:variation>
-    <a:lumMod val="80000"/>
-    <a:lumOff val="20000"/>
-  </cs:variation>
-  <cs:variation>
-    <a:lumMod val="80000"/>
-  </cs:variation>
-  <cs:variation>
-    <a:lumMod val="60000"/>
-    <a:lumOff val="40000"/>
-  </cs:variation>
-  <cs:variation>
-    <a:lumMod val="50000"/>
-  </cs:variation>
-  <cs:variation>
-    <a:lumMod val="70000"/>
-    <a:lumOff val="30000"/>
-  </cs:variation>
-  <cs:variation>
-    <a:lumMod val="70000"/>
-  </cs:variation>
-  <cs:variation>
-    <a:lumMod val="50000"/>
-    <a:lumOff val="50000"/>
-  </cs:variation>
-</cs:colorStyle>
-</file>
-
-<file path=ppt/charts/style1.xml><?xml version="1.0" encoding="utf-8"?>
-<cs:chartStyle xmlns:cs="http://schemas.microsoft.com/office/drawing/2012/chartStyle" xmlns:a="http://schemas.openxmlformats.org/drawingml/2006/main" id="202">
-  <cs:axisTitle>
-    <cs:lnRef idx="0"/>
-    <cs:fillRef idx="0"/>
-    <cs:effectRef idx="0"/>
-    <cs:fontRef idx="minor">
-      <a:schemeClr val="tx1">
-        <a:lumMod val="65000"/>
-        <a:lumOff val="35000"/>
-      </a:schemeClr>
-    </cs:fontRef>
-    <cs:defRPr sz="1197" kern="1200" cap="all"/>
-  </cs:axisTitle>
-  <cs:categoryAxis>
-    <cs:lnRef idx="0"/>
-    <cs:fillRef idx="0"/>
-    <cs:effectRef idx="0"/>
-    <cs:fontRef idx="minor">
-      <a:schemeClr val="tx1">
-        <a:lumMod val="65000"/>
-        <a:lumOff val="35000"/>
-      </a:schemeClr>
-    </cs:fontRef>
-    <cs:spPr>
-      <a:ln w="9525" cap="flat" cmpd="sng" algn="ctr">
-        <a:solidFill>
-          <a:schemeClr val="tx1">
-            <a:lumMod val="15000"/>
-            <a:lumOff val="85000"/>
-          </a:schemeClr>
-        </a:solidFill>
-        <a:round/>
-      </a:ln>
-    </cs:spPr>
-    <cs:defRPr sz="1064" kern="1200" cap="all" spc="120" normalizeH="0" baseline="0"/>
-  </cs:categoryAxis>
-  <cs:chartArea mods="allowNoFillOverride allowNoLineOverride">
-    <cs:lnRef idx="0"/>
-    <cs:fillRef idx="0"/>
-    <cs:effectRef idx="0"/>
-    <cs:fontRef idx="minor">
-      <a:schemeClr val="dk1"/>
-    </cs:fontRef>
-    <cs:spPr>
-      <a:solidFill>
-        <a:schemeClr val="lt1"/>
-      </a:solidFill>
-      <a:ln w="9525" cap="flat" cmpd="sng" algn="ctr">
-        <a:solidFill>
-          <a:schemeClr val="tx1">
-            <a:lumMod val="15000"/>
-            <a:lumOff val="85000"/>
-          </a:schemeClr>
-        </a:solidFill>
-        <a:round/>
-      </a:ln>
-    </cs:spPr>
-    <cs:defRPr sz="1197" kern="1200"/>
-  </cs:chartArea>
-  <cs:dataLabel>
-    <cs:lnRef idx="0"/>
-    <cs:fillRef idx="0"/>
-    <cs:effectRef idx="0"/>
-    <cs:fontRef idx="minor">
-      <a:schemeClr val="tx1">
-        <a:lumMod val="50000"/>
-        <a:lumOff val="50000"/>
-      </a:schemeClr>
-    </cs:fontRef>
-    <cs:defRPr sz="1064" b="0" i="0" u="none" strike="noStrike" kern="1200" baseline="0"/>
-    <cs:bodyPr rot="-5400000" spcFirstLastPara="1" vertOverflow="clip" horzOverflow="clip" vert="horz" wrap="square" lIns="38100" tIns="19050" rIns="38100" bIns="19050" anchor="ctr" anchorCtr="1">
-      <a:spAutoFit/>
-    </cs:bodyPr>
-  </cs:dataLabel>
-  <cs:dataLabelCallout>
-    <cs:lnRef idx="0"/>
-    <cs:fillRef idx="0"/>
-    <cs:effectRef idx="0"/>
-    <cs:fontRef idx="minor">
-      <a:schemeClr val="dk1">
-        <a:lumMod val="65000"/>
-        <a:lumOff val="35000"/>
-      </a:schemeClr>
-    </cs:fontRef>
-    <cs:spPr>
-      <a:solidFill>
-        <a:schemeClr val="lt1"/>
-      </a:solidFill>
-      <a:ln>
-        <a:solidFill>
-          <a:schemeClr val="dk1">
-            <a:lumMod val="25000"/>
-            <a:lumOff val="75000"/>
-          </a:schemeClr>
-        </a:solidFill>
-      </a:ln>
-    </cs:spPr>
-    <cs:defRPr sz="1197" kern="1200"/>
-    <cs:bodyPr rot="0" spcFirstLastPara="1" vertOverflow="clip" horzOverflow="clip" vert="horz" wrap="square" lIns="36576" tIns="18288" rIns="36576" bIns="18288" anchor="ctr" anchorCtr="1">
-      <a:spAutoFit/>
-    </cs:bodyPr>
-  </cs:dataLabelCallout>
-  <cs:dataPoint>
-    <cs:lnRef idx="0"/>
-    <cs:fillRef idx="0">
-      <cs:styleClr val="auto"/>
-    </cs:fillRef>
-    <cs:effectRef idx="0"/>
-    <cs:fontRef idx="minor">
-      <a:schemeClr val="dk1"/>
-    </cs:fontRef>
-    <cs:spPr>
-      <a:solidFill>
-        <a:schemeClr val="phClr"/>
-      </a:solidFill>
-    </cs:spPr>
-  </cs:dataPoint>
-  <cs:dataPoint3D>
-    <cs:lnRef idx="0"/>
-    <cs:fillRef idx="0">
-      <cs:styleClr val="auto"/>
-    </cs:fillRef>
-    <cs:effectRef idx="0"/>
-    <cs:fontRef idx="minor">
-      <a:schemeClr val="dk1"/>
-    </cs:fontRef>
-    <cs:spPr>
-      <a:solidFill>
-        <a:schemeClr val="phClr"/>
-      </a:solidFill>
-    </cs:spPr>
-  </cs:dataPoint3D>
-  <cs:dataPointLine>
-    <cs:lnRef idx="0">
-      <cs:styleClr val="auto"/>
-    </cs:lnRef>
-    <cs:fillRef idx="0"/>
-    <cs:effectRef idx="0"/>
-    <cs:fontRef idx="minor">
-      <a:schemeClr val="dk1"/>
-    </cs:fontRef>
-    <cs:spPr>
-      <a:ln w="22225" cap="rnd">
-        <a:solidFill>
-          <a:schemeClr val="phClr"/>
-        </a:solidFill>
-        <a:round/>
-      </a:ln>
-    </cs:spPr>
-  </cs:dataPointLine>
-  <cs:dataPointMarker>
-    <cs:lnRef idx="0">
-      <cs:styleClr val="auto"/>
-    </cs:lnRef>
-    <cs:fillRef idx="0">
-      <cs:styleClr val="auto"/>
-    </cs:fillRef>
-    <cs:effectRef idx="0"/>
-    <cs:fontRef idx="minor">
-      <a:schemeClr val="dk1"/>
-    </cs:fontRef>
-    <cs:spPr>
-      <a:solidFill>
-        <a:schemeClr val="phClr"/>
-      </a:solidFill>
-      <a:ln w="9525">
-        <a:solidFill>
-          <a:schemeClr val="phClr"/>
-        </a:solidFill>
-        <a:round/>
-      </a:ln>
-    </cs:spPr>
-  </cs:dataPointMarker>
-  <cs:dataPointMarkerLayout size="6"/>
-  <cs:dataPointWireframe>
-    <cs:lnRef idx="0">
-      <cs:styleClr val="auto"/>
-    </cs:lnRef>
-    <cs:fillRef idx="0"/>
-    <cs:effectRef idx="0"/>
-    <cs:fontRef idx="minor">
-      <a:schemeClr val="dk1"/>
-    </cs:fontRef>
-    <cs:spPr>
-      <a:ln w="9525" cap="rnd">
-        <a:solidFill>
-          <a:schemeClr val="phClr"/>
-        </a:solidFill>
-        <a:round/>
-      </a:ln>
-    </cs:spPr>
-  </cs:dataPointWireframe>
-  <cs:dataTable>
-    <cs:lnRef idx="0"/>
-    <cs:fillRef idx="0"/>
-    <cs:effectRef idx="0"/>
-    <cs:fontRef idx="minor">
-      <a:schemeClr val="tx1">
-        <a:lumMod val="65000"/>
-        <a:lumOff val="35000"/>
-      </a:schemeClr>
-    </cs:fontRef>
-    <cs:spPr>
-      <a:ln w="9525">
-        <a:solidFill>
-          <a:schemeClr val="tx1">
-            <a:lumMod val="15000"/>
-            <a:lumOff val="85000"/>
-          </a:schemeClr>
-        </a:solidFill>
-      </a:ln>
-    </cs:spPr>
-    <cs:defRPr sz="1197" kern="1200"/>
-  </cs:dataTable>
-  <cs:downBar>
-    <cs:lnRef idx="0"/>
-    <cs:fillRef idx="0"/>
-    <cs:effectRef idx="0"/>
-    <cs:fontRef idx="minor">
-      <a:schemeClr val="dk1"/>
-    </cs:fontRef>
-    <cs:spPr>
-      <a:solidFill>
-        <a:schemeClr val="dk1">
-          <a:lumMod val="75000"/>
-          <a:lumOff val="25000"/>
-        </a:schemeClr>
-      </a:solidFill>
-      <a:ln w="9525">
-        <a:solidFill>
-          <a:schemeClr val="tx1">
-            <a:lumMod val="15000"/>
-            <a:lumOff val="85000"/>
-          </a:schemeClr>
-        </a:solidFill>
-      </a:ln>
-    </cs:spPr>
-  </cs:downBar>
-  <cs:dropLine>
-    <cs:lnRef idx="0"/>
-    <cs:fillRef idx="0"/>
-    <cs:effectRef idx="0"/>
-    <cs:fontRef idx="minor">
-      <a:schemeClr val="dk1"/>
-    </cs:fontRef>
-    <cs:spPr>
-      <a:ln w="9525">
-        <a:solidFill>
-          <a:schemeClr val="tx1">
-            <a:lumMod val="35000"/>
-            <a:lumOff val="65000"/>
-          </a:schemeClr>
-        </a:solidFill>
-      </a:ln>
-    </cs:spPr>
-  </cs:dropLine>
-  <cs:errorBar>
-    <cs:lnRef idx="0"/>
-    <cs:fillRef idx="0"/>
-    <cs:effectRef idx="0"/>
-    <cs:fontRef idx="minor">
-      <a:schemeClr val="dk1"/>
-    </cs:fontRef>
-    <cs:spPr>
-      <a:ln w="9525">
-        <a:solidFill>
-          <a:schemeClr val="tx1">
-            <a:lumMod val="65000"/>
-            <a:lumOff val="35000"/>
-          </a:schemeClr>
-        </a:solidFill>
-        <a:round/>
-      </a:ln>
-    </cs:spPr>
-  </cs:errorBar>
-  <cs:floor>
-    <cs:lnRef idx="0"/>
-    <cs:fillRef idx="0"/>
-    <cs:effectRef idx="0"/>
-    <cs:fontRef idx="minor">
-      <a:schemeClr val="dk1"/>
-    </cs:fontRef>
-  </cs:floor>
-  <cs:gridlineMajor>
-    <cs:lnRef idx="0"/>
-    <cs:fillRef idx="0"/>
-    <cs:effectRef idx="0"/>
-    <cs:fontRef idx="minor">
-      <a:schemeClr val="dk1"/>
-    </cs:fontRef>
-    <cs:spPr>
-      <a:ln w="9525" cap="flat" cmpd="sng" algn="ctr">
-        <a:solidFill>
-          <a:schemeClr val="tx1">
-            <a:lumMod val="15000"/>
-            <a:lumOff val="85000"/>
-          </a:schemeClr>
-        </a:solidFill>
-        <a:round/>
-      </a:ln>
-    </cs:spPr>
-  </cs:gridlineMajor>
-  <cs:gridlineMinor>
-    <cs:lnRef idx="0"/>
-    <cs:fillRef idx="0"/>
-    <cs:effectRef idx="0"/>
-    <cs:fontRef idx="minor">
-      <a:schemeClr val="dk1"/>
-    </cs:fontRef>
-    <cs:spPr>
-      <a:ln>
-        <a:solidFill>
-          <a:schemeClr val="tx1">
-            <a:lumMod val="5000"/>
-            <a:lumOff val="95000"/>
-          </a:schemeClr>
-        </a:solidFill>
-      </a:ln>
-    </cs:spPr>
-  </cs:gridlineMinor>
-  <cs:hiLoLine>
-    <cs:lnRef idx="0"/>
-    <cs:fillRef idx="0"/>
-    <cs:effectRef idx="0"/>
-    <cs:fontRef idx="minor">
-      <a:schemeClr val="dk1"/>
-    </cs:fontRef>
-    <cs:spPr>
-      <a:ln w="9525">
-        <a:solidFill>
-          <a:schemeClr val="tx1">
-            <a:lumMod val="50000"/>
-            <a:lumOff val="50000"/>
-          </a:schemeClr>
-        </a:solidFill>
-      </a:ln>
-    </cs:spPr>
-  </cs:hiLoLine>
-  <cs:leaderLine>
-    <cs:lnRef idx="0"/>
-    <cs:fillRef idx="0"/>
-    <cs:effectRef idx="0"/>
-    <cs:fontRef idx="minor">
-      <a:schemeClr val="dk1"/>
-    </cs:fontRef>
-    <cs:spPr>
-      <a:ln w="9525">
-        <a:solidFill>
-          <a:schemeClr val="tx1">
-            <a:lumMod val="35000"/>
-            <a:lumOff val="65000"/>
-          </a:schemeClr>
-        </a:solidFill>
-      </a:ln>
-    </cs:spPr>
-  </cs:leaderLine>
-  <cs:legend>
-    <cs:lnRef idx="0"/>
-    <cs:fillRef idx="0"/>
-    <cs:effectRef idx="0"/>
-    <cs:fontRef idx="minor">
-      <a:schemeClr val="tx1">
-        <a:lumMod val="65000"/>
-        <a:lumOff val="35000"/>
-      </a:schemeClr>
-    </cs:fontRef>
-    <cs:defRPr sz="1197" kern="1200"/>
-  </cs:legend>
-  <cs:plotArea mods="allowNoFillOverride allowNoLineOverride">
-    <cs:lnRef idx="0"/>
-    <cs:fillRef idx="0"/>
-    <cs:effectRef idx="0"/>
-    <cs:fontRef idx="minor">
-      <a:schemeClr val="dk1"/>
-    </cs:fontRef>
-  </cs:plotArea>
-  <cs:plotArea3D mods="allowNoFillOverride allowNoLineOverride">
-    <cs:lnRef idx="0"/>
-    <cs:fillRef idx="0"/>
-    <cs:effectRef idx="0"/>
-    <cs:fontRef idx="minor">
-      <a:schemeClr val="dk1"/>
-    </cs:fontRef>
-  </cs:plotArea3D>
-  <cs:seriesAxis>
-    <cs:lnRef idx="0"/>
-    <cs:fillRef idx="0"/>
-    <cs:effectRef idx="0"/>
-    <cs:fontRef idx="minor">
-      <a:schemeClr val="tx1">
-        <a:lumMod val="65000"/>
-        <a:lumOff val="35000"/>
-      </a:schemeClr>
-    </cs:fontRef>
-    <cs:spPr>
-      <a:ln w="9525" cap="flat" cmpd="sng" algn="ctr">
-        <a:solidFill>
-          <a:schemeClr val="tx1">
-            <a:lumMod val="15000"/>
-            <a:lumOff val="85000"/>
-          </a:schemeClr>
-        </a:solidFill>
-        <a:round/>
-      </a:ln>
-    </cs:spPr>
-    <cs:defRPr sz="1197" kern="1200"/>
-  </cs:seriesAxis>
-  <cs:seriesLine>
-    <cs:lnRef idx="0"/>
-    <cs:fillRef idx="0"/>
-    <cs:effectRef idx="0"/>
-    <cs:fontRef idx="minor">
-      <a:schemeClr val="dk1"/>
-    </cs:fontRef>
-    <cs:spPr>
-      <a:ln w="9525">
-        <a:solidFill>
-          <a:schemeClr val="tx1">
-            <a:lumMod val="35000"/>
-            <a:lumOff val="65000"/>
-          </a:schemeClr>
-        </a:solidFill>
-        <a:round/>
-      </a:ln>
-    </cs:spPr>
-  </cs:seriesLine>
-  <cs:title>
-    <cs:lnRef idx="0"/>
-    <cs:fillRef idx="0"/>
-    <cs:effectRef idx="0"/>
-    <cs:fontRef idx="minor">
-      <a:schemeClr val="tx1">
-        <a:lumMod val="65000"/>
-        <a:lumOff val="35000"/>
-      </a:schemeClr>
-    </cs:fontRef>
-    <cs:defRPr sz="2128" b="1" kern="1200" cap="all" spc="120" normalizeH="0" baseline="0"/>
-  </cs:title>
-  <cs:trendline>
-    <cs:lnRef idx="0">
-      <cs:styleClr val="auto"/>
-    </cs:lnRef>
-    <cs:fillRef idx="0"/>
-    <cs:effectRef idx="0"/>
-    <cs:fontRef idx="minor">
-      <a:schemeClr val="dk1"/>
-    </cs:fontRef>
-    <cs:spPr>
-      <a:ln w="19050" cap="rnd">
-        <a:solidFill>
-          <a:schemeClr val="phClr"/>
-        </a:solidFill>
-        <a:prstDash val="sysDash"/>
-      </a:ln>
-    </cs:spPr>
-  </cs:trendline>
-  <cs:trendlineLabel>
-    <cs:lnRef idx="0"/>
-    <cs:fillRef idx="0"/>
-    <cs:effectRef idx="0"/>
-    <cs:fontRef idx="minor">
-      <a:schemeClr val="tx1">
-        <a:lumMod val="65000"/>
-        <a:lumOff val="35000"/>
-      </a:schemeClr>
-    </cs:fontRef>
-    <cs:defRPr sz="1064" kern="1200"/>
-  </cs:trendlineLabel>
-  <cs:upBar>
-    <cs:lnRef idx="0"/>
-    <cs:fillRef idx="0"/>
-    <cs:effectRef idx="0"/>
-    <cs:fontRef idx="minor">
-      <a:schemeClr val="dk1"/>
-    </cs:fontRef>
-    <cs:spPr>
-      <a:solidFill>
-        <a:schemeClr val="lt1"/>
-      </a:solidFill>
-      <a:ln w="9525">
-        <a:solidFill>
-          <a:schemeClr val="tx1">
-            <a:lumMod val="65000"/>
-            <a:lumOff val="35000"/>
-          </a:schemeClr>
-        </a:solidFill>
-      </a:ln>
-    </cs:spPr>
-  </cs:upBar>
-  <cs:valueAxis>
-    <cs:lnRef idx="0"/>
-    <cs:fillRef idx="0"/>
-    <cs:effectRef idx="0"/>
-    <cs:fontRef idx="minor">
-      <a:schemeClr val="tx1">
-        <a:lumMod val="65000"/>
-        <a:lumOff val="35000"/>
-      </a:schemeClr>
-    </cs:fontRef>
-    <cs:spPr>
-      <a:ln w="9525" cap="flat" cmpd="sng" algn="ctr">
-        <a:solidFill>
-          <a:schemeClr val="dk1">
-            <a:lumMod val="15000"/>
-            <a:lumOff val="85000"/>
-          </a:schemeClr>
-        </a:solidFill>
-        <a:round/>
-      </a:ln>
-    </cs:spPr>
-    <cs:defRPr sz="1197" kern="1200"/>
-  </cs:valueAxis>
-  <cs:wall>
-    <cs:lnRef idx="0"/>
-    <cs:fillRef idx="0"/>
-    <cs:effectRef idx="0"/>
-    <cs:fontRef idx="minor">
-      <a:schemeClr val="dk1"/>
-    </cs:fontRef>
-  </cs:wall>
-</cs:chartStyle>
 </file>
 
 <file path=ppt/diagrams/colors1.xml><?xml version="1.0" encoding="utf-8"?>
@@ -5381,9 +4538,26 @@
         </p:nvSpPr>
         <p:spPr/>
         <p:txBody>
-          <a:bodyPr/>
+          <a:bodyPr rtlCol="0"/>
           <a:lstStyle/>
           <a:p>
+            <a:pPr marL="0" marR="0" lvl="0" indent="0" algn="l" defTabSz="914400" rtl="0" eaLnBrk="1" fontAlgn="auto" latinLnBrk="0" hangingPunct="1">
+              <a:lnSpc>
+                <a:spcPct val="100000"/>
+              </a:lnSpc>
+              <a:spcBef>
+                <a:spcPts val="0"/>
+              </a:spcBef>
+              <a:spcAft>
+                <a:spcPts val="0"/>
+              </a:spcAft>
+              <a:buClrTx/>
+              <a:buSzTx/>
+              <a:buFontTx/>
+              <a:buNone/>
+              <a:tabLst/>
+              <a:defRPr/>
+            </a:pPr>
             <a:endParaRPr lang="en-GB"/>
           </a:p>
         </p:txBody>
@@ -5400,11 +4574,11 @@
         </p:nvSpPr>
         <p:spPr/>
         <p:txBody>
-          <a:bodyPr/>
+          <a:bodyPr rtlCol="0"/>
           <a:lstStyle/>
           <a:p>
             <a:pPr rtl="0"/>
-            <a:fld id="{5B8B270D-091D-4ED2-8C85-0898DD7D9F21}" type="slidenum">
+            <a:fld id="{C712FDEA-03A1-4F6D-A72C-F016AC56B49F}" type="slidenum">
               <a:rPr lang="en-GB" smtClean="0"/>
               <a:t>10</a:t>
             </a:fld>
@@ -5415,7 +4589,7 @@
     </p:spTree>
     <p:extLst>
       <p:ext uri="{BB962C8B-B14F-4D97-AF65-F5344CB8AC3E}">
-        <p14:creationId xmlns:p14="http://schemas.microsoft.com/office/powerpoint/2010/main" val="2368517383"/>
+        <p14:creationId xmlns:p14="http://schemas.microsoft.com/office/powerpoint/2010/main" val="1198406815"/>
       </p:ext>
     </p:extLst>
   </p:cSld>
@@ -5500,7 +4674,7 @@
     </p:spTree>
     <p:extLst>
       <p:ext uri="{BB962C8B-B14F-4D97-AF65-F5344CB8AC3E}">
-        <p14:creationId xmlns:p14="http://schemas.microsoft.com/office/powerpoint/2010/main" val="2219819174"/>
+        <p14:creationId xmlns:p14="http://schemas.microsoft.com/office/powerpoint/2010/main" val="2263686109"/>
       </p:ext>
     </p:extLst>
   </p:cSld>
@@ -5585,7 +4759,7 @@
     </p:spTree>
     <p:extLst>
       <p:ext uri="{BB962C8B-B14F-4D97-AF65-F5344CB8AC3E}">
-        <p14:creationId xmlns:p14="http://schemas.microsoft.com/office/powerpoint/2010/main" val="2453711649"/>
+        <p14:creationId xmlns:p14="http://schemas.microsoft.com/office/powerpoint/2010/main" val="2368517383"/>
       </p:ext>
     </p:extLst>
   </p:cSld>
@@ -5662,6 +4836,176 @@
             <a:fld id="{5B8B270D-091D-4ED2-8C85-0898DD7D9F21}" type="slidenum">
               <a:rPr lang="en-GB" smtClean="0"/>
               <a:t>13</a:t>
+            </a:fld>
+            <a:endParaRPr lang="en-GB"/>
+          </a:p>
+        </p:txBody>
+      </p:sp>
+    </p:spTree>
+    <p:extLst>
+      <p:ext uri="{BB962C8B-B14F-4D97-AF65-F5344CB8AC3E}">
+        <p14:creationId xmlns:p14="http://schemas.microsoft.com/office/powerpoint/2010/main" val="2219819174"/>
+      </p:ext>
+    </p:extLst>
+  </p:cSld>
+  <p:clrMapOvr>
+    <a:masterClrMapping/>
+  </p:clrMapOvr>
+</p:notes>
+</file>
+
+<file path=ppt/notesSlides/notesSlide14.xml><?xml version="1.0" encoding="utf-8"?>
+<p:notes xmlns:a="http://schemas.openxmlformats.org/drawingml/2006/main" xmlns:r="http://schemas.openxmlformats.org/officeDocument/2006/relationships" xmlns:p="http://schemas.openxmlformats.org/presentationml/2006/main">
+  <p:cSld>
+    <p:spTree>
+      <p:nvGrpSpPr>
+        <p:cNvPr id="1" name=""/>
+        <p:cNvGrpSpPr/>
+        <p:nvPr/>
+      </p:nvGrpSpPr>
+      <p:grpSpPr>
+        <a:xfrm>
+          <a:off x="0" y="0"/>
+          <a:ext cx="0" cy="0"/>
+          <a:chOff x="0" y="0"/>
+          <a:chExt cx="0" cy="0"/>
+        </a:xfrm>
+      </p:grpSpPr>
+      <p:sp>
+        <p:nvSpPr>
+          <p:cNvPr id="2" name="Slide Image Placeholder 1"/>
+          <p:cNvSpPr>
+            <a:spLocks noGrp="1" noRot="1" noChangeAspect="1"/>
+          </p:cNvSpPr>
+          <p:nvPr>
+            <p:ph type="sldImg"/>
+          </p:nvPr>
+        </p:nvSpPr>
+        <p:spPr/>
+      </p:sp>
+      <p:sp>
+        <p:nvSpPr>
+          <p:cNvPr id="3" name="Notes Placeholder 2"/>
+          <p:cNvSpPr>
+            <a:spLocks noGrp="1"/>
+          </p:cNvSpPr>
+          <p:nvPr>
+            <p:ph type="body" idx="1"/>
+          </p:nvPr>
+        </p:nvSpPr>
+        <p:spPr/>
+        <p:txBody>
+          <a:bodyPr/>
+          <a:lstStyle/>
+          <a:p>
+            <a:endParaRPr lang="en-GB"/>
+          </a:p>
+        </p:txBody>
+      </p:sp>
+      <p:sp>
+        <p:nvSpPr>
+          <p:cNvPr id="4" name="Slide Number Placeholder 3"/>
+          <p:cNvSpPr>
+            <a:spLocks noGrp="1"/>
+          </p:cNvSpPr>
+          <p:nvPr>
+            <p:ph type="sldNum" sz="quarter" idx="5"/>
+          </p:nvPr>
+        </p:nvSpPr>
+        <p:spPr/>
+        <p:txBody>
+          <a:bodyPr/>
+          <a:lstStyle/>
+          <a:p>
+            <a:pPr rtl="0"/>
+            <a:fld id="{5B8B270D-091D-4ED2-8C85-0898DD7D9F21}" type="slidenum">
+              <a:rPr lang="en-GB" smtClean="0"/>
+              <a:t>14</a:t>
+            </a:fld>
+            <a:endParaRPr lang="en-GB"/>
+          </a:p>
+        </p:txBody>
+      </p:sp>
+    </p:spTree>
+    <p:extLst>
+      <p:ext uri="{BB962C8B-B14F-4D97-AF65-F5344CB8AC3E}">
+        <p14:creationId xmlns:p14="http://schemas.microsoft.com/office/powerpoint/2010/main" val="2453711649"/>
+      </p:ext>
+    </p:extLst>
+  </p:cSld>
+  <p:clrMapOvr>
+    <a:masterClrMapping/>
+  </p:clrMapOvr>
+</p:notes>
+</file>
+
+<file path=ppt/notesSlides/notesSlide15.xml><?xml version="1.0" encoding="utf-8"?>
+<p:notes xmlns:a="http://schemas.openxmlformats.org/drawingml/2006/main" xmlns:r="http://schemas.openxmlformats.org/officeDocument/2006/relationships" xmlns:p="http://schemas.openxmlformats.org/presentationml/2006/main">
+  <p:cSld>
+    <p:spTree>
+      <p:nvGrpSpPr>
+        <p:cNvPr id="1" name=""/>
+        <p:cNvGrpSpPr/>
+        <p:nvPr/>
+      </p:nvGrpSpPr>
+      <p:grpSpPr>
+        <a:xfrm>
+          <a:off x="0" y="0"/>
+          <a:ext cx="0" cy="0"/>
+          <a:chOff x="0" y="0"/>
+          <a:chExt cx="0" cy="0"/>
+        </a:xfrm>
+      </p:grpSpPr>
+      <p:sp>
+        <p:nvSpPr>
+          <p:cNvPr id="2" name="Slide Image Placeholder 1"/>
+          <p:cNvSpPr>
+            <a:spLocks noGrp="1" noRot="1" noChangeAspect="1"/>
+          </p:cNvSpPr>
+          <p:nvPr>
+            <p:ph type="sldImg"/>
+          </p:nvPr>
+        </p:nvSpPr>
+        <p:spPr/>
+      </p:sp>
+      <p:sp>
+        <p:nvSpPr>
+          <p:cNvPr id="3" name="Notes Placeholder 2"/>
+          <p:cNvSpPr>
+            <a:spLocks noGrp="1"/>
+          </p:cNvSpPr>
+          <p:nvPr>
+            <p:ph type="body" idx="1"/>
+          </p:nvPr>
+        </p:nvSpPr>
+        <p:spPr/>
+        <p:txBody>
+          <a:bodyPr/>
+          <a:lstStyle/>
+          <a:p>
+            <a:endParaRPr lang="en-GB"/>
+          </a:p>
+        </p:txBody>
+      </p:sp>
+      <p:sp>
+        <p:nvSpPr>
+          <p:cNvPr id="4" name="Slide Number Placeholder 3"/>
+          <p:cNvSpPr>
+            <a:spLocks noGrp="1"/>
+          </p:cNvSpPr>
+          <p:nvPr>
+            <p:ph type="sldNum" sz="quarter" idx="5"/>
+          </p:nvPr>
+        </p:nvSpPr>
+        <p:spPr/>
+        <p:txBody>
+          <a:bodyPr/>
+          <a:lstStyle/>
+          <a:p>
+            <a:pPr rtl="0"/>
+            <a:fld id="{5B8B270D-091D-4ED2-8C85-0898DD7D9F21}" type="slidenum">
+              <a:rPr lang="en-GB" smtClean="0"/>
+              <a:t>15</a:t>
             </a:fld>
             <a:endParaRPr lang="en-GB"/>
           </a:p>
@@ -6147,26 +5491,9 @@
         </p:nvSpPr>
         <p:spPr/>
         <p:txBody>
-          <a:bodyPr rtlCol="0"/>
+          <a:bodyPr/>
           <a:lstStyle/>
           <a:p>
-            <a:pPr marL="0" marR="0" lvl="0" indent="0" algn="l" defTabSz="914400" rtl="0" eaLnBrk="1" fontAlgn="auto" latinLnBrk="0" hangingPunct="1">
-              <a:lnSpc>
-                <a:spcPct val="100000"/>
-              </a:lnSpc>
-              <a:spcBef>
-                <a:spcPts val="0"/>
-              </a:spcBef>
-              <a:spcAft>
-                <a:spcPts val="0"/>
-              </a:spcAft>
-              <a:buClrTx/>
-              <a:buSzTx/>
-              <a:buFontTx/>
-              <a:buNone/>
-              <a:tabLst/>
-              <a:defRPr/>
-            </a:pPr>
             <a:endParaRPr lang="en-GB"/>
           </a:p>
         </p:txBody>
@@ -6183,11 +5510,11 @@
         </p:nvSpPr>
         <p:spPr/>
         <p:txBody>
-          <a:bodyPr rtlCol="0"/>
+          <a:bodyPr/>
           <a:lstStyle/>
           <a:p>
             <a:pPr rtl="0"/>
-            <a:fld id="{C712FDEA-03A1-4F6D-A72C-F016AC56B49F}" type="slidenum">
+            <a:fld id="{5B8B270D-091D-4ED2-8C85-0898DD7D9F21}" type="slidenum">
               <a:rPr lang="en-GB" smtClean="0"/>
               <a:t>7</a:t>
             </a:fld>
@@ -6198,7 +5525,7 @@
     </p:spTree>
     <p:extLst>
       <p:ext uri="{BB962C8B-B14F-4D97-AF65-F5344CB8AC3E}">
-        <p14:creationId xmlns:p14="http://schemas.microsoft.com/office/powerpoint/2010/main" val="4023135968"/>
+        <p14:creationId xmlns:p14="http://schemas.microsoft.com/office/powerpoint/2010/main" val="1158175023"/>
       </p:ext>
     </p:extLst>
   </p:cSld>
@@ -6209,6 +5536,91 @@
 </file>
 
 <file path=ppt/notesSlides/notesSlide8.xml><?xml version="1.0" encoding="utf-8"?>
+<p:notes xmlns:a="http://schemas.openxmlformats.org/drawingml/2006/main" xmlns:r="http://schemas.openxmlformats.org/officeDocument/2006/relationships" xmlns:p="http://schemas.openxmlformats.org/presentationml/2006/main">
+  <p:cSld>
+    <p:spTree>
+      <p:nvGrpSpPr>
+        <p:cNvPr id="1" name=""/>
+        <p:cNvGrpSpPr/>
+        <p:nvPr/>
+      </p:nvGrpSpPr>
+      <p:grpSpPr>
+        <a:xfrm>
+          <a:off x="0" y="0"/>
+          <a:ext cx="0" cy="0"/>
+          <a:chOff x="0" y="0"/>
+          <a:chExt cx="0" cy="0"/>
+        </a:xfrm>
+      </p:grpSpPr>
+      <p:sp>
+        <p:nvSpPr>
+          <p:cNvPr id="2" name="Slide Image Placeholder 1"/>
+          <p:cNvSpPr>
+            <a:spLocks noGrp="1" noRot="1" noChangeAspect="1"/>
+          </p:cNvSpPr>
+          <p:nvPr>
+            <p:ph type="sldImg"/>
+          </p:nvPr>
+        </p:nvSpPr>
+        <p:spPr/>
+      </p:sp>
+      <p:sp>
+        <p:nvSpPr>
+          <p:cNvPr id="3" name="Notes Placeholder 2"/>
+          <p:cNvSpPr>
+            <a:spLocks noGrp="1"/>
+          </p:cNvSpPr>
+          <p:nvPr>
+            <p:ph type="body" idx="1"/>
+          </p:nvPr>
+        </p:nvSpPr>
+        <p:spPr/>
+        <p:txBody>
+          <a:bodyPr/>
+          <a:lstStyle/>
+          <a:p>
+            <a:endParaRPr lang="en-GB"/>
+          </a:p>
+        </p:txBody>
+      </p:sp>
+      <p:sp>
+        <p:nvSpPr>
+          <p:cNvPr id="4" name="Slide Number Placeholder 3"/>
+          <p:cNvSpPr>
+            <a:spLocks noGrp="1"/>
+          </p:cNvSpPr>
+          <p:nvPr>
+            <p:ph type="sldNum" sz="quarter" idx="5"/>
+          </p:nvPr>
+        </p:nvSpPr>
+        <p:spPr/>
+        <p:txBody>
+          <a:bodyPr/>
+          <a:lstStyle/>
+          <a:p>
+            <a:pPr rtl="0"/>
+            <a:fld id="{5B8B270D-091D-4ED2-8C85-0898DD7D9F21}" type="slidenum">
+              <a:rPr lang="en-GB" smtClean="0"/>
+              <a:t>8</a:t>
+            </a:fld>
+            <a:endParaRPr lang="en-GB"/>
+          </a:p>
+        </p:txBody>
+      </p:sp>
+    </p:spTree>
+    <p:extLst>
+      <p:ext uri="{BB962C8B-B14F-4D97-AF65-F5344CB8AC3E}">
+        <p14:creationId xmlns:p14="http://schemas.microsoft.com/office/powerpoint/2010/main" val="4262285344"/>
+      </p:ext>
+    </p:extLst>
+  </p:cSld>
+  <p:clrMapOvr>
+    <a:masterClrMapping/>
+  </p:clrMapOvr>
+</p:notes>
+</file>
+
+<file path=ppt/notesSlides/notesSlide9.xml><?xml version="1.0" encoding="utf-8"?>
 <p:notes xmlns:a="http://schemas.openxmlformats.org/drawingml/2006/main" xmlns:r="http://schemas.openxmlformats.org/officeDocument/2006/relationships" xmlns:p="http://schemas.openxmlformats.org/presentationml/2006/main">
   <p:cSld>
     <p:spTree>
@@ -6291,91 +5703,6 @@
             <a:pPr rtl="0"/>
             <a:fld id="{C712FDEA-03A1-4F6D-A72C-F016AC56B49F}" type="slidenum">
               <a:rPr lang="en-GB" smtClean="0"/>
-              <a:t>8</a:t>
-            </a:fld>
-            <a:endParaRPr lang="en-GB"/>
-          </a:p>
-        </p:txBody>
-      </p:sp>
-    </p:spTree>
-    <p:extLst>
-      <p:ext uri="{BB962C8B-B14F-4D97-AF65-F5344CB8AC3E}">
-        <p14:creationId xmlns:p14="http://schemas.microsoft.com/office/powerpoint/2010/main" val="1198406815"/>
-      </p:ext>
-    </p:extLst>
-  </p:cSld>
-  <p:clrMapOvr>
-    <a:masterClrMapping/>
-  </p:clrMapOvr>
-</p:notes>
-</file>
-
-<file path=ppt/notesSlides/notesSlide9.xml><?xml version="1.0" encoding="utf-8"?>
-<p:notes xmlns:a="http://schemas.openxmlformats.org/drawingml/2006/main" xmlns:r="http://schemas.openxmlformats.org/officeDocument/2006/relationships" xmlns:p="http://schemas.openxmlformats.org/presentationml/2006/main">
-  <p:cSld>
-    <p:spTree>
-      <p:nvGrpSpPr>
-        <p:cNvPr id="1" name=""/>
-        <p:cNvGrpSpPr/>
-        <p:nvPr/>
-      </p:nvGrpSpPr>
-      <p:grpSpPr>
-        <a:xfrm>
-          <a:off x="0" y="0"/>
-          <a:ext cx="0" cy="0"/>
-          <a:chOff x="0" y="0"/>
-          <a:chExt cx="0" cy="0"/>
-        </a:xfrm>
-      </p:grpSpPr>
-      <p:sp>
-        <p:nvSpPr>
-          <p:cNvPr id="2" name="Slide Image Placeholder 1"/>
-          <p:cNvSpPr>
-            <a:spLocks noGrp="1" noRot="1" noChangeAspect="1"/>
-          </p:cNvSpPr>
-          <p:nvPr>
-            <p:ph type="sldImg"/>
-          </p:nvPr>
-        </p:nvSpPr>
-        <p:spPr/>
-      </p:sp>
-      <p:sp>
-        <p:nvSpPr>
-          <p:cNvPr id="3" name="Notes Placeholder 2"/>
-          <p:cNvSpPr>
-            <a:spLocks noGrp="1"/>
-          </p:cNvSpPr>
-          <p:nvPr>
-            <p:ph type="body" idx="1"/>
-          </p:nvPr>
-        </p:nvSpPr>
-        <p:spPr/>
-        <p:txBody>
-          <a:bodyPr/>
-          <a:lstStyle/>
-          <a:p>
-            <a:endParaRPr lang="en-GB"/>
-          </a:p>
-        </p:txBody>
-      </p:sp>
-      <p:sp>
-        <p:nvSpPr>
-          <p:cNvPr id="4" name="Slide Number Placeholder 3"/>
-          <p:cNvSpPr>
-            <a:spLocks noGrp="1"/>
-          </p:cNvSpPr>
-          <p:nvPr>
-            <p:ph type="sldNum" sz="quarter" idx="5"/>
-          </p:nvPr>
-        </p:nvSpPr>
-        <p:spPr/>
-        <p:txBody>
-          <a:bodyPr/>
-          <a:lstStyle/>
-          <a:p>
-            <a:pPr rtl="0"/>
-            <a:fld id="{5B8B270D-091D-4ED2-8C85-0898DD7D9F21}" type="slidenum">
-              <a:rPr lang="en-GB" smtClean="0"/>
               <a:t>9</a:t>
             </a:fld>
             <a:endParaRPr lang="en-GB"/>
@@ -6385,7 +5712,7 @@
     </p:spTree>
     <p:extLst>
       <p:ext uri="{BB962C8B-B14F-4D97-AF65-F5344CB8AC3E}">
-        <p14:creationId xmlns:p14="http://schemas.microsoft.com/office/powerpoint/2010/main" val="2263686109"/>
+        <p14:creationId xmlns:p14="http://schemas.microsoft.com/office/powerpoint/2010/main" val="4023135968"/>
       </p:ext>
     </p:extLst>
   </p:cSld>
@@ -37694,6 +37021,883 @@
       </p:grpSpPr>
       <p:sp>
         <p:nvSpPr>
+          <p:cNvPr id="46" name="Title 45">
+            <a:extLst>
+              <a:ext uri="{FF2B5EF4-FFF2-40B4-BE49-F238E27FC236}">
+                <a16:creationId xmlns:a16="http://schemas.microsoft.com/office/drawing/2014/main" id="{CD5E908A-501A-4558-A678-42BF2D8FCDC1}"/>
+              </a:ext>
+            </a:extLst>
+          </p:cNvPr>
+          <p:cNvSpPr>
+            <a:spLocks noGrp="1"/>
+          </p:cNvSpPr>
+          <p:nvPr>
+            <p:ph type="title"/>
+          </p:nvPr>
+        </p:nvSpPr>
+        <p:spPr>
+          <a:xfrm>
+            <a:off x="989400" y="395289"/>
+            <a:ext cx="10213200" cy="1112836"/>
+          </a:xfrm>
+        </p:spPr>
+        <p:txBody>
+          <a:bodyPr rtlCol="0"/>
+          <a:lstStyle/>
+          <a:p>
+            <a:pPr rtl="0"/>
+            <a:r>
+              <a:rPr lang="en-GB"/>
+              <a:t>Team</a:t>
+            </a:r>
+          </a:p>
+        </p:txBody>
+      </p:sp>
+      <p:pic>
+        <p:nvPicPr>
+          <p:cNvPr id="25" name="Picture Placeholder 24" descr="A person with blonde hair">
+            <a:extLst>
+              <a:ext uri="{FF2B5EF4-FFF2-40B4-BE49-F238E27FC236}">
+                <a16:creationId xmlns:a16="http://schemas.microsoft.com/office/drawing/2014/main" id="{F1B398D1-2C82-4CDD-9305-CD315832B8F2}"/>
+              </a:ext>
+            </a:extLst>
+          </p:cNvPr>
+          <p:cNvPicPr>
+            <a:picLocks noGrp="1" noChangeAspect="1"/>
+          </p:cNvPicPr>
+          <p:nvPr>
+            <p:ph type="pic" sz="quarter" idx="13"/>
+          </p:nvPr>
+        </p:nvPicPr>
+        <p:blipFill rotWithShape="1">
+          <a:blip r:embed="rId3" cstate="screen">
+            <a:extLst>
+              <a:ext uri="{28A0092B-C50C-407E-A947-70E740481C1C}">
+                <a14:useLocalDpi xmlns:a14="http://schemas.microsoft.com/office/drawing/2010/main" val="0"/>
+              </a:ext>
+            </a:extLst>
+          </a:blip>
+          <a:srcRect/>
+          <a:stretch/>
+        </p:blipFill>
+        <p:spPr>
+          <a:xfrm>
+            <a:off x="1166813" y="2479675"/>
+            <a:ext cx="1587500" cy="2330450"/>
+          </a:xfrm>
+        </p:spPr>
+      </p:pic>
+      <p:pic>
+        <p:nvPicPr>
+          <p:cNvPr id="29" name="Picture Placeholder 28" descr="A person with a beard">
+            <a:extLst>
+              <a:ext uri="{FF2B5EF4-FFF2-40B4-BE49-F238E27FC236}">
+                <a16:creationId xmlns:a16="http://schemas.microsoft.com/office/drawing/2014/main" id="{2623E100-E20A-4D63-877A-8F63331E1677}"/>
+              </a:ext>
+            </a:extLst>
+          </p:cNvPr>
+          <p:cNvPicPr>
+            <a:picLocks noGrp="1" noChangeAspect="1"/>
+          </p:cNvPicPr>
+          <p:nvPr>
+            <p:ph type="pic" sz="quarter" idx="14"/>
+          </p:nvPr>
+        </p:nvPicPr>
+        <p:blipFill rotWithShape="1">
+          <a:blip r:embed="rId4" cstate="screen">
+            <a:extLst>
+              <a:ext uri="{28A0092B-C50C-407E-A947-70E740481C1C}">
+                <a14:useLocalDpi xmlns:a14="http://schemas.microsoft.com/office/drawing/2010/main" val="0"/>
+              </a:ext>
+            </a:extLst>
+          </a:blip>
+          <a:srcRect/>
+          <a:stretch/>
+        </p:blipFill>
+        <p:spPr>
+          <a:xfrm>
+            <a:off x="3228885" y="2479675"/>
+            <a:ext cx="1587500" cy="2330450"/>
+          </a:xfrm>
+        </p:spPr>
+      </p:pic>
+      <p:pic>
+        <p:nvPicPr>
+          <p:cNvPr id="33" name="Picture Placeholder 32" descr="A person wearing glasses">
+            <a:extLst>
+              <a:ext uri="{FF2B5EF4-FFF2-40B4-BE49-F238E27FC236}">
+                <a16:creationId xmlns:a16="http://schemas.microsoft.com/office/drawing/2014/main" id="{D8DDBC01-61F9-424B-BE7C-5E90A2899EF4}"/>
+              </a:ext>
+            </a:extLst>
+          </p:cNvPr>
+          <p:cNvPicPr>
+            <a:picLocks noGrp="1" noChangeAspect="1"/>
+          </p:cNvPicPr>
+          <p:nvPr>
+            <p:ph type="pic" sz="quarter" idx="15"/>
+          </p:nvPr>
+        </p:nvPicPr>
+        <p:blipFill rotWithShape="1">
+          <a:blip r:embed="rId5" cstate="screen">
+            <a:extLst>
+              <a:ext uri="{28A0092B-C50C-407E-A947-70E740481C1C}">
+                <a14:useLocalDpi xmlns:a14="http://schemas.microsoft.com/office/drawing/2010/main" val="0"/>
+              </a:ext>
+            </a:extLst>
+          </a:blip>
+          <a:srcRect/>
+          <a:stretch/>
+        </p:blipFill>
+        <p:spPr>
+          <a:xfrm>
+            <a:off x="5302249" y="2479675"/>
+            <a:ext cx="1587500" cy="2330450"/>
+          </a:xfrm>
+        </p:spPr>
+      </p:pic>
+      <p:pic>
+        <p:nvPicPr>
+          <p:cNvPr id="37" name="Picture Placeholder 36" descr="A person smiling for the camera">
+            <a:extLst>
+              <a:ext uri="{FF2B5EF4-FFF2-40B4-BE49-F238E27FC236}">
+                <a16:creationId xmlns:a16="http://schemas.microsoft.com/office/drawing/2014/main" id="{8A6FA0E8-E6CC-42B0-9698-D8AAF2555869}"/>
+              </a:ext>
+            </a:extLst>
+          </p:cNvPr>
+          <p:cNvPicPr>
+            <a:picLocks noGrp="1" noChangeAspect="1"/>
+          </p:cNvPicPr>
+          <p:nvPr>
+            <p:ph type="pic" sz="quarter" idx="16"/>
+          </p:nvPr>
+        </p:nvPicPr>
+        <p:blipFill rotWithShape="1">
+          <a:blip r:embed="rId6" cstate="screen">
+            <a:extLst>
+              <a:ext uri="{28A0092B-C50C-407E-A947-70E740481C1C}">
+                <a14:useLocalDpi xmlns:a14="http://schemas.microsoft.com/office/drawing/2010/main" val="0"/>
+              </a:ext>
+            </a:extLst>
+          </a:blip>
+          <a:srcRect/>
+          <a:stretch/>
+        </p:blipFill>
+        <p:spPr>
+          <a:xfrm>
+            <a:off x="7364764" y="2479675"/>
+            <a:ext cx="1587500" cy="2330450"/>
+          </a:xfrm>
+        </p:spPr>
+      </p:pic>
+      <p:pic>
+        <p:nvPicPr>
+          <p:cNvPr id="41" name="Picture Placeholder 40" descr="A picture containing person, indoor">
+            <a:extLst>
+              <a:ext uri="{FF2B5EF4-FFF2-40B4-BE49-F238E27FC236}">
+                <a16:creationId xmlns:a16="http://schemas.microsoft.com/office/drawing/2014/main" id="{ADA6917C-333B-412F-9E10-F89646EADCC3}"/>
+              </a:ext>
+            </a:extLst>
+          </p:cNvPr>
+          <p:cNvPicPr>
+            <a:picLocks noGrp="1" noChangeAspect="1"/>
+          </p:cNvPicPr>
+          <p:nvPr>
+            <p:ph type="pic" sz="quarter" idx="17"/>
+          </p:nvPr>
+        </p:nvPicPr>
+        <p:blipFill rotWithShape="1">
+          <a:blip r:embed="rId7" cstate="screen">
+            <a:extLst>
+              <a:ext uri="{28A0092B-C50C-407E-A947-70E740481C1C}">
+                <a14:useLocalDpi xmlns:a14="http://schemas.microsoft.com/office/drawing/2010/main" val="0"/>
+              </a:ext>
+            </a:extLst>
+          </a:blip>
+          <a:srcRect/>
+          <a:stretch/>
+        </p:blipFill>
+        <p:spPr>
+          <a:xfrm>
+            <a:off x="9437688" y="2479675"/>
+            <a:ext cx="1587500" cy="2330450"/>
+          </a:xfrm>
+        </p:spPr>
+      </p:pic>
+      <p:sp>
+        <p:nvSpPr>
+          <p:cNvPr id="54" name="Text Placeholder 53">
+            <a:extLst>
+              <a:ext uri="{FF2B5EF4-FFF2-40B4-BE49-F238E27FC236}">
+                <a16:creationId xmlns:a16="http://schemas.microsoft.com/office/drawing/2014/main" id="{E99206D5-9697-4725-A5A8-879EE5CCE83E}"/>
+              </a:ext>
+            </a:extLst>
+          </p:cNvPr>
+          <p:cNvSpPr>
+            <a:spLocks noGrp="1"/>
+          </p:cNvSpPr>
+          <p:nvPr>
+            <p:ph type="body" sz="quarter" idx="18"/>
+          </p:nvPr>
+        </p:nvSpPr>
+        <p:spPr>
+          <a:xfrm>
+            <a:off x="1166813" y="5094555"/>
+            <a:ext cx="1587499" cy="350292"/>
+          </a:xfrm>
+        </p:spPr>
+        <p:txBody>
+          <a:bodyPr rtlCol="0"/>
+          <a:lstStyle/>
+          <a:p>
+            <a:pPr rtl="0"/>
+            <a:r>
+              <a:rPr lang="en-GB"/>
+              <a:t>Name</a:t>
+            </a:r>
+          </a:p>
+        </p:txBody>
+      </p:sp>
+      <p:sp>
+        <p:nvSpPr>
+          <p:cNvPr id="55" name="Text Placeholder 54">
+            <a:extLst>
+              <a:ext uri="{FF2B5EF4-FFF2-40B4-BE49-F238E27FC236}">
+                <a16:creationId xmlns:a16="http://schemas.microsoft.com/office/drawing/2014/main" id="{4049A65B-9215-4059-9E97-7DF18F57D088}"/>
+              </a:ext>
+            </a:extLst>
+          </p:cNvPr>
+          <p:cNvSpPr>
+            <a:spLocks noGrp="1"/>
+          </p:cNvSpPr>
+          <p:nvPr>
+            <p:ph type="body" sz="quarter" idx="19"/>
+          </p:nvPr>
+        </p:nvSpPr>
+        <p:spPr>
+          <a:xfrm>
+            <a:off x="1166813" y="5371723"/>
+            <a:ext cx="1587499" cy="350292"/>
+          </a:xfrm>
+        </p:spPr>
+        <p:txBody>
+          <a:bodyPr rtlCol="0"/>
+          <a:lstStyle/>
+          <a:p>
+            <a:pPr rtl="0"/>
+            <a:r>
+              <a:rPr lang="en-GB"/>
+              <a:t>Title</a:t>
+            </a:r>
+          </a:p>
+        </p:txBody>
+      </p:sp>
+      <p:sp>
+        <p:nvSpPr>
+          <p:cNvPr id="56" name="Text Placeholder 55">
+            <a:extLst>
+              <a:ext uri="{FF2B5EF4-FFF2-40B4-BE49-F238E27FC236}">
+                <a16:creationId xmlns:a16="http://schemas.microsoft.com/office/drawing/2014/main" id="{FC0A64F4-87E9-46A8-BCC4-6F1DFE8A3E6D}"/>
+              </a:ext>
+            </a:extLst>
+          </p:cNvPr>
+          <p:cNvSpPr>
+            <a:spLocks noGrp="1"/>
+          </p:cNvSpPr>
+          <p:nvPr>
+            <p:ph type="body" sz="quarter" idx="20"/>
+          </p:nvPr>
+        </p:nvSpPr>
+        <p:spPr>
+          <a:xfrm>
+            <a:off x="3228885" y="5094555"/>
+            <a:ext cx="1587499" cy="350292"/>
+          </a:xfrm>
+        </p:spPr>
+        <p:txBody>
+          <a:bodyPr rtlCol="0"/>
+          <a:lstStyle/>
+          <a:p>
+            <a:pPr rtl="0"/>
+            <a:r>
+              <a:rPr lang="en-GB"/>
+              <a:t>Name</a:t>
+            </a:r>
+          </a:p>
+        </p:txBody>
+      </p:sp>
+      <p:sp>
+        <p:nvSpPr>
+          <p:cNvPr id="57" name="Text Placeholder 56">
+            <a:extLst>
+              <a:ext uri="{FF2B5EF4-FFF2-40B4-BE49-F238E27FC236}">
+                <a16:creationId xmlns:a16="http://schemas.microsoft.com/office/drawing/2014/main" id="{84A7E98E-D781-441A-BA74-EF1BED01B588}"/>
+              </a:ext>
+            </a:extLst>
+          </p:cNvPr>
+          <p:cNvSpPr>
+            <a:spLocks noGrp="1"/>
+          </p:cNvSpPr>
+          <p:nvPr>
+            <p:ph type="body" sz="quarter" idx="21"/>
+          </p:nvPr>
+        </p:nvSpPr>
+        <p:spPr>
+          <a:xfrm>
+            <a:off x="3228885" y="5371723"/>
+            <a:ext cx="1587499" cy="350292"/>
+          </a:xfrm>
+        </p:spPr>
+        <p:txBody>
+          <a:bodyPr rtlCol="0"/>
+          <a:lstStyle/>
+          <a:p>
+            <a:pPr rtl="0"/>
+            <a:r>
+              <a:rPr lang="en-GB"/>
+              <a:t>Title</a:t>
+            </a:r>
+          </a:p>
+        </p:txBody>
+      </p:sp>
+      <p:sp>
+        <p:nvSpPr>
+          <p:cNvPr id="58" name="Text Placeholder 57">
+            <a:extLst>
+              <a:ext uri="{FF2B5EF4-FFF2-40B4-BE49-F238E27FC236}">
+                <a16:creationId xmlns:a16="http://schemas.microsoft.com/office/drawing/2014/main" id="{51E437D6-831B-4C6D-8A0F-B4D300E2C6B8}"/>
+              </a:ext>
+            </a:extLst>
+          </p:cNvPr>
+          <p:cNvSpPr>
+            <a:spLocks noGrp="1"/>
+          </p:cNvSpPr>
+          <p:nvPr>
+            <p:ph type="body" sz="quarter" idx="22"/>
+          </p:nvPr>
+        </p:nvSpPr>
+        <p:spPr>
+          <a:xfrm>
+            <a:off x="5302249" y="5094555"/>
+            <a:ext cx="1587499" cy="350292"/>
+          </a:xfrm>
+        </p:spPr>
+        <p:txBody>
+          <a:bodyPr rtlCol="0"/>
+          <a:lstStyle/>
+          <a:p>
+            <a:pPr rtl="0"/>
+            <a:r>
+              <a:rPr lang="en-GB"/>
+              <a:t>Name</a:t>
+            </a:r>
+          </a:p>
+        </p:txBody>
+      </p:sp>
+      <p:sp>
+        <p:nvSpPr>
+          <p:cNvPr id="59" name="Text Placeholder 58">
+            <a:extLst>
+              <a:ext uri="{FF2B5EF4-FFF2-40B4-BE49-F238E27FC236}">
+                <a16:creationId xmlns:a16="http://schemas.microsoft.com/office/drawing/2014/main" id="{04476A89-3D0A-4A48-96B0-5C6961284982}"/>
+              </a:ext>
+            </a:extLst>
+          </p:cNvPr>
+          <p:cNvSpPr>
+            <a:spLocks noGrp="1"/>
+          </p:cNvSpPr>
+          <p:nvPr>
+            <p:ph type="body" sz="quarter" idx="23"/>
+          </p:nvPr>
+        </p:nvSpPr>
+        <p:spPr>
+          <a:xfrm>
+            <a:off x="5302249" y="5371723"/>
+            <a:ext cx="1587499" cy="350292"/>
+          </a:xfrm>
+        </p:spPr>
+        <p:txBody>
+          <a:bodyPr rtlCol="0"/>
+          <a:lstStyle/>
+          <a:p>
+            <a:pPr rtl="0"/>
+            <a:r>
+              <a:rPr lang="en-GB"/>
+              <a:t>Title</a:t>
+            </a:r>
+          </a:p>
+        </p:txBody>
+      </p:sp>
+      <p:sp>
+        <p:nvSpPr>
+          <p:cNvPr id="60" name="Text Placeholder 59">
+            <a:extLst>
+              <a:ext uri="{FF2B5EF4-FFF2-40B4-BE49-F238E27FC236}">
+                <a16:creationId xmlns:a16="http://schemas.microsoft.com/office/drawing/2014/main" id="{19060954-5CBF-46C3-AF76-911B1F83EA76}"/>
+              </a:ext>
+            </a:extLst>
+          </p:cNvPr>
+          <p:cNvSpPr>
+            <a:spLocks noGrp="1"/>
+          </p:cNvSpPr>
+          <p:nvPr>
+            <p:ph type="body" sz="quarter" idx="24"/>
+          </p:nvPr>
+        </p:nvSpPr>
+        <p:spPr>
+          <a:xfrm>
+            <a:off x="7364765" y="5094555"/>
+            <a:ext cx="1587499" cy="350292"/>
+          </a:xfrm>
+        </p:spPr>
+        <p:txBody>
+          <a:bodyPr rtlCol="0"/>
+          <a:lstStyle/>
+          <a:p>
+            <a:pPr rtl="0"/>
+            <a:r>
+              <a:rPr lang="en-GB"/>
+              <a:t>Name</a:t>
+            </a:r>
+          </a:p>
+        </p:txBody>
+      </p:sp>
+      <p:sp>
+        <p:nvSpPr>
+          <p:cNvPr id="61" name="Text Placeholder 60">
+            <a:extLst>
+              <a:ext uri="{FF2B5EF4-FFF2-40B4-BE49-F238E27FC236}">
+                <a16:creationId xmlns:a16="http://schemas.microsoft.com/office/drawing/2014/main" id="{9B1C6412-A141-40D2-9A6B-C1069B0F6B8F}"/>
+              </a:ext>
+            </a:extLst>
+          </p:cNvPr>
+          <p:cNvSpPr>
+            <a:spLocks noGrp="1"/>
+          </p:cNvSpPr>
+          <p:nvPr>
+            <p:ph type="body" sz="quarter" idx="25"/>
+          </p:nvPr>
+        </p:nvSpPr>
+        <p:spPr>
+          <a:xfrm>
+            <a:off x="7364765" y="5371723"/>
+            <a:ext cx="1587499" cy="350292"/>
+          </a:xfrm>
+        </p:spPr>
+        <p:txBody>
+          <a:bodyPr rtlCol="0"/>
+          <a:lstStyle/>
+          <a:p>
+            <a:pPr rtl="0"/>
+            <a:r>
+              <a:rPr lang="en-GB"/>
+              <a:t>Title</a:t>
+            </a:r>
+          </a:p>
+        </p:txBody>
+      </p:sp>
+      <p:sp>
+        <p:nvSpPr>
+          <p:cNvPr id="62" name="Text Placeholder 61">
+            <a:extLst>
+              <a:ext uri="{FF2B5EF4-FFF2-40B4-BE49-F238E27FC236}">
+                <a16:creationId xmlns:a16="http://schemas.microsoft.com/office/drawing/2014/main" id="{28873B3C-0DB0-4560-9D3C-9D1DD271841E}"/>
+              </a:ext>
+            </a:extLst>
+          </p:cNvPr>
+          <p:cNvSpPr>
+            <a:spLocks noGrp="1"/>
+          </p:cNvSpPr>
+          <p:nvPr>
+            <p:ph type="body" sz="quarter" idx="26"/>
+          </p:nvPr>
+        </p:nvSpPr>
+        <p:spPr>
+          <a:xfrm>
+            <a:off x="9437688" y="5094555"/>
+            <a:ext cx="1587499" cy="350292"/>
+          </a:xfrm>
+        </p:spPr>
+        <p:txBody>
+          <a:bodyPr rtlCol="0"/>
+          <a:lstStyle/>
+          <a:p>
+            <a:pPr rtl="0"/>
+            <a:r>
+              <a:rPr lang="en-GB"/>
+              <a:t>Name</a:t>
+            </a:r>
+          </a:p>
+        </p:txBody>
+      </p:sp>
+      <p:sp>
+        <p:nvSpPr>
+          <p:cNvPr id="63" name="Text Placeholder 62">
+            <a:extLst>
+              <a:ext uri="{FF2B5EF4-FFF2-40B4-BE49-F238E27FC236}">
+                <a16:creationId xmlns:a16="http://schemas.microsoft.com/office/drawing/2014/main" id="{5689D895-3876-4B11-907D-B46AA9520108}"/>
+              </a:ext>
+            </a:extLst>
+          </p:cNvPr>
+          <p:cNvSpPr>
+            <a:spLocks noGrp="1"/>
+          </p:cNvSpPr>
+          <p:nvPr>
+            <p:ph type="body" sz="quarter" idx="27"/>
+          </p:nvPr>
+        </p:nvSpPr>
+        <p:spPr>
+          <a:xfrm>
+            <a:off x="9437688" y="5371723"/>
+            <a:ext cx="1587499" cy="350292"/>
+          </a:xfrm>
+        </p:spPr>
+        <p:txBody>
+          <a:bodyPr rtlCol="0"/>
+          <a:lstStyle/>
+          <a:p>
+            <a:pPr rtl="0"/>
+            <a:r>
+              <a:rPr lang="en-GB"/>
+              <a:t>Title</a:t>
+            </a:r>
+          </a:p>
+        </p:txBody>
+      </p:sp>
+      <p:sp>
+        <p:nvSpPr>
+          <p:cNvPr id="13" name="Date Placeholder 47">
+            <a:extLst>
+              <a:ext uri="{FF2B5EF4-FFF2-40B4-BE49-F238E27FC236}">
+                <a16:creationId xmlns:a16="http://schemas.microsoft.com/office/drawing/2014/main" id="{289FFCBD-061F-4FE8-BB82-AB1733C9225C}"/>
+              </a:ext>
+            </a:extLst>
+          </p:cNvPr>
+          <p:cNvSpPr>
+            <a:spLocks noGrp="1"/>
+          </p:cNvSpPr>
+          <p:nvPr>
+            <p:ph type="dt" sz="half" idx="10"/>
+          </p:nvPr>
+        </p:nvSpPr>
+        <p:spPr>
+          <a:xfrm>
+            <a:off x="450000" y="6357168"/>
+            <a:ext cx="1760150" cy="461665"/>
+          </a:xfrm>
+        </p:spPr>
+        <p:txBody>
+          <a:bodyPr rtlCol="0"/>
+          <a:lstStyle/>
+          <a:p>
+            <a:pPr rtl="0"/>
+            <a:r>
+              <a:rPr lang="en-GB"/>
+              <a:t>20XX</a:t>
+            </a:r>
+          </a:p>
+        </p:txBody>
+      </p:sp>
+      <p:sp>
+        <p:nvSpPr>
+          <p:cNvPr id="49" name="Footer Placeholder 48">
+            <a:extLst>
+              <a:ext uri="{FF2B5EF4-FFF2-40B4-BE49-F238E27FC236}">
+                <a16:creationId xmlns:a16="http://schemas.microsoft.com/office/drawing/2014/main" id="{BC6711E1-B796-4D1D-BAC8-770C06C53DB6}"/>
+              </a:ext>
+            </a:extLst>
+          </p:cNvPr>
+          <p:cNvSpPr>
+            <a:spLocks noGrp="1"/>
+          </p:cNvSpPr>
+          <p:nvPr>
+            <p:ph type="ftr" sz="quarter" idx="11"/>
+          </p:nvPr>
+        </p:nvSpPr>
+        <p:spPr>
+          <a:xfrm>
+            <a:off x="2754312" y="6357600"/>
+            <a:ext cx="6683376" cy="460800"/>
+          </a:xfrm>
+        </p:spPr>
+        <p:txBody>
+          <a:bodyPr rtlCol="0"/>
+          <a:lstStyle/>
+          <a:p>
+            <a:pPr rtl="0"/>
+            <a:r>
+              <a:rPr lang="en-GB"/>
+              <a:t>Sample Footer Text</a:t>
+            </a:r>
+          </a:p>
+        </p:txBody>
+      </p:sp>
+      <p:sp>
+        <p:nvSpPr>
+          <p:cNvPr id="50" name="Slide Number Placeholder 49">
+            <a:extLst>
+              <a:ext uri="{FF2B5EF4-FFF2-40B4-BE49-F238E27FC236}">
+                <a16:creationId xmlns:a16="http://schemas.microsoft.com/office/drawing/2014/main" id="{584E00CC-0BE9-4582-B15B-D2F934C326AE}"/>
+              </a:ext>
+            </a:extLst>
+          </p:cNvPr>
+          <p:cNvSpPr>
+            <a:spLocks noGrp="1"/>
+          </p:cNvSpPr>
+          <p:nvPr>
+            <p:ph type="sldNum" sz="quarter" idx="12"/>
+          </p:nvPr>
+        </p:nvSpPr>
+        <p:spPr>
+          <a:xfrm>
+            <a:off x="9982800" y="6357600"/>
+            <a:ext cx="1760150" cy="460800"/>
+          </a:xfrm>
+        </p:spPr>
+        <p:txBody>
+          <a:bodyPr rtlCol="0"/>
+          <a:lstStyle/>
+          <a:p>
+            <a:pPr rtl="0"/>
+            <a:fld id="{D39607A7-8386-47DB-8578-DDEDD194E5D4}" type="slidenum">
+              <a:rPr lang="en-GB" smtClean="0"/>
+              <a:pPr rtl="0"/>
+              <a:t>10</a:t>
+            </a:fld>
+            <a:endParaRPr lang="en-GB"/>
+          </a:p>
+        </p:txBody>
+      </p:sp>
+    </p:spTree>
+    <p:extLst>
+      <p:ext uri="{BB962C8B-B14F-4D97-AF65-F5344CB8AC3E}">
+        <p14:creationId xmlns:p14="http://schemas.microsoft.com/office/powerpoint/2010/main" val="134718700"/>
+      </p:ext>
+    </p:extLst>
+  </p:cSld>
+  <p:clrMapOvr>
+    <a:masterClrMapping/>
+  </p:clrMapOvr>
+</p:sld>
+</file>
+
+<file path=ppt/slides/slide11.xml><?xml version="1.0" encoding="utf-8"?>
+<p:sld xmlns:a="http://schemas.openxmlformats.org/drawingml/2006/main" xmlns:r="http://schemas.openxmlformats.org/officeDocument/2006/relationships" xmlns:p="http://schemas.openxmlformats.org/presentationml/2006/main">
+  <p:cSld>
+    <p:spTree>
+      <p:nvGrpSpPr>
+        <p:cNvPr id="1" name=""/>
+        <p:cNvGrpSpPr/>
+        <p:nvPr/>
+      </p:nvGrpSpPr>
+      <p:grpSpPr>
+        <a:xfrm>
+          <a:off x="0" y="0"/>
+          <a:ext cx="0" cy="0"/>
+          <a:chOff x="0" y="0"/>
+          <a:chExt cx="0" cy="0"/>
+        </a:xfrm>
+      </p:grpSpPr>
+      <p:sp>
+        <p:nvSpPr>
+          <p:cNvPr id="2" name="Title 1">
+            <a:extLst>
+              <a:ext uri="{FF2B5EF4-FFF2-40B4-BE49-F238E27FC236}">
+                <a16:creationId xmlns:a16="http://schemas.microsoft.com/office/drawing/2014/main" id="{0D4E6E68-D059-4E48-A1A5-6D9FF5737F2F}"/>
+              </a:ext>
+            </a:extLst>
+          </p:cNvPr>
+          <p:cNvSpPr>
+            <a:spLocks noGrp="1"/>
+          </p:cNvSpPr>
+          <p:nvPr>
+            <p:ph type="title"/>
+          </p:nvPr>
+        </p:nvSpPr>
+        <p:spPr>
+          <a:xfrm>
+            <a:off x="989400" y="395289"/>
+            <a:ext cx="10213200" cy="1112836"/>
+          </a:xfrm>
+        </p:spPr>
+        <p:txBody>
+          <a:bodyPr rtlCol="0"/>
+          <a:lstStyle/>
+          <a:p>
+            <a:pPr rtl="0"/>
+            <a:r>
+              <a:rPr lang="en-GB" dirty="0"/>
+              <a:t>Timeline</a:t>
+            </a:r>
+          </a:p>
+        </p:txBody>
+      </p:sp>
+      <p:graphicFrame>
+        <p:nvGraphicFramePr>
+          <p:cNvPr id="4" name="Content Placeholder 4" descr="Timeline graphic with five boxes. The boxes are labelled 1 though five going left to right. ">
+            <a:extLst>
+              <a:ext uri="{FF2B5EF4-FFF2-40B4-BE49-F238E27FC236}">
+                <a16:creationId xmlns:a16="http://schemas.microsoft.com/office/drawing/2014/main" id="{4DE76F03-02C2-4450-8BCD-B9723A85980A}"/>
+              </a:ext>
+            </a:extLst>
+          </p:cNvPr>
+          <p:cNvGraphicFramePr>
+            <a:graphicFrameLocks noGrp="1"/>
+          </p:cNvGraphicFramePr>
+          <p:nvPr>
+            <p:ph idx="1"/>
+            <p:extLst>
+              <p:ext uri="{D42A27DB-BD31-4B8C-83A1-F6EECF244321}">
+                <p14:modId xmlns:p14="http://schemas.microsoft.com/office/powerpoint/2010/main" val="2218901848"/>
+              </p:ext>
+            </p:extLst>
+          </p:nvPr>
+        </p:nvGraphicFramePr>
+        <p:xfrm>
+          <a:off x="838200" y="1839913"/>
+          <a:ext cx="10515600" cy="4154487"/>
+        </p:xfrm>
+        <a:graphic>
+          <a:graphicData uri="http://schemas.openxmlformats.org/drawingml/2006/diagram">
+            <dgm:relIds xmlns:dgm="http://schemas.openxmlformats.org/drawingml/2006/diagram" xmlns:r="http://schemas.openxmlformats.org/officeDocument/2006/relationships" r:dm="rId3" r:lo="rId4" r:qs="rId5" r:cs="rId6"/>
+          </a:graphicData>
+        </a:graphic>
+      </p:graphicFrame>
+      <p:sp>
+        <p:nvSpPr>
+          <p:cNvPr id="5" name="Date Placeholder 4">
+            <a:extLst>
+              <a:ext uri="{FF2B5EF4-FFF2-40B4-BE49-F238E27FC236}">
+                <a16:creationId xmlns:a16="http://schemas.microsoft.com/office/drawing/2014/main" id="{33579941-CC56-4700-B032-DD38318272E4}"/>
+              </a:ext>
+            </a:extLst>
+          </p:cNvPr>
+          <p:cNvSpPr>
+            <a:spLocks noGrp="1"/>
+          </p:cNvSpPr>
+          <p:nvPr>
+            <p:ph type="dt" sz="half" idx="10"/>
+          </p:nvPr>
+        </p:nvSpPr>
+        <p:spPr>
+          <a:xfrm>
+            <a:off x="450000" y="6357168"/>
+            <a:ext cx="1760150" cy="461665"/>
+          </a:xfrm>
+        </p:spPr>
+        <p:txBody>
+          <a:bodyPr rtlCol="0"/>
+          <a:lstStyle/>
+          <a:p>
+            <a:pPr rtl="0"/>
+            <a:r>
+              <a:rPr lang="en-GB" dirty="0"/>
+              <a:t>20XX</a:t>
+            </a:r>
+          </a:p>
+        </p:txBody>
+      </p:sp>
+      <p:sp>
+        <p:nvSpPr>
+          <p:cNvPr id="6" name="Footer Placeholder 5">
+            <a:extLst>
+              <a:ext uri="{FF2B5EF4-FFF2-40B4-BE49-F238E27FC236}">
+                <a16:creationId xmlns:a16="http://schemas.microsoft.com/office/drawing/2014/main" id="{5E388C9B-5E77-4A32-9230-CF42155BCB0B}"/>
+              </a:ext>
+            </a:extLst>
+          </p:cNvPr>
+          <p:cNvSpPr>
+            <a:spLocks noGrp="1"/>
+          </p:cNvSpPr>
+          <p:nvPr>
+            <p:ph type="ftr" sz="quarter" idx="11"/>
+          </p:nvPr>
+        </p:nvSpPr>
+        <p:spPr>
+          <a:xfrm>
+            <a:off x="2754312" y="6357600"/>
+            <a:ext cx="6683376" cy="460800"/>
+          </a:xfrm>
+        </p:spPr>
+        <p:txBody>
+          <a:bodyPr rtlCol="0"/>
+          <a:lstStyle/>
+          <a:p>
+            <a:pPr rtl="0"/>
+            <a:r>
+              <a:rPr lang="en-GB" dirty="0"/>
+              <a:t>Sample Footer Text </a:t>
+            </a:r>
+          </a:p>
+        </p:txBody>
+      </p:sp>
+      <p:sp>
+        <p:nvSpPr>
+          <p:cNvPr id="7" name="Slide Number Placeholder 6">
+            <a:extLst>
+              <a:ext uri="{FF2B5EF4-FFF2-40B4-BE49-F238E27FC236}">
+                <a16:creationId xmlns:a16="http://schemas.microsoft.com/office/drawing/2014/main" id="{2411E042-EBFC-45CD-939D-D5DD1426061C}"/>
+              </a:ext>
+            </a:extLst>
+          </p:cNvPr>
+          <p:cNvSpPr>
+            <a:spLocks noGrp="1"/>
+          </p:cNvSpPr>
+          <p:nvPr>
+            <p:ph type="sldNum" sz="quarter" idx="12"/>
+          </p:nvPr>
+        </p:nvSpPr>
+        <p:spPr>
+          <a:xfrm>
+            <a:off x="9982800" y="6357600"/>
+            <a:ext cx="1760150" cy="460800"/>
+          </a:xfrm>
+        </p:spPr>
+        <p:txBody>
+          <a:bodyPr rtlCol="0"/>
+          <a:lstStyle/>
+          <a:p>
+            <a:pPr rtl="0"/>
+            <a:fld id="{FF2BD96E-3838-45D2-9031-D3AF67C920A5}" type="slidenum">
+              <a:rPr lang="en-GB" smtClean="0"/>
+              <a:pPr rtl="0"/>
+              <a:t>11</a:t>
+            </a:fld>
+            <a:endParaRPr lang="en-GB" dirty="0"/>
+          </a:p>
+        </p:txBody>
+      </p:sp>
+    </p:spTree>
+    <p:extLst>
+      <p:ext uri="{BB962C8B-B14F-4D97-AF65-F5344CB8AC3E}">
+        <p14:creationId xmlns:p14="http://schemas.microsoft.com/office/powerpoint/2010/main" val="804806354"/>
+      </p:ext>
+    </p:extLst>
+  </p:cSld>
+  <p:clrMapOvr>
+    <a:masterClrMapping/>
+  </p:clrMapOvr>
+</p:sld>
+</file>
+
+<file path=ppt/slides/slide12.xml><?xml version="1.0" encoding="utf-8"?>
+<p:sld xmlns:a="http://schemas.openxmlformats.org/drawingml/2006/main" xmlns:r="http://schemas.openxmlformats.org/officeDocument/2006/relationships" xmlns:p="http://schemas.openxmlformats.org/presentationml/2006/main">
+  <p:cSld>
+    <p:spTree>
+      <p:nvGrpSpPr>
+        <p:cNvPr id="1" name=""/>
+        <p:cNvGrpSpPr/>
+        <p:nvPr/>
+      </p:nvGrpSpPr>
+      <p:grpSpPr>
+        <a:xfrm>
+          <a:off x="0" y="0"/>
+          <a:ext cx="0" cy="0"/>
+          <a:chOff x="0" y="0"/>
+          <a:chExt cx="0" cy="0"/>
+        </a:xfrm>
+      </p:grpSpPr>
+      <p:sp>
+        <p:nvSpPr>
           <p:cNvPr id="2" name="Title 1">
             <a:extLst>
               <a:ext uri="{FF2B5EF4-FFF2-40B4-BE49-F238E27FC236}">
@@ -37982,8 +38186,8 @@
             <a:pPr rtl="0"/>
             <a:fld id="{D39607A7-8386-47DB-8578-DDEDD194E5D4}" type="slidenum">
               <a:rPr lang="en-GB" smtClean="0"/>
-              <a:pPr/>
-              <a:t>10</a:t>
+              <a:pPr rtl="0"/>
+              <a:t>12</a:t>
             </a:fld>
             <a:endParaRPr lang="en-GB"/>
           </a:p>
@@ -38002,7 +38206,7 @@
 </p:sld>
 </file>
 
-<file path=ppt/slides/slide11.xml><?xml version="1.0" encoding="utf-8"?>
+<file path=ppt/slides/slide13.xml><?xml version="1.0" encoding="utf-8"?>
 <p:sld xmlns:a="http://schemas.openxmlformats.org/drawingml/2006/main" xmlns:r="http://schemas.openxmlformats.org/officeDocument/2006/relationships" xmlns:p="http://schemas.openxmlformats.org/presentationml/2006/main">
   <p:cSld>
     <p:spTree>
@@ -38404,8 +38608,8 @@
             <a:pPr rtl="0"/>
             <a:fld id="{D39607A7-8386-47DB-8578-DDEDD194E5D4}" type="slidenum">
               <a:rPr lang="en-GB" smtClean="0"/>
-              <a:pPr/>
-              <a:t>11</a:t>
+              <a:pPr rtl="0"/>
+              <a:t>13</a:t>
             </a:fld>
             <a:endParaRPr lang="en-GB"/>
           </a:p>
@@ -38424,7 +38628,7 @@
 </p:sld>
 </file>
 
-<file path=ppt/slides/slide12.xml><?xml version="1.0" encoding="utf-8"?>
+<file path=ppt/slides/slide14.xml><?xml version="1.0" encoding="utf-8"?>
 <p:sld xmlns:a="http://schemas.openxmlformats.org/drawingml/2006/main" xmlns:r="http://schemas.openxmlformats.org/officeDocument/2006/relationships" xmlns:p="http://schemas.openxmlformats.org/presentationml/2006/main">
   <p:cSld>
     <p:bg>
@@ -38732,8 +38936,8 @@
             <a:pPr rtl="0"/>
             <a:fld id="{D39607A7-8386-47DB-8578-DDEDD194E5D4}" type="slidenum">
               <a:rPr lang="en-GB" smtClean="0"/>
-              <a:pPr/>
-              <a:t>12</a:t>
+              <a:pPr rtl="0"/>
+              <a:t>14</a:t>
             </a:fld>
             <a:endParaRPr lang="en-GB"/>
           </a:p>
@@ -38752,7 +38956,7 @@
 </p:sld>
 </file>
 
-<file path=ppt/slides/slide13.xml><?xml version="1.0" encoding="utf-8"?>
+<file path=ppt/slides/slide15.xml><?xml version="1.0" encoding="utf-8"?>
 <p:sld xmlns:a="http://schemas.openxmlformats.org/drawingml/2006/main" xmlns:r="http://schemas.openxmlformats.org/officeDocument/2006/relationships" xmlns:p="http://schemas.openxmlformats.org/presentationml/2006/main">
   <p:cSld>
     <p:bg>
@@ -38910,8 +39114,8 @@
             <a:pPr rtl="0"/>
             <a:fld id="{D39607A7-8386-47DB-8578-DDEDD194E5D4}" type="slidenum">
               <a:rPr lang="en-GB" smtClean="0"/>
-              <a:pPr/>
-              <a:t>13</a:t>
+              <a:pPr rtl="0"/>
+              <a:t>15</a:t>
             </a:fld>
             <a:endParaRPr lang="en-GB"/>
           </a:p>
@@ -39625,30 +39829,53 @@
         </p:nvSpPr>
         <p:spPr/>
       </p:sp>
+      <p:sp>
+        <p:nvSpPr>
+          <p:cNvPr id="17" name="Picture Placeholder 16">
+            <a:extLst>
+              <a:ext uri="{FF2B5EF4-FFF2-40B4-BE49-F238E27FC236}">
+                <a16:creationId xmlns:a16="http://schemas.microsoft.com/office/drawing/2014/main" id="{09EB7408-EC53-2DB0-E1F3-9F1D829D9C9A}"/>
+              </a:ext>
+            </a:extLst>
+          </p:cNvPr>
+          <p:cNvSpPr>
+            <a:spLocks noGrp="1"/>
+          </p:cNvSpPr>
+          <p:nvPr>
+            <p:ph type="pic" sz="quarter" idx="14"/>
+          </p:nvPr>
+        </p:nvSpPr>
+        <p:spPr/>
+      </p:sp>
       <p:pic>
         <p:nvPicPr>
-          <p:cNvPr id="15" name="Picture Placeholder 14" descr="A picture containing text, screenshot, font, plot&#10;&#10;Description automatically generated">
+          <p:cNvPr id="18" name="Picture 17">
             <a:extLst>
               <a:ext uri="{FF2B5EF4-FFF2-40B4-BE49-F238E27FC236}">
-                <a16:creationId xmlns:a16="http://schemas.microsoft.com/office/drawing/2014/main" id="{CCAB684B-1C81-511D-B068-1A7DD18B7C1C}"/>
+                <a16:creationId xmlns:a16="http://schemas.microsoft.com/office/drawing/2014/main" id="{C2168734-BD2A-6A5A-AC1E-6CDEACAF2B59}"/>
               </a:ext>
             </a:extLst>
           </p:cNvPr>
           <p:cNvPicPr>
-            <a:picLocks noGrp="1" noChangeAspect="1"/>
+            <a:picLocks noChangeAspect="1"/>
           </p:cNvPicPr>
-          <p:nvPr>
-            <p:ph type="pic" sz="quarter" idx="14"/>
-          </p:nvPr>
+          <p:nvPr/>
         </p:nvPicPr>
         <p:blipFill>
           <a:blip r:embed="rId4"/>
-          <a:srcRect t="10153" b="10153"/>
           <a:stretch>
             <a:fillRect/>
           </a:stretch>
         </p:blipFill>
-        <p:spPr/>
+        <p:spPr>
+          <a:xfrm>
+            <a:off x="6654199" y="3598563"/>
+            <a:ext cx="4995862" cy="2781300"/>
+          </a:xfrm>
+          <a:prstGeom prst="rect">
+            <a:avLst/>
+          </a:prstGeom>
+        </p:spPr>
       </p:pic>
     </p:spTree>
     <p:extLst>
@@ -39933,7 +40160,7 @@
         <p:spPr>
           <a:xfrm>
             <a:off x="989400" y="395289"/>
-            <a:ext cx="10213200" cy="1112836"/>
+            <a:ext cx="10213200" cy="627753"/>
           </a:xfrm>
         </p:spPr>
         <p:txBody>
@@ -39943,42 +40170,11 @@
             <a:pPr rtl="0"/>
             <a:r>
               <a:rPr lang="en-GB" dirty="0"/>
-              <a:t>Chart</a:t>
+              <a:t>Univariate analysis of some of the columns</a:t>
             </a:r>
           </a:p>
         </p:txBody>
       </p:sp>
-      <p:graphicFrame>
-        <p:nvGraphicFramePr>
-          <p:cNvPr id="6" name="Content Placeholder 5" descr="Data displayed in a vertical bar chart.">
-            <a:extLst>
-              <a:ext uri="{FF2B5EF4-FFF2-40B4-BE49-F238E27FC236}">
-                <a16:creationId xmlns:a16="http://schemas.microsoft.com/office/drawing/2014/main" id="{DB23E567-BDB1-4E6F-9EA8-3E4297461AEE}"/>
-              </a:ext>
-            </a:extLst>
-          </p:cNvPr>
-          <p:cNvGraphicFramePr>
-            <a:graphicFrameLocks noGrp="1"/>
-          </p:cNvGraphicFramePr>
-          <p:nvPr>
-            <p:ph idx="1"/>
-            <p:extLst>
-              <p:ext uri="{D42A27DB-BD31-4B8C-83A1-F6EECF244321}">
-                <p14:modId xmlns:p14="http://schemas.microsoft.com/office/powerpoint/2010/main" val="3289693758"/>
-              </p:ext>
-            </p:extLst>
-          </p:nvPr>
-        </p:nvGraphicFramePr>
-        <p:xfrm>
-          <a:off x="989013" y="1685925"/>
-          <a:ext cx="10213975" cy="4040188"/>
-        </p:xfrm>
-        <a:graphic>
-          <a:graphicData uri="http://schemas.openxmlformats.org/drawingml/2006/chart">
-            <c:chart xmlns:c="http://schemas.openxmlformats.org/drawingml/2006/chart" xmlns:r="http://schemas.openxmlformats.org/officeDocument/2006/relationships" r:id="rId3"/>
-          </a:graphicData>
-        </a:graphic>
-      </p:graphicFrame>
       <p:sp>
         <p:nvSpPr>
           <p:cNvPr id="8" name="Date Placeholder 47">
@@ -40083,6 +40279,239 @@
           </a:p>
         </p:txBody>
       </p:sp>
+      <p:pic>
+        <p:nvPicPr>
+          <p:cNvPr id="5" name="Content Placeholder 4">
+            <a:extLst>
+              <a:ext uri="{FF2B5EF4-FFF2-40B4-BE49-F238E27FC236}">
+                <a16:creationId xmlns:a16="http://schemas.microsoft.com/office/drawing/2014/main" id="{088F397B-312D-0E3E-9B98-3ADDE30FDED7}"/>
+              </a:ext>
+            </a:extLst>
+          </p:cNvPr>
+          <p:cNvPicPr>
+            <a:picLocks noGrp="1" noChangeAspect="1"/>
+          </p:cNvPicPr>
+          <p:nvPr>
+            <p:ph idx="1"/>
+          </p:nvPr>
+        </p:nvPicPr>
+        <p:blipFill>
+          <a:blip r:embed="rId3"/>
+          <a:stretch>
+            <a:fillRect/>
+          </a:stretch>
+        </p:blipFill>
+        <p:spPr>
+          <a:xfrm>
+            <a:off x="576399" y="1508125"/>
+            <a:ext cx="2479810" cy="1792424"/>
+          </a:xfrm>
+          <a:prstGeom prst="rect">
+            <a:avLst/>
+          </a:prstGeom>
+        </p:spPr>
+      </p:pic>
+      <p:pic>
+        <p:nvPicPr>
+          <p:cNvPr id="11" name="Picture 10">
+            <a:extLst>
+              <a:ext uri="{FF2B5EF4-FFF2-40B4-BE49-F238E27FC236}">
+                <a16:creationId xmlns:a16="http://schemas.microsoft.com/office/drawing/2014/main" id="{67A925CC-312F-F4CC-267B-CEED65B97C08}"/>
+              </a:ext>
+            </a:extLst>
+          </p:cNvPr>
+          <p:cNvPicPr>
+            <a:picLocks noChangeAspect="1"/>
+          </p:cNvPicPr>
+          <p:nvPr/>
+        </p:nvPicPr>
+        <p:blipFill>
+          <a:blip r:embed="rId4"/>
+          <a:stretch>
+            <a:fillRect/>
+          </a:stretch>
+        </p:blipFill>
+        <p:spPr>
+          <a:xfrm>
+            <a:off x="3469210" y="1508125"/>
+            <a:ext cx="2479810" cy="1792424"/>
+          </a:xfrm>
+          <a:prstGeom prst="rect">
+            <a:avLst/>
+          </a:prstGeom>
+        </p:spPr>
+      </p:pic>
+      <p:pic>
+        <p:nvPicPr>
+          <p:cNvPr id="12" name="Picture 11">
+            <a:extLst>
+              <a:ext uri="{FF2B5EF4-FFF2-40B4-BE49-F238E27FC236}">
+                <a16:creationId xmlns:a16="http://schemas.microsoft.com/office/drawing/2014/main" id="{DBEC50F9-4CF2-2471-945F-E16B1DD8EB55}"/>
+              </a:ext>
+            </a:extLst>
+          </p:cNvPr>
+          <p:cNvPicPr>
+            <a:picLocks noChangeAspect="1"/>
+          </p:cNvPicPr>
+          <p:nvPr/>
+        </p:nvPicPr>
+        <p:blipFill>
+          <a:blip r:embed="rId5"/>
+          <a:stretch>
+            <a:fillRect/>
+          </a:stretch>
+        </p:blipFill>
+        <p:spPr>
+          <a:xfrm>
+            <a:off x="6443451" y="1508123"/>
+            <a:ext cx="2479810" cy="1792425"/>
+          </a:xfrm>
+          <a:prstGeom prst="rect">
+            <a:avLst/>
+          </a:prstGeom>
+        </p:spPr>
+      </p:pic>
+      <p:pic>
+        <p:nvPicPr>
+          <p:cNvPr id="13" name="Picture 12">
+            <a:extLst>
+              <a:ext uri="{FF2B5EF4-FFF2-40B4-BE49-F238E27FC236}">
+                <a16:creationId xmlns:a16="http://schemas.microsoft.com/office/drawing/2014/main" id="{45A1BB20-EB7E-ABEF-5CA9-EACBDBDD7774}"/>
+              </a:ext>
+            </a:extLst>
+          </p:cNvPr>
+          <p:cNvPicPr>
+            <a:picLocks noChangeAspect="1"/>
+          </p:cNvPicPr>
+          <p:nvPr/>
+        </p:nvPicPr>
+        <p:blipFill>
+          <a:blip r:embed="rId6"/>
+          <a:stretch>
+            <a:fillRect/>
+          </a:stretch>
+        </p:blipFill>
+        <p:spPr>
+          <a:xfrm>
+            <a:off x="576399" y="3557452"/>
+            <a:ext cx="2479810" cy="1792423"/>
+          </a:xfrm>
+          <a:prstGeom prst="rect">
+            <a:avLst/>
+          </a:prstGeom>
+        </p:spPr>
+      </p:pic>
+      <p:pic>
+        <p:nvPicPr>
+          <p:cNvPr id="14" name="Picture 13">
+            <a:extLst>
+              <a:ext uri="{FF2B5EF4-FFF2-40B4-BE49-F238E27FC236}">
+                <a16:creationId xmlns:a16="http://schemas.microsoft.com/office/drawing/2014/main" id="{FC768EEE-3476-64D1-6828-EB0FDFCB7A6E}"/>
+              </a:ext>
+            </a:extLst>
+          </p:cNvPr>
+          <p:cNvPicPr>
+            <a:picLocks noChangeAspect="1"/>
+          </p:cNvPicPr>
+          <p:nvPr/>
+        </p:nvPicPr>
+        <p:blipFill>
+          <a:blip r:embed="rId7"/>
+          <a:stretch>
+            <a:fillRect/>
+          </a:stretch>
+        </p:blipFill>
+        <p:spPr>
+          <a:xfrm>
+            <a:off x="3501515" y="3557452"/>
+            <a:ext cx="2594485" cy="1792423"/>
+          </a:xfrm>
+          <a:prstGeom prst="rect">
+            <a:avLst/>
+          </a:prstGeom>
+        </p:spPr>
+      </p:pic>
+      <p:pic>
+        <p:nvPicPr>
+          <p:cNvPr id="15" name="Picture 14">
+            <a:extLst>
+              <a:ext uri="{FF2B5EF4-FFF2-40B4-BE49-F238E27FC236}">
+                <a16:creationId xmlns:a16="http://schemas.microsoft.com/office/drawing/2014/main" id="{E919E861-28FC-F876-8B03-0DA9C7A89622}"/>
+              </a:ext>
+            </a:extLst>
+          </p:cNvPr>
+          <p:cNvPicPr>
+            <a:picLocks noChangeAspect="1"/>
+          </p:cNvPicPr>
+          <p:nvPr/>
+        </p:nvPicPr>
+        <p:blipFill>
+          <a:blip r:embed="rId8"/>
+          <a:stretch>
+            <a:fillRect/>
+          </a:stretch>
+        </p:blipFill>
+        <p:spPr>
+          <a:xfrm>
+            <a:off x="6443451" y="3557452"/>
+            <a:ext cx="2479810" cy="1792423"/>
+          </a:xfrm>
+          <a:prstGeom prst="rect">
+            <a:avLst/>
+          </a:prstGeom>
+        </p:spPr>
+      </p:pic>
+      <p:sp>
+        <p:nvSpPr>
+          <p:cNvPr id="16" name="TextBox 15">
+            <a:extLst>
+              <a:ext uri="{FF2B5EF4-FFF2-40B4-BE49-F238E27FC236}">
+                <a16:creationId xmlns:a16="http://schemas.microsoft.com/office/drawing/2014/main" id="{98AC38E5-C3A2-8C35-7F7B-DB88A6023153}"/>
+              </a:ext>
+            </a:extLst>
+          </p:cNvPr>
+          <p:cNvSpPr txBox="1"/>
+          <p:nvPr/>
+        </p:nvSpPr>
+        <p:spPr>
+          <a:xfrm>
+            <a:off x="9437688" y="1023042"/>
+            <a:ext cx="2305262" cy="3970318"/>
+          </a:xfrm>
+          <a:prstGeom prst="rect">
+            <a:avLst/>
+          </a:prstGeom>
+          <a:noFill/>
+        </p:spPr>
+        <p:txBody>
+          <a:bodyPr wrap="square" rtlCol="0">
+            <a:spAutoFit/>
+          </a:bodyPr>
+          <a:lstStyle/>
+          <a:p>
+            <a:pPr marL="342900" indent="-342900">
+              <a:buAutoNum type="arabicPeriod"/>
+            </a:pPr>
+            <a:r>
+              <a:rPr lang="en-US" dirty="0"/>
+              <a:t>Univariate analysis is the analysis of columns </a:t>
+            </a:r>
+            <a:r>
+              <a:rPr lang="en-US"/>
+              <a:t>in isolation.</a:t>
+            </a:r>
+          </a:p>
+          <a:p>
+            <a:pPr marL="342900" indent="-342900">
+              <a:buAutoNum type="arabicPeriod"/>
+            </a:pPr>
+            <a:r>
+              <a:rPr lang="en-US" dirty="0"/>
+              <a:t>Univariate analysis of all the columns revealed that there are values that are significantly higher in specific columns.</a:t>
+            </a:r>
+          </a:p>
+        </p:txBody>
+      </p:sp>
     </p:spTree>
     <p:extLst>
       <p:ext uri="{BB962C8B-B14F-4D97-AF65-F5344CB8AC3E}">
@@ -40097,6 +40526,724 @@
 </file>
 
 <file path=ppt/slides/slide7.xml><?xml version="1.0" encoding="utf-8"?>
+<p:sld xmlns:a="http://schemas.openxmlformats.org/drawingml/2006/main" xmlns:r="http://schemas.openxmlformats.org/officeDocument/2006/relationships" xmlns:p="http://schemas.openxmlformats.org/presentationml/2006/main">
+  <p:cSld>
+    <p:spTree>
+      <p:nvGrpSpPr>
+        <p:cNvPr id="1" name=""/>
+        <p:cNvGrpSpPr/>
+        <p:nvPr/>
+      </p:nvGrpSpPr>
+      <p:grpSpPr>
+        <a:xfrm>
+          <a:off x="0" y="0"/>
+          <a:ext cx="0" cy="0"/>
+          <a:chOff x="0" y="0"/>
+          <a:chExt cx="0" cy="0"/>
+        </a:xfrm>
+      </p:grpSpPr>
+      <p:sp>
+        <p:nvSpPr>
+          <p:cNvPr id="2" name="Title 1">
+            <a:extLst>
+              <a:ext uri="{FF2B5EF4-FFF2-40B4-BE49-F238E27FC236}">
+                <a16:creationId xmlns:a16="http://schemas.microsoft.com/office/drawing/2014/main" id="{D543047E-FBFD-4F79-BCA5-10E69740F030}"/>
+              </a:ext>
+            </a:extLst>
+          </p:cNvPr>
+          <p:cNvSpPr>
+            <a:spLocks noGrp="1"/>
+          </p:cNvSpPr>
+          <p:nvPr>
+            <p:ph type="title"/>
+          </p:nvPr>
+        </p:nvSpPr>
+        <p:spPr>
+          <a:xfrm>
+            <a:off x="989400" y="395289"/>
+            <a:ext cx="10213200" cy="627753"/>
+          </a:xfrm>
+        </p:spPr>
+        <p:txBody>
+          <a:bodyPr rtlCol="0"/>
+          <a:lstStyle/>
+          <a:p>
+            <a:pPr rtl="0"/>
+            <a:r>
+              <a:rPr lang="en-GB" dirty="0"/>
+              <a:t>Univariate analysis of some of the columns</a:t>
+            </a:r>
+          </a:p>
+        </p:txBody>
+      </p:sp>
+      <p:sp>
+        <p:nvSpPr>
+          <p:cNvPr id="8" name="Date Placeholder 47">
+            <a:extLst>
+              <a:ext uri="{FF2B5EF4-FFF2-40B4-BE49-F238E27FC236}">
+                <a16:creationId xmlns:a16="http://schemas.microsoft.com/office/drawing/2014/main" id="{A2B22992-A9A5-438D-A3A8-280E5195CE39}"/>
+              </a:ext>
+            </a:extLst>
+          </p:cNvPr>
+          <p:cNvSpPr>
+            <a:spLocks noGrp="1"/>
+          </p:cNvSpPr>
+          <p:nvPr>
+            <p:ph type="dt" sz="half" idx="10"/>
+          </p:nvPr>
+        </p:nvSpPr>
+        <p:spPr>
+          <a:xfrm>
+            <a:off x="450000" y="6357168"/>
+            <a:ext cx="1760150" cy="461665"/>
+          </a:xfrm>
+        </p:spPr>
+        <p:txBody>
+          <a:bodyPr rtlCol="0"/>
+          <a:lstStyle/>
+          <a:p>
+            <a:pPr rtl="0"/>
+            <a:r>
+              <a:rPr lang="en-GB" dirty="0"/>
+              <a:t>20XX</a:t>
+            </a:r>
+          </a:p>
+        </p:txBody>
+      </p:sp>
+      <p:sp>
+        <p:nvSpPr>
+          <p:cNvPr id="9" name="Footer Placeholder 48">
+            <a:extLst>
+              <a:ext uri="{FF2B5EF4-FFF2-40B4-BE49-F238E27FC236}">
+                <a16:creationId xmlns:a16="http://schemas.microsoft.com/office/drawing/2014/main" id="{FF30B247-9087-4CF4-BC45-E112B9D45B37}"/>
+              </a:ext>
+            </a:extLst>
+          </p:cNvPr>
+          <p:cNvSpPr>
+            <a:spLocks noGrp="1"/>
+          </p:cNvSpPr>
+          <p:nvPr>
+            <p:ph type="ftr" sz="quarter" idx="11"/>
+          </p:nvPr>
+        </p:nvSpPr>
+        <p:spPr>
+          <a:xfrm>
+            <a:off x="2754312" y="6357600"/>
+            <a:ext cx="6683376" cy="460800"/>
+          </a:xfrm>
+        </p:spPr>
+        <p:txBody>
+          <a:bodyPr rtlCol="0"/>
+          <a:lstStyle/>
+          <a:p>
+            <a:pPr rtl="0"/>
+            <a:r>
+              <a:rPr lang="en-GB" dirty="0"/>
+              <a:t>Sample Footer Text</a:t>
+            </a:r>
+          </a:p>
+        </p:txBody>
+      </p:sp>
+      <p:sp>
+        <p:nvSpPr>
+          <p:cNvPr id="10" name="Slide Number Placeholder 49">
+            <a:extLst>
+              <a:ext uri="{FF2B5EF4-FFF2-40B4-BE49-F238E27FC236}">
+                <a16:creationId xmlns:a16="http://schemas.microsoft.com/office/drawing/2014/main" id="{01A08221-B499-4596-AFD9-5C9812459168}"/>
+              </a:ext>
+            </a:extLst>
+          </p:cNvPr>
+          <p:cNvSpPr>
+            <a:spLocks noGrp="1"/>
+          </p:cNvSpPr>
+          <p:nvPr>
+            <p:ph type="sldNum" sz="quarter" idx="12"/>
+          </p:nvPr>
+        </p:nvSpPr>
+        <p:spPr>
+          <a:xfrm>
+            <a:off x="9982800" y="6357600"/>
+            <a:ext cx="1760150" cy="460800"/>
+          </a:xfrm>
+        </p:spPr>
+        <p:txBody>
+          <a:bodyPr rtlCol="0"/>
+          <a:lstStyle/>
+          <a:p>
+            <a:pPr rtl="0"/>
+            <a:fld id="{D39607A7-8386-47DB-8578-DDEDD194E5D4}" type="slidenum">
+              <a:rPr lang="en-GB" smtClean="0"/>
+              <a:pPr rtl="0"/>
+              <a:t>7</a:t>
+            </a:fld>
+            <a:endParaRPr lang="en-GB" dirty="0"/>
+          </a:p>
+        </p:txBody>
+      </p:sp>
+      <p:sp>
+        <p:nvSpPr>
+          <p:cNvPr id="16" name="TextBox 15">
+            <a:extLst>
+              <a:ext uri="{FF2B5EF4-FFF2-40B4-BE49-F238E27FC236}">
+                <a16:creationId xmlns:a16="http://schemas.microsoft.com/office/drawing/2014/main" id="{98AC38E5-C3A2-8C35-7F7B-DB88A6023153}"/>
+              </a:ext>
+            </a:extLst>
+          </p:cNvPr>
+          <p:cNvSpPr txBox="1"/>
+          <p:nvPr/>
+        </p:nvSpPr>
+        <p:spPr>
+          <a:xfrm>
+            <a:off x="989400" y="1023042"/>
+            <a:ext cx="10638156" cy="3970318"/>
+          </a:xfrm>
+          <a:prstGeom prst="rect">
+            <a:avLst/>
+          </a:prstGeom>
+          <a:noFill/>
+        </p:spPr>
+        <p:txBody>
+          <a:bodyPr wrap="square" rtlCol="0">
+            <a:spAutoFit/>
+          </a:bodyPr>
+          <a:lstStyle/>
+          <a:p>
+            <a:pPr marL="342900" indent="-342900">
+              <a:buAutoNum type="arabicPeriod"/>
+            </a:pPr>
+            <a:r>
+              <a:rPr lang="en-US" dirty="0"/>
+              <a:t>The univariate analysis revealed interesting insights between the following columns.</a:t>
+            </a:r>
+          </a:p>
+          <a:p>
+            <a:pPr marL="800100" lvl="1" indent="-342900">
+              <a:buAutoNum type="alphaLcPeriod"/>
+            </a:pPr>
+            <a:r>
+              <a:rPr lang="en-US" dirty="0"/>
+              <a:t>Interest rate ( min – 5.42, max – 24.59, heavier above mean )</a:t>
+            </a:r>
+          </a:p>
+          <a:p>
+            <a:pPr marL="800100" lvl="1" indent="-342900">
+              <a:buAutoNum type="alphaLcPeriod"/>
+            </a:pPr>
+            <a:r>
+              <a:rPr lang="en-US" dirty="0"/>
+              <a:t>Grade ( A to G )</a:t>
+            </a:r>
+          </a:p>
+          <a:p>
+            <a:pPr marL="800100" lvl="1" indent="-342900">
+              <a:buAutoNum type="alphaLcPeriod"/>
+            </a:pPr>
+            <a:r>
+              <a:rPr lang="en-US" dirty="0"/>
+              <a:t>sub grade ( Again subgrade by numbers )</a:t>
+            </a:r>
+          </a:p>
+          <a:p>
+            <a:pPr marL="800100" lvl="1" indent="-342900">
+              <a:buAutoNum type="alphaLcPeriod"/>
+            </a:pPr>
+            <a:r>
+              <a:rPr lang="en-US" dirty="0"/>
+              <a:t>income source verification status ( Not verified, verified, Source Verified )</a:t>
+            </a:r>
+          </a:p>
+          <a:p>
+            <a:pPr marL="800100" lvl="1" indent="-342900">
+              <a:buAutoNum type="alphaLcPeriod"/>
+            </a:pPr>
+            <a:r>
+              <a:rPr lang="en-US" dirty="0"/>
+              <a:t>Loan purpose ( debt –consolidation – higher, credit card and other – medium, renewable –lower )</a:t>
+            </a:r>
+          </a:p>
+          <a:p>
+            <a:pPr marL="800100" lvl="1" indent="-342900">
+              <a:buAutoNum type="alphaLcPeriod"/>
+            </a:pPr>
+            <a:r>
+              <a:rPr lang="en-US" dirty="0"/>
+              <a:t>Loan status ( Fully Paid, Current and Charged Off – needed for segmented and bivariate )</a:t>
+            </a:r>
+          </a:p>
+          <a:p>
+            <a:pPr marL="800100" lvl="1" indent="-342900">
+              <a:buAutoNum type="alphaLcPeriod"/>
+            </a:pPr>
+            <a:r>
+              <a:rPr lang="en-US" dirty="0"/>
+              <a:t>Employment length in years ( Values between 0 to 10+ years, most loans given at 4 years )</a:t>
+            </a:r>
+          </a:p>
+          <a:p>
+            <a:pPr marL="800100" lvl="1" indent="-342900">
+              <a:buAutoNum type="alphaLcPeriod"/>
+            </a:pPr>
+            <a:r>
+              <a:rPr lang="en-US" dirty="0"/>
+              <a:t>Home ownership ( Most values for Rent, Mortgage driving the ownership )</a:t>
+            </a:r>
+          </a:p>
+          <a:p>
+            <a:pPr marL="800100" lvl="1" indent="-342900">
+              <a:buAutoNum type="alphaLcPeriod"/>
+            </a:pPr>
+            <a:r>
+              <a:rPr lang="en-US" dirty="0"/>
+              <a:t>Debt to Income Ratio ( Most of the values above the mean value )</a:t>
+            </a:r>
+          </a:p>
+          <a:p>
+            <a:r>
+              <a:rPr lang="en-US" dirty="0"/>
+              <a:t>2. These are some of the values among other values that we did analysis on using </a:t>
+            </a:r>
+          </a:p>
+          <a:p>
+            <a:r>
+              <a:rPr lang="en-US" dirty="0"/>
+              <a:t>	</a:t>
+            </a:r>
+            <a:r>
+              <a:rPr lang="en-US" dirty="0" err="1"/>
+              <a:t>DataFrame.describe</a:t>
+            </a:r>
+            <a:r>
+              <a:rPr lang="en-US" dirty="0"/>
+              <a:t>() which can found in the </a:t>
+            </a:r>
+            <a:r>
+              <a:rPr lang="en-US" dirty="0" err="1"/>
+              <a:t>jupyter</a:t>
+            </a:r>
+            <a:r>
+              <a:rPr lang="en-US" dirty="0"/>
+              <a:t> notebook</a:t>
+            </a:r>
+          </a:p>
+          <a:p>
+            <a:pPr marL="800100" lvl="1" indent="-342900">
+              <a:buAutoNum type="alphaLcPeriod"/>
+            </a:pPr>
+            <a:endParaRPr lang="en-US" dirty="0"/>
+          </a:p>
+        </p:txBody>
+      </p:sp>
+      <p:pic>
+        <p:nvPicPr>
+          <p:cNvPr id="7" name="Picture 6" descr="A screenshot of a computer screen&#10;&#10;Description automatically generated with low confidence">
+            <a:extLst>
+              <a:ext uri="{FF2B5EF4-FFF2-40B4-BE49-F238E27FC236}">
+                <a16:creationId xmlns:a16="http://schemas.microsoft.com/office/drawing/2014/main" id="{13B34DDA-2A91-47C6-74FC-0944FC17D1A4}"/>
+              </a:ext>
+            </a:extLst>
+          </p:cNvPr>
+          <p:cNvPicPr>
+            <a:picLocks noChangeAspect="1"/>
+          </p:cNvPicPr>
+          <p:nvPr/>
+        </p:nvPicPr>
+        <p:blipFill>
+          <a:blip r:embed="rId3"/>
+          <a:stretch>
+            <a:fillRect/>
+          </a:stretch>
+        </p:blipFill>
+        <p:spPr>
+          <a:xfrm>
+            <a:off x="989400" y="4877168"/>
+            <a:ext cx="10638156" cy="1585543"/>
+          </a:xfrm>
+          <a:prstGeom prst="rect">
+            <a:avLst/>
+          </a:prstGeom>
+        </p:spPr>
+      </p:pic>
+    </p:spTree>
+    <p:extLst>
+      <p:ext uri="{BB962C8B-B14F-4D97-AF65-F5344CB8AC3E}">
+        <p14:creationId xmlns:p14="http://schemas.microsoft.com/office/powerpoint/2010/main" val="43180716"/>
+      </p:ext>
+    </p:extLst>
+  </p:cSld>
+  <p:clrMapOvr>
+    <a:masterClrMapping/>
+  </p:clrMapOvr>
+</p:sld>
+</file>
+
+<file path=ppt/slides/slide8.xml><?xml version="1.0" encoding="utf-8"?>
+<p:sld xmlns:a="http://schemas.openxmlformats.org/drawingml/2006/main" xmlns:r="http://schemas.openxmlformats.org/officeDocument/2006/relationships" xmlns:p="http://schemas.openxmlformats.org/presentationml/2006/main">
+  <p:cSld>
+    <p:spTree>
+      <p:nvGrpSpPr>
+        <p:cNvPr id="1" name=""/>
+        <p:cNvGrpSpPr/>
+        <p:nvPr/>
+      </p:nvGrpSpPr>
+      <p:grpSpPr>
+        <a:xfrm>
+          <a:off x="0" y="0"/>
+          <a:ext cx="0" cy="0"/>
+          <a:chOff x="0" y="0"/>
+          <a:chExt cx="0" cy="0"/>
+        </a:xfrm>
+      </p:grpSpPr>
+      <p:sp>
+        <p:nvSpPr>
+          <p:cNvPr id="2" name="Title 1">
+            <a:extLst>
+              <a:ext uri="{FF2B5EF4-FFF2-40B4-BE49-F238E27FC236}">
+                <a16:creationId xmlns:a16="http://schemas.microsoft.com/office/drawing/2014/main" id="{D543047E-FBFD-4F79-BCA5-10E69740F030}"/>
+              </a:ext>
+            </a:extLst>
+          </p:cNvPr>
+          <p:cNvSpPr>
+            <a:spLocks noGrp="1"/>
+          </p:cNvSpPr>
+          <p:nvPr>
+            <p:ph type="title"/>
+          </p:nvPr>
+        </p:nvSpPr>
+        <p:spPr>
+          <a:xfrm>
+            <a:off x="989400" y="395289"/>
+            <a:ext cx="10213200" cy="627753"/>
+          </a:xfrm>
+        </p:spPr>
+        <p:txBody>
+          <a:bodyPr rtlCol="0"/>
+          <a:lstStyle/>
+          <a:p>
+            <a:pPr rtl="0"/>
+            <a:r>
+              <a:rPr lang="en-GB" dirty="0"/>
+              <a:t>Univariate segmented analysis of some of the columns</a:t>
+            </a:r>
+          </a:p>
+        </p:txBody>
+      </p:sp>
+      <p:sp>
+        <p:nvSpPr>
+          <p:cNvPr id="8" name="Date Placeholder 47">
+            <a:extLst>
+              <a:ext uri="{FF2B5EF4-FFF2-40B4-BE49-F238E27FC236}">
+                <a16:creationId xmlns:a16="http://schemas.microsoft.com/office/drawing/2014/main" id="{A2B22992-A9A5-438D-A3A8-280E5195CE39}"/>
+              </a:ext>
+            </a:extLst>
+          </p:cNvPr>
+          <p:cNvSpPr>
+            <a:spLocks noGrp="1"/>
+          </p:cNvSpPr>
+          <p:nvPr>
+            <p:ph type="dt" sz="half" idx="10"/>
+          </p:nvPr>
+        </p:nvSpPr>
+        <p:spPr>
+          <a:xfrm>
+            <a:off x="450000" y="6357168"/>
+            <a:ext cx="1760150" cy="461665"/>
+          </a:xfrm>
+        </p:spPr>
+        <p:txBody>
+          <a:bodyPr rtlCol="0"/>
+          <a:lstStyle/>
+          <a:p>
+            <a:pPr rtl="0"/>
+            <a:r>
+              <a:rPr lang="en-GB" dirty="0"/>
+              <a:t>20XX</a:t>
+            </a:r>
+          </a:p>
+        </p:txBody>
+      </p:sp>
+      <p:sp>
+        <p:nvSpPr>
+          <p:cNvPr id="9" name="Footer Placeholder 48">
+            <a:extLst>
+              <a:ext uri="{FF2B5EF4-FFF2-40B4-BE49-F238E27FC236}">
+                <a16:creationId xmlns:a16="http://schemas.microsoft.com/office/drawing/2014/main" id="{FF30B247-9087-4CF4-BC45-E112B9D45B37}"/>
+              </a:ext>
+            </a:extLst>
+          </p:cNvPr>
+          <p:cNvSpPr>
+            <a:spLocks noGrp="1"/>
+          </p:cNvSpPr>
+          <p:nvPr>
+            <p:ph type="ftr" sz="quarter" idx="11"/>
+          </p:nvPr>
+        </p:nvSpPr>
+        <p:spPr>
+          <a:xfrm>
+            <a:off x="2754312" y="6357600"/>
+            <a:ext cx="6683376" cy="460800"/>
+          </a:xfrm>
+        </p:spPr>
+        <p:txBody>
+          <a:bodyPr rtlCol="0"/>
+          <a:lstStyle/>
+          <a:p>
+            <a:pPr rtl="0"/>
+            <a:r>
+              <a:rPr lang="en-GB" dirty="0"/>
+              <a:t>Sample Footer Text</a:t>
+            </a:r>
+          </a:p>
+        </p:txBody>
+      </p:sp>
+      <p:sp>
+        <p:nvSpPr>
+          <p:cNvPr id="10" name="Slide Number Placeholder 49">
+            <a:extLst>
+              <a:ext uri="{FF2B5EF4-FFF2-40B4-BE49-F238E27FC236}">
+                <a16:creationId xmlns:a16="http://schemas.microsoft.com/office/drawing/2014/main" id="{01A08221-B499-4596-AFD9-5C9812459168}"/>
+              </a:ext>
+            </a:extLst>
+          </p:cNvPr>
+          <p:cNvSpPr>
+            <a:spLocks noGrp="1"/>
+          </p:cNvSpPr>
+          <p:nvPr>
+            <p:ph type="sldNum" sz="quarter" idx="12"/>
+          </p:nvPr>
+        </p:nvSpPr>
+        <p:spPr>
+          <a:xfrm>
+            <a:off x="9982800" y="6357600"/>
+            <a:ext cx="1760150" cy="460800"/>
+          </a:xfrm>
+        </p:spPr>
+        <p:txBody>
+          <a:bodyPr rtlCol="0"/>
+          <a:lstStyle/>
+          <a:p>
+            <a:pPr rtl="0"/>
+            <a:fld id="{D39607A7-8386-47DB-8578-DDEDD194E5D4}" type="slidenum">
+              <a:rPr lang="en-GB" smtClean="0"/>
+              <a:pPr rtl="0"/>
+              <a:t>8</a:t>
+            </a:fld>
+            <a:endParaRPr lang="en-GB" dirty="0"/>
+          </a:p>
+        </p:txBody>
+      </p:sp>
+      <p:sp>
+        <p:nvSpPr>
+          <p:cNvPr id="16" name="TextBox 15">
+            <a:extLst>
+              <a:ext uri="{FF2B5EF4-FFF2-40B4-BE49-F238E27FC236}">
+                <a16:creationId xmlns:a16="http://schemas.microsoft.com/office/drawing/2014/main" id="{98AC38E5-C3A2-8C35-7F7B-DB88A6023153}"/>
+              </a:ext>
+            </a:extLst>
+          </p:cNvPr>
+          <p:cNvSpPr txBox="1"/>
+          <p:nvPr/>
+        </p:nvSpPr>
+        <p:spPr>
+          <a:xfrm>
+            <a:off x="9437688" y="1508122"/>
+            <a:ext cx="2305262" cy="4524315"/>
+          </a:xfrm>
+          <a:prstGeom prst="rect">
+            <a:avLst/>
+          </a:prstGeom>
+          <a:noFill/>
+        </p:spPr>
+        <p:txBody>
+          <a:bodyPr wrap="square" rtlCol="0">
+            <a:spAutoFit/>
+          </a:bodyPr>
+          <a:lstStyle/>
+          <a:p>
+            <a:pPr marL="285750" indent="-285750">
+              <a:buFont typeface="Arial" panose="020B0604020202020204" pitchFamily="34" charset="0"/>
+              <a:buChar char="•"/>
+            </a:pPr>
+            <a:r>
+              <a:rPr lang="en-US" dirty="0"/>
+              <a:t>Segmented univariate analysis is trying to establish a relationship between a single column and another column while segmenting it.</a:t>
+            </a:r>
+          </a:p>
+          <a:p>
+            <a:pPr marL="285750" indent="-285750">
+              <a:buFont typeface="Arial" panose="020B0604020202020204" pitchFamily="34" charset="0"/>
+              <a:buChar char="•"/>
+            </a:pPr>
+            <a:r>
+              <a:rPr lang="en-US" dirty="0"/>
+              <a:t>We have given some relationships that are established between columns</a:t>
+            </a:r>
+          </a:p>
+        </p:txBody>
+      </p:sp>
+      <p:pic>
+        <p:nvPicPr>
+          <p:cNvPr id="6" name="Picture 5">
+            <a:extLst>
+              <a:ext uri="{FF2B5EF4-FFF2-40B4-BE49-F238E27FC236}">
+                <a16:creationId xmlns:a16="http://schemas.microsoft.com/office/drawing/2014/main" id="{F5CBB311-6D7C-72FD-B993-1FC883EEEBCF}"/>
+              </a:ext>
+            </a:extLst>
+          </p:cNvPr>
+          <p:cNvPicPr>
+            <a:picLocks noChangeAspect="1"/>
+          </p:cNvPicPr>
+          <p:nvPr/>
+        </p:nvPicPr>
+        <p:blipFill>
+          <a:blip r:embed="rId3"/>
+          <a:stretch>
+            <a:fillRect/>
+          </a:stretch>
+        </p:blipFill>
+        <p:spPr>
+          <a:xfrm>
+            <a:off x="576399" y="1508123"/>
+            <a:ext cx="2479810" cy="1792425"/>
+          </a:xfrm>
+          <a:prstGeom prst="rect">
+            <a:avLst/>
+          </a:prstGeom>
+        </p:spPr>
+      </p:pic>
+      <p:pic>
+        <p:nvPicPr>
+          <p:cNvPr id="7" name="Picture 6">
+            <a:extLst>
+              <a:ext uri="{FF2B5EF4-FFF2-40B4-BE49-F238E27FC236}">
+                <a16:creationId xmlns:a16="http://schemas.microsoft.com/office/drawing/2014/main" id="{3F86DF74-2757-FF0A-DD2E-5E614837D27E}"/>
+              </a:ext>
+            </a:extLst>
+          </p:cNvPr>
+          <p:cNvPicPr>
+            <a:picLocks noChangeAspect="1"/>
+          </p:cNvPicPr>
+          <p:nvPr/>
+        </p:nvPicPr>
+        <p:blipFill>
+          <a:blip r:embed="rId4"/>
+          <a:stretch>
+            <a:fillRect/>
+          </a:stretch>
+        </p:blipFill>
+        <p:spPr>
+          <a:xfrm>
+            <a:off x="3501514" y="1508122"/>
+            <a:ext cx="2594485" cy="1733587"/>
+          </a:xfrm>
+          <a:prstGeom prst="rect">
+            <a:avLst/>
+          </a:prstGeom>
+        </p:spPr>
+      </p:pic>
+      <p:pic>
+        <p:nvPicPr>
+          <p:cNvPr id="18" name="Picture 17" descr="A screenshot of a graph&#10;&#10;Description automatically generated with low confidence">
+            <a:extLst>
+              <a:ext uri="{FF2B5EF4-FFF2-40B4-BE49-F238E27FC236}">
+                <a16:creationId xmlns:a16="http://schemas.microsoft.com/office/drawing/2014/main" id="{DC4C1730-C3E3-BCA1-7C1A-DE2B4CA64F6C}"/>
+              </a:ext>
+            </a:extLst>
+          </p:cNvPr>
+          <p:cNvPicPr>
+            <a:picLocks noChangeAspect="1"/>
+          </p:cNvPicPr>
+          <p:nvPr/>
+        </p:nvPicPr>
+        <p:blipFill>
+          <a:blip r:embed="rId5"/>
+          <a:stretch>
+            <a:fillRect/>
+          </a:stretch>
+        </p:blipFill>
+        <p:spPr>
+          <a:xfrm>
+            <a:off x="572838" y="3557452"/>
+            <a:ext cx="5523161" cy="1792422"/>
+          </a:xfrm>
+          <a:prstGeom prst="rect">
+            <a:avLst/>
+          </a:prstGeom>
+        </p:spPr>
+      </p:pic>
+      <p:pic>
+        <p:nvPicPr>
+          <p:cNvPr id="19" name="Picture 18">
+            <a:extLst>
+              <a:ext uri="{FF2B5EF4-FFF2-40B4-BE49-F238E27FC236}">
+                <a16:creationId xmlns:a16="http://schemas.microsoft.com/office/drawing/2014/main" id="{C25A72D5-FF84-6D2A-7D89-8A78E7A29106}"/>
+              </a:ext>
+            </a:extLst>
+          </p:cNvPr>
+          <p:cNvPicPr>
+            <a:picLocks noChangeAspect="1"/>
+          </p:cNvPicPr>
+          <p:nvPr/>
+        </p:nvPicPr>
+        <p:blipFill>
+          <a:blip r:embed="rId6"/>
+          <a:stretch>
+            <a:fillRect/>
+          </a:stretch>
+        </p:blipFill>
+        <p:spPr>
+          <a:xfrm>
+            <a:off x="6443451" y="1508122"/>
+            <a:ext cx="2479810" cy="1735454"/>
+          </a:xfrm>
+          <a:prstGeom prst="rect">
+            <a:avLst/>
+          </a:prstGeom>
+        </p:spPr>
+      </p:pic>
+      <p:pic>
+        <p:nvPicPr>
+          <p:cNvPr id="21" name="Picture 20">
+            <a:extLst>
+              <a:ext uri="{FF2B5EF4-FFF2-40B4-BE49-F238E27FC236}">
+                <a16:creationId xmlns:a16="http://schemas.microsoft.com/office/drawing/2014/main" id="{99A0764E-00DF-6F0B-208F-3574B93775D3}"/>
+              </a:ext>
+            </a:extLst>
+          </p:cNvPr>
+          <p:cNvPicPr>
+            <a:picLocks noChangeAspect="1"/>
+          </p:cNvPicPr>
+          <p:nvPr/>
+        </p:nvPicPr>
+        <p:blipFill>
+          <a:blip r:embed="rId7"/>
+          <a:stretch>
+            <a:fillRect/>
+          </a:stretch>
+        </p:blipFill>
+        <p:spPr>
+          <a:xfrm>
+            <a:off x="6443451" y="3547839"/>
+            <a:ext cx="2479810" cy="1792422"/>
+          </a:xfrm>
+          <a:prstGeom prst="rect">
+            <a:avLst/>
+          </a:prstGeom>
+        </p:spPr>
+      </p:pic>
+    </p:spTree>
+    <p:extLst>
+      <p:ext uri="{BB962C8B-B14F-4D97-AF65-F5344CB8AC3E}">
+        <p14:creationId xmlns:p14="http://schemas.microsoft.com/office/powerpoint/2010/main" val="559115980"/>
+      </p:ext>
+    </p:extLst>
+  </p:cSld>
+  <p:clrMapOvr>
+    <a:masterClrMapping/>
+  </p:clrMapOvr>
+</p:sld>
+</file>
+
+<file path=ppt/slides/slide9.xml><?xml version="1.0" encoding="utf-8"?>
 <p:sld xmlns:a="http://schemas.openxmlformats.org/drawingml/2006/main" xmlns:r="http://schemas.openxmlformats.org/officeDocument/2006/relationships" xmlns:p="http://schemas.openxmlformats.org/presentationml/2006/main">
   <p:cSld>
     <p:spTree>
@@ -40323,883 +41470,6 @@
     <p:extLst>
       <p:ext uri="{BB962C8B-B14F-4D97-AF65-F5344CB8AC3E}">
         <p14:creationId xmlns:p14="http://schemas.microsoft.com/office/powerpoint/2010/main" val="962321713"/>
-      </p:ext>
-    </p:extLst>
-  </p:cSld>
-  <p:clrMapOvr>
-    <a:masterClrMapping/>
-  </p:clrMapOvr>
-</p:sld>
-</file>
-
-<file path=ppt/slides/slide8.xml><?xml version="1.0" encoding="utf-8"?>
-<p:sld xmlns:a="http://schemas.openxmlformats.org/drawingml/2006/main" xmlns:r="http://schemas.openxmlformats.org/officeDocument/2006/relationships" xmlns:p="http://schemas.openxmlformats.org/presentationml/2006/main">
-  <p:cSld>
-    <p:spTree>
-      <p:nvGrpSpPr>
-        <p:cNvPr id="1" name=""/>
-        <p:cNvGrpSpPr/>
-        <p:nvPr/>
-      </p:nvGrpSpPr>
-      <p:grpSpPr>
-        <a:xfrm>
-          <a:off x="0" y="0"/>
-          <a:ext cx="0" cy="0"/>
-          <a:chOff x="0" y="0"/>
-          <a:chExt cx="0" cy="0"/>
-        </a:xfrm>
-      </p:grpSpPr>
-      <p:sp>
-        <p:nvSpPr>
-          <p:cNvPr id="46" name="Title 45">
-            <a:extLst>
-              <a:ext uri="{FF2B5EF4-FFF2-40B4-BE49-F238E27FC236}">
-                <a16:creationId xmlns:a16="http://schemas.microsoft.com/office/drawing/2014/main" id="{CD5E908A-501A-4558-A678-42BF2D8FCDC1}"/>
-              </a:ext>
-            </a:extLst>
-          </p:cNvPr>
-          <p:cNvSpPr>
-            <a:spLocks noGrp="1"/>
-          </p:cNvSpPr>
-          <p:nvPr>
-            <p:ph type="title"/>
-          </p:nvPr>
-        </p:nvSpPr>
-        <p:spPr>
-          <a:xfrm>
-            <a:off x="989400" y="395289"/>
-            <a:ext cx="10213200" cy="1112836"/>
-          </a:xfrm>
-        </p:spPr>
-        <p:txBody>
-          <a:bodyPr rtlCol="0"/>
-          <a:lstStyle/>
-          <a:p>
-            <a:pPr rtl="0"/>
-            <a:r>
-              <a:rPr lang="en-GB"/>
-              <a:t>Team</a:t>
-            </a:r>
-          </a:p>
-        </p:txBody>
-      </p:sp>
-      <p:pic>
-        <p:nvPicPr>
-          <p:cNvPr id="25" name="Picture Placeholder 24" descr="A person with blonde hair">
-            <a:extLst>
-              <a:ext uri="{FF2B5EF4-FFF2-40B4-BE49-F238E27FC236}">
-                <a16:creationId xmlns:a16="http://schemas.microsoft.com/office/drawing/2014/main" id="{F1B398D1-2C82-4CDD-9305-CD315832B8F2}"/>
-              </a:ext>
-            </a:extLst>
-          </p:cNvPr>
-          <p:cNvPicPr>
-            <a:picLocks noGrp="1" noChangeAspect="1"/>
-          </p:cNvPicPr>
-          <p:nvPr>
-            <p:ph type="pic" sz="quarter" idx="13"/>
-          </p:nvPr>
-        </p:nvPicPr>
-        <p:blipFill rotWithShape="1">
-          <a:blip r:embed="rId3" cstate="screen">
-            <a:extLst>
-              <a:ext uri="{28A0092B-C50C-407E-A947-70E740481C1C}">
-                <a14:useLocalDpi xmlns:a14="http://schemas.microsoft.com/office/drawing/2010/main" val="0"/>
-              </a:ext>
-            </a:extLst>
-          </a:blip>
-          <a:srcRect/>
-          <a:stretch/>
-        </p:blipFill>
-        <p:spPr>
-          <a:xfrm>
-            <a:off x="1166813" y="2479675"/>
-            <a:ext cx="1587500" cy="2330450"/>
-          </a:xfrm>
-        </p:spPr>
-      </p:pic>
-      <p:pic>
-        <p:nvPicPr>
-          <p:cNvPr id="29" name="Picture Placeholder 28" descr="A person with a beard">
-            <a:extLst>
-              <a:ext uri="{FF2B5EF4-FFF2-40B4-BE49-F238E27FC236}">
-                <a16:creationId xmlns:a16="http://schemas.microsoft.com/office/drawing/2014/main" id="{2623E100-E20A-4D63-877A-8F63331E1677}"/>
-              </a:ext>
-            </a:extLst>
-          </p:cNvPr>
-          <p:cNvPicPr>
-            <a:picLocks noGrp="1" noChangeAspect="1"/>
-          </p:cNvPicPr>
-          <p:nvPr>
-            <p:ph type="pic" sz="quarter" idx="14"/>
-          </p:nvPr>
-        </p:nvPicPr>
-        <p:blipFill rotWithShape="1">
-          <a:blip r:embed="rId4" cstate="screen">
-            <a:extLst>
-              <a:ext uri="{28A0092B-C50C-407E-A947-70E740481C1C}">
-                <a14:useLocalDpi xmlns:a14="http://schemas.microsoft.com/office/drawing/2010/main" val="0"/>
-              </a:ext>
-            </a:extLst>
-          </a:blip>
-          <a:srcRect/>
-          <a:stretch/>
-        </p:blipFill>
-        <p:spPr>
-          <a:xfrm>
-            <a:off x="3228885" y="2479675"/>
-            <a:ext cx="1587500" cy="2330450"/>
-          </a:xfrm>
-        </p:spPr>
-      </p:pic>
-      <p:pic>
-        <p:nvPicPr>
-          <p:cNvPr id="33" name="Picture Placeholder 32" descr="A person wearing glasses">
-            <a:extLst>
-              <a:ext uri="{FF2B5EF4-FFF2-40B4-BE49-F238E27FC236}">
-                <a16:creationId xmlns:a16="http://schemas.microsoft.com/office/drawing/2014/main" id="{D8DDBC01-61F9-424B-BE7C-5E90A2899EF4}"/>
-              </a:ext>
-            </a:extLst>
-          </p:cNvPr>
-          <p:cNvPicPr>
-            <a:picLocks noGrp="1" noChangeAspect="1"/>
-          </p:cNvPicPr>
-          <p:nvPr>
-            <p:ph type="pic" sz="quarter" idx="15"/>
-          </p:nvPr>
-        </p:nvPicPr>
-        <p:blipFill rotWithShape="1">
-          <a:blip r:embed="rId5" cstate="screen">
-            <a:extLst>
-              <a:ext uri="{28A0092B-C50C-407E-A947-70E740481C1C}">
-                <a14:useLocalDpi xmlns:a14="http://schemas.microsoft.com/office/drawing/2010/main" val="0"/>
-              </a:ext>
-            </a:extLst>
-          </a:blip>
-          <a:srcRect/>
-          <a:stretch/>
-        </p:blipFill>
-        <p:spPr>
-          <a:xfrm>
-            <a:off x="5302249" y="2479675"/>
-            <a:ext cx="1587500" cy="2330450"/>
-          </a:xfrm>
-        </p:spPr>
-      </p:pic>
-      <p:pic>
-        <p:nvPicPr>
-          <p:cNvPr id="37" name="Picture Placeholder 36" descr="A person smiling for the camera">
-            <a:extLst>
-              <a:ext uri="{FF2B5EF4-FFF2-40B4-BE49-F238E27FC236}">
-                <a16:creationId xmlns:a16="http://schemas.microsoft.com/office/drawing/2014/main" id="{8A6FA0E8-E6CC-42B0-9698-D8AAF2555869}"/>
-              </a:ext>
-            </a:extLst>
-          </p:cNvPr>
-          <p:cNvPicPr>
-            <a:picLocks noGrp="1" noChangeAspect="1"/>
-          </p:cNvPicPr>
-          <p:nvPr>
-            <p:ph type="pic" sz="quarter" idx="16"/>
-          </p:nvPr>
-        </p:nvPicPr>
-        <p:blipFill rotWithShape="1">
-          <a:blip r:embed="rId6" cstate="screen">
-            <a:extLst>
-              <a:ext uri="{28A0092B-C50C-407E-A947-70E740481C1C}">
-                <a14:useLocalDpi xmlns:a14="http://schemas.microsoft.com/office/drawing/2010/main" val="0"/>
-              </a:ext>
-            </a:extLst>
-          </a:blip>
-          <a:srcRect/>
-          <a:stretch/>
-        </p:blipFill>
-        <p:spPr>
-          <a:xfrm>
-            <a:off x="7364764" y="2479675"/>
-            <a:ext cx="1587500" cy="2330450"/>
-          </a:xfrm>
-        </p:spPr>
-      </p:pic>
-      <p:pic>
-        <p:nvPicPr>
-          <p:cNvPr id="41" name="Picture Placeholder 40" descr="A picture containing person, indoor">
-            <a:extLst>
-              <a:ext uri="{FF2B5EF4-FFF2-40B4-BE49-F238E27FC236}">
-                <a16:creationId xmlns:a16="http://schemas.microsoft.com/office/drawing/2014/main" id="{ADA6917C-333B-412F-9E10-F89646EADCC3}"/>
-              </a:ext>
-            </a:extLst>
-          </p:cNvPr>
-          <p:cNvPicPr>
-            <a:picLocks noGrp="1" noChangeAspect="1"/>
-          </p:cNvPicPr>
-          <p:nvPr>
-            <p:ph type="pic" sz="quarter" idx="17"/>
-          </p:nvPr>
-        </p:nvPicPr>
-        <p:blipFill rotWithShape="1">
-          <a:blip r:embed="rId7" cstate="screen">
-            <a:extLst>
-              <a:ext uri="{28A0092B-C50C-407E-A947-70E740481C1C}">
-                <a14:useLocalDpi xmlns:a14="http://schemas.microsoft.com/office/drawing/2010/main" val="0"/>
-              </a:ext>
-            </a:extLst>
-          </a:blip>
-          <a:srcRect/>
-          <a:stretch/>
-        </p:blipFill>
-        <p:spPr>
-          <a:xfrm>
-            <a:off x="9437688" y="2479675"/>
-            <a:ext cx="1587500" cy="2330450"/>
-          </a:xfrm>
-        </p:spPr>
-      </p:pic>
-      <p:sp>
-        <p:nvSpPr>
-          <p:cNvPr id="54" name="Text Placeholder 53">
-            <a:extLst>
-              <a:ext uri="{FF2B5EF4-FFF2-40B4-BE49-F238E27FC236}">
-                <a16:creationId xmlns:a16="http://schemas.microsoft.com/office/drawing/2014/main" id="{E99206D5-9697-4725-A5A8-879EE5CCE83E}"/>
-              </a:ext>
-            </a:extLst>
-          </p:cNvPr>
-          <p:cNvSpPr>
-            <a:spLocks noGrp="1"/>
-          </p:cNvSpPr>
-          <p:nvPr>
-            <p:ph type="body" sz="quarter" idx="18"/>
-          </p:nvPr>
-        </p:nvSpPr>
-        <p:spPr>
-          <a:xfrm>
-            <a:off x="1166813" y="5094555"/>
-            <a:ext cx="1587499" cy="350292"/>
-          </a:xfrm>
-        </p:spPr>
-        <p:txBody>
-          <a:bodyPr rtlCol="0"/>
-          <a:lstStyle/>
-          <a:p>
-            <a:pPr rtl="0"/>
-            <a:r>
-              <a:rPr lang="en-GB"/>
-              <a:t>Name</a:t>
-            </a:r>
-          </a:p>
-        </p:txBody>
-      </p:sp>
-      <p:sp>
-        <p:nvSpPr>
-          <p:cNvPr id="55" name="Text Placeholder 54">
-            <a:extLst>
-              <a:ext uri="{FF2B5EF4-FFF2-40B4-BE49-F238E27FC236}">
-                <a16:creationId xmlns:a16="http://schemas.microsoft.com/office/drawing/2014/main" id="{4049A65B-9215-4059-9E97-7DF18F57D088}"/>
-              </a:ext>
-            </a:extLst>
-          </p:cNvPr>
-          <p:cNvSpPr>
-            <a:spLocks noGrp="1"/>
-          </p:cNvSpPr>
-          <p:nvPr>
-            <p:ph type="body" sz="quarter" idx="19"/>
-          </p:nvPr>
-        </p:nvSpPr>
-        <p:spPr>
-          <a:xfrm>
-            <a:off x="1166813" y="5371723"/>
-            <a:ext cx="1587499" cy="350292"/>
-          </a:xfrm>
-        </p:spPr>
-        <p:txBody>
-          <a:bodyPr rtlCol="0"/>
-          <a:lstStyle/>
-          <a:p>
-            <a:pPr rtl="0"/>
-            <a:r>
-              <a:rPr lang="en-GB"/>
-              <a:t>Title</a:t>
-            </a:r>
-          </a:p>
-        </p:txBody>
-      </p:sp>
-      <p:sp>
-        <p:nvSpPr>
-          <p:cNvPr id="56" name="Text Placeholder 55">
-            <a:extLst>
-              <a:ext uri="{FF2B5EF4-FFF2-40B4-BE49-F238E27FC236}">
-                <a16:creationId xmlns:a16="http://schemas.microsoft.com/office/drawing/2014/main" id="{FC0A64F4-87E9-46A8-BCC4-6F1DFE8A3E6D}"/>
-              </a:ext>
-            </a:extLst>
-          </p:cNvPr>
-          <p:cNvSpPr>
-            <a:spLocks noGrp="1"/>
-          </p:cNvSpPr>
-          <p:nvPr>
-            <p:ph type="body" sz="quarter" idx="20"/>
-          </p:nvPr>
-        </p:nvSpPr>
-        <p:spPr>
-          <a:xfrm>
-            <a:off x="3228885" y="5094555"/>
-            <a:ext cx="1587499" cy="350292"/>
-          </a:xfrm>
-        </p:spPr>
-        <p:txBody>
-          <a:bodyPr rtlCol="0"/>
-          <a:lstStyle/>
-          <a:p>
-            <a:pPr rtl="0"/>
-            <a:r>
-              <a:rPr lang="en-GB"/>
-              <a:t>Name</a:t>
-            </a:r>
-          </a:p>
-        </p:txBody>
-      </p:sp>
-      <p:sp>
-        <p:nvSpPr>
-          <p:cNvPr id="57" name="Text Placeholder 56">
-            <a:extLst>
-              <a:ext uri="{FF2B5EF4-FFF2-40B4-BE49-F238E27FC236}">
-                <a16:creationId xmlns:a16="http://schemas.microsoft.com/office/drawing/2014/main" id="{84A7E98E-D781-441A-BA74-EF1BED01B588}"/>
-              </a:ext>
-            </a:extLst>
-          </p:cNvPr>
-          <p:cNvSpPr>
-            <a:spLocks noGrp="1"/>
-          </p:cNvSpPr>
-          <p:nvPr>
-            <p:ph type="body" sz="quarter" idx="21"/>
-          </p:nvPr>
-        </p:nvSpPr>
-        <p:spPr>
-          <a:xfrm>
-            <a:off x="3228885" y="5371723"/>
-            <a:ext cx="1587499" cy="350292"/>
-          </a:xfrm>
-        </p:spPr>
-        <p:txBody>
-          <a:bodyPr rtlCol="0"/>
-          <a:lstStyle/>
-          <a:p>
-            <a:pPr rtl="0"/>
-            <a:r>
-              <a:rPr lang="en-GB"/>
-              <a:t>Title</a:t>
-            </a:r>
-          </a:p>
-        </p:txBody>
-      </p:sp>
-      <p:sp>
-        <p:nvSpPr>
-          <p:cNvPr id="58" name="Text Placeholder 57">
-            <a:extLst>
-              <a:ext uri="{FF2B5EF4-FFF2-40B4-BE49-F238E27FC236}">
-                <a16:creationId xmlns:a16="http://schemas.microsoft.com/office/drawing/2014/main" id="{51E437D6-831B-4C6D-8A0F-B4D300E2C6B8}"/>
-              </a:ext>
-            </a:extLst>
-          </p:cNvPr>
-          <p:cNvSpPr>
-            <a:spLocks noGrp="1"/>
-          </p:cNvSpPr>
-          <p:nvPr>
-            <p:ph type="body" sz="quarter" idx="22"/>
-          </p:nvPr>
-        </p:nvSpPr>
-        <p:spPr>
-          <a:xfrm>
-            <a:off x="5302249" y="5094555"/>
-            <a:ext cx="1587499" cy="350292"/>
-          </a:xfrm>
-        </p:spPr>
-        <p:txBody>
-          <a:bodyPr rtlCol="0"/>
-          <a:lstStyle/>
-          <a:p>
-            <a:pPr rtl="0"/>
-            <a:r>
-              <a:rPr lang="en-GB"/>
-              <a:t>Name</a:t>
-            </a:r>
-          </a:p>
-        </p:txBody>
-      </p:sp>
-      <p:sp>
-        <p:nvSpPr>
-          <p:cNvPr id="59" name="Text Placeholder 58">
-            <a:extLst>
-              <a:ext uri="{FF2B5EF4-FFF2-40B4-BE49-F238E27FC236}">
-                <a16:creationId xmlns:a16="http://schemas.microsoft.com/office/drawing/2014/main" id="{04476A89-3D0A-4A48-96B0-5C6961284982}"/>
-              </a:ext>
-            </a:extLst>
-          </p:cNvPr>
-          <p:cNvSpPr>
-            <a:spLocks noGrp="1"/>
-          </p:cNvSpPr>
-          <p:nvPr>
-            <p:ph type="body" sz="quarter" idx="23"/>
-          </p:nvPr>
-        </p:nvSpPr>
-        <p:spPr>
-          <a:xfrm>
-            <a:off x="5302249" y="5371723"/>
-            <a:ext cx="1587499" cy="350292"/>
-          </a:xfrm>
-        </p:spPr>
-        <p:txBody>
-          <a:bodyPr rtlCol="0"/>
-          <a:lstStyle/>
-          <a:p>
-            <a:pPr rtl="0"/>
-            <a:r>
-              <a:rPr lang="en-GB"/>
-              <a:t>Title</a:t>
-            </a:r>
-          </a:p>
-        </p:txBody>
-      </p:sp>
-      <p:sp>
-        <p:nvSpPr>
-          <p:cNvPr id="60" name="Text Placeholder 59">
-            <a:extLst>
-              <a:ext uri="{FF2B5EF4-FFF2-40B4-BE49-F238E27FC236}">
-                <a16:creationId xmlns:a16="http://schemas.microsoft.com/office/drawing/2014/main" id="{19060954-5CBF-46C3-AF76-911B1F83EA76}"/>
-              </a:ext>
-            </a:extLst>
-          </p:cNvPr>
-          <p:cNvSpPr>
-            <a:spLocks noGrp="1"/>
-          </p:cNvSpPr>
-          <p:nvPr>
-            <p:ph type="body" sz="quarter" idx="24"/>
-          </p:nvPr>
-        </p:nvSpPr>
-        <p:spPr>
-          <a:xfrm>
-            <a:off x="7364765" y="5094555"/>
-            <a:ext cx="1587499" cy="350292"/>
-          </a:xfrm>
-        </p:spPr>
-        <p:txBody>
-          <a:bodyPr rtlCol="0"/>
-          <a:lstStyle/>
-          <a:p>
-            <a:pPr rtl="0"/>
-            <a:r>
-              <a:rPr lang="en-GB"/>
-              <a:t>Name</a:t>
-            </a:r>
-          </a:p>
-        </p:txBody>
-      </p:sp>
-      <p:sp>
-        <p:nvSpPr>
-          <p:cNvPr id="61" name="Text Placeholder 60">
-            <a:extLst>
-              <a:ext uri="{FF2B5EF4-FFF2-40B4-BE49-F238E27FC236}">
-                <a16:creationId xmlns:a16="http://schemas.microsoft.com/office/drawing/2014/main" id="{9B1C6412-A141-40D2-9A6B-C1069B0F6B8F}"/>
-              </a:ext>
-            </a:extLst>
-          </p:cNvPr>
-          <p:cNvSpPr>
-            <a:spLocks noGrp="1"/>
-          </p:cNvSpPr>
-          <p:nvPr>
-            <p:ph type="body" sz="quarter" idx="25"/>
-          </p:nvPr>
-        </p:nvSpPr>
-        <p:spPr>
-          <a:xfrm>
-            <a:off x="7364765" y="5371723"/>
-            <a:ext cx="1587499" cy="350292"/>
-          </a:xfrm>
-        </p:spPr>
-        <p:txBody>
-          <a:bodyPr rtlCol="0"/>
-          <a:lstStyle/>
-          <a:p>
-            <a:pPr rtl="0"/>
-            <a:r>
-              <a:rPr lang="en-GB"/>
-              <a:t>Title</a:t>
-            </a:r>
-          </a:p>
-        </p:txBody>
-      </p:sp>
-      <p:sp>
-        <p:nvSpPr>
-          <p:cNvPr id="62" name="Text Placeholder 61">
-            <a:extLst>
-              <a:ext uri="{FF2B5EF4-FFF2-40B4-BE49-F238E27FC236}">
-                <a16:creationId xmlns:a16="http://schemas.microsoft.com/office/drawing/2014/main" id="{28873B3C-0DB0-4560-9D3C-9D1DD271841E}"/>
-              </a:ext>
-            </a:extLst>
-          </p:cNvPr>
-          <p:cNvSpPr>
-            <a:spLocks noGrp="1"/>
-          </p:cNvSpPr>
-          <p:nvPr>
-            <p:ph type="body" sz="quarter" idx="26"/>
-          </p:nvPr>
-        </p:nvSpPr>
-        <p:spPr>
-          <a:xfrm>
-            <a:off x="9437688" y="5094555"/>
-            <a:ext cx="1587499" cy="350292"/>
-          </a:xfrm>
-        </p:spPr>
-        <p:txBody>
-          <a:bodyPr rtlCol="0"/>
-          <a:lstStyle/>
-          <a:p>
-            <a:pPr rtl="0"/>
-            <a:r>
-              <a:rPr lang="en-GB"/>
-              <a:t>Name</a:t>
-            </a:r>
-          </a:p>
-        </p:txBody>
-      </p:sp>
-      <p:sp>
-        <p:nvSpPr>
-          <p:cNvPr id="63" name="Text Placeholder 62">
-            <a:extLst>
-              <a:ext uri="{FF2B5EF4-FFF2-40B4-BE49-F238E27FC236}">
-                <a16:creationId xmlns:a16="http://schemas.microsoft.com/office/drawing/2014/main" id="{5689D895-3876-4B11-907D-B46AA9520108}"/>
-              </a:ext>
-            </a:extLst>
-          </p:cNvPr>
-          <p:cNvSpPr>
-            <a:spLocks noGrp="1"/>
-          </p:cNvSpPr>
-          <p:nvPr>
-            <p:ph type="body" sz="quarter" idx="27"/>
-          </p:nvPr>
-        </p:nvSpPr>
-        <p:spPr>
-          <a:xfrm>
-            <a:off x="9437688" y="5371723"/>
-            <a:ext cx="1587499" cy="350292"/>
-          </a:xfrm>
-        </p:spPr>
-        <p:txBody>
-          <a:bodyPr rtlCol="0"/>
-          <a:lstStyle/>
-          <a:p>
-            <a:pPr rtl="0"/>
-            <a:r>
-              <a:rPr lang="en-GB"/>
-              <a:t>Title</a:t>
-            </a:r>
-          </a:p>
-        </p:txBody>
-      </p:sp>
-      <p:sp>
-        <p:nvSpPr>
-          <p:cNvPr id="13" name="Date Placeholder 47">
-            <a:extLst>
-              <a:ext uri="{FF2B5EF4-FFF2-40B4-BE49-F238E27FC236}">
-                <a16:creationId xmlns:a16="http://schemas.microsoft.com/office/drawing/2014/main" id="{289FFCBD-061F-4FE8-BB82-AB1733C9225C}"/>
-              </a:ext>
-            </a:extLst>
-          </p:cNvPr>
-          <p:cNvSpPr>
-            <a:spLocks noGrp="1"/>
-          </p:cNvSpPr>
-          <p:nvPr>
-            <p:ph type="dt" sz="half" idx="10"/>
-          </p:nvPr>
-        </p:nvSpPr>
-        <p:spPr>
-          <a:xfrm>
-            <a:off x="450000" y="6357168"/>
-            <a:ext cx="1760150" cy="461665"/>
-          </a:xfrm>
-        </p:spPr>
-        <p:txBody>
-          <a:bodyPr rtlCol="0"/>
-          <a:lstStyle/>
-          <a:p>
-            <a:pPr rtl="0"/>
-            <a:r>
-              <a:rPr lang="en-GB"/>
-              <a:t>20XX</a:t>
-            </a:r>
-          </a:p>
-        </p:txBody>
-      </p:sp>
-      <p:sp>
-        <p:nvSpPr>
-          <p:cNvPr id="49" name="Footer Placeholder 48">
-            <a:extLst>
-              <a:ext uri="{FF2B5EF4-FFF2-40B4-BE49-F238E27FC236}">
-                <a16:creationId xmlns:a16="http://schemas.microsoft.com/office/drawing/2014/main" id="{BC6711E1-B796-4D1D-BAC8-770C06C53DB6}"/>
-              </a:ext>
-            </a:extLst>
-          </p:cNvPr>
-          <p:cNvSpPr>
-            <a:spLocks noGrp="1"/>
-          </p:cNvSpPr>
-          <p:nvPr>
-            <p:ph type="ftr" sz="quarter" idx="11"/>
-          </p:nvPr>
-        </p:nvSpPr>
-        <p:spPr>
-          <a:xfrm>
-            <a:off x="2754312" y="6357600"/>
-            <a:ext cx="6683376" cy="460800"/>
-          </a:xfrm>
-        </p:spPr>
-        <p:txBody>
-          <a:bodyPr rtlCol="0"/>
-          <a:lstStyle/>
-          <a:p>
-            <a:pPr rtl="0"/>
-            <a:r>
-              <a:rPr lang="en-GB"/>
-              <a:t>Sample Footer Text</a:t>
-            </a:r>
-          </a:p>
-        </p:txBody>
-      </p:sp>
-      <p:sp>
-        <p:nvSpPr>
-          <p:cNvPr id="50" name="Slide Number Placeholder 49">
-            <a:extLst>
-              <a:ext uri="{FF2B5EF4-FFF2-40B4-BE49-F238E27FC236}">
-                <a16:creationId xmlns:a16="http://schemas.microsoft.com/office/drawing/2014/main" id="{584E00CC-0BE9-4582-B15B-D2F934C326AE}"/>
-              </a:ext>
-            </a:extLst>
-          </p:cNvPr>
-          <p:cNvSpPr>
-            <a:spLocks noGrp="1"/>
-          </p:cNvSpPr>
-          <p:nvPr>
-            <p:ph type="sldNum" sz="quarter" idx="12"/>
-          </p:nvPr>
-        </p:nvSpPr>
-        <p:spPr>
-          <a:xfrm>
-            <a:off x="9982800" y="6357600"/>
-            <a:ext cx="1760150" cy="460800"/>
-          </a:xfrm>
-        </p:spPr>
-        <p:txBody>
-          <a:bodyPr rtlCol="0"/>
-          <a:lstStyle/>
-          <a:p>
-            <a:pPr rtl="0"/>
-            <a:fld id="{D39607A7-8386-47DB-8578-DDEDD194E5D4}" type="slidenum">
-              <a:rPr lang="en-GB" smtClean="0"/>
-              <a:pPr/>
-              <a:t>8</a:t>
-            </a:fld>
-            <a:endParaRPr lang="en-GB"/>
-          </a:p>
-        </p:txBody>
-      </p:sp>
-    </p:spTree>
-    <p:extLst>
-      <p:ext uri="{BB962C8B-B14F-4D97-AF65-F5344CB8AC3E}">
-        <p14:creationId xmlns:p14="http://schemas.microsoft.com/office/powerpoint/2010/main" val="134718700"/>
-      </p:ext>
-    </p:extLst>
-  </p:cSld>
-  <p:clrMapOvr>
-    <a:masterClrMapping/>
-  </p:clrMapOvr>
-</p:sld>
-</file>
-
-<file path=ppt/slides/slide9.xml><?xml version="1.0" encoding="utf-8"?>
-<p:sld xmlns:a="http://schemas.openxmlformats.org/drawingml/2006/main" xmlns:r="http://schemas.openxmlformats.org/officeDocument/2006/relationships" xmlns:p="http://schemas.openxmlformats.org/presentationml/2006/main">
-  <p:cSld>
-    <p:spTree>
-      <p:nvGrpSpPr>
-        <p:cNvPr id="1" name=""/>
-        <p:cNvGrpSpPr/>
-        <p:nvPr/>
-      </p:nvGrpSpPr>
-      <p:grpSpPr>
-        <a:xfrm>
-          <a:off x="0" y="0"/>
-          <a:ext cx="0" cy="0"/>
-          <a:chOff x="0" y="0"/>
-          <a:chExt cx="0" cy="0"/>
-        </a:xfrm>
-      </p:grpSpPr>
-      <p:sp>
-        <p:nvSpPr>
-          <p:cNvPr id="2" name="Title 1">
-            <a:extLst>
-              <a:ext uri="{FF2B5EF4-FFF2-40B4-BE49-F238E27FC236}">
-                <a16:creationId xmlns:a16="http://schemas.microsoft.com/office/drawing/2014/main" id="{0D4E6E68-D059-4E48-A1A5-6D9FF5737F2F}"/>
-              </a:ext>
-            </a:extLst>
-          </p:cNvPr>
-          <p:cNvSpPr>
-            <a:spLocks noGrp="1"/>
-          </p:cNvSpPr>
-          <p:nvPr>
-            <p:ph type="title"/>
-          </p:nvPr>
-        </p:nvSpPr>
-        <p:spPr>
-          <a:xfrm>
-            <a:off x="989400" y="395289"/>
-            <a:ext cx="10213200" cy="1112836"/>
-          </a:xfrm>
-        </p:spPr>
-        <p:txBody>
-          <a:bodyPr rtlCol="0"/>
-          <a:lstStyle/>
-          <a:p>
-            <a:pPr rtl="0"/>
-            <a:r>
-              <a:rPr lang="en-GB" dirty="0"/>
-              <a:t>Timeline</a:t>
-            </a:r>
-          </a:p>
-        </p:txBody>
-      </p:sp>
-      <p:graphicFrame>
-        <p:nvGraphicFramePr>
-          <p:cNvPr id="4" name="Content Placeholder 4" descr="Timeline graphic with five boxes. The boxes are labelled 1 though five going left to right. ">
-            <a:extLst>
-              <a:ext uri="{FF2B5EF4-FFF2-40B4-BE49-F238E27FC236}">
-                <a16:creationId xmlns:a16="http://schemas.microsoft.com/office/drawing/2014/main" id="{4DE76F03-02C2-4450-8BCD-B9723A85980A}"/>
-              </a:ext>
-            </a:extLst>
-          </p:cNvPr>
-          <p:cNvGraphicFramePr>
-            <a:graphicFrameLocks noGrp="1"/>
-          </p:cNvGraphicFramePr>
-          <p:nvPr>
-            <p:ph idx="1"/>
-            <p:extLst>
-              <p:ext uri="{D42A27DB-BD31-4B8C-83A1-F6EECF244321}">
-                <p14:modId xmlns:p14="http://schemas.microsoft.com/office/powerpoint/2010/main" val="2218901848"/>
-              </p:ext>
-            </p:extLst>
-          </p:nvPr>
-        </p:nvGraphicFramePr>
-        <p:xfrm>
-          <a:off x="838200" y="1839913"/>
-          <a:ext cx="10515600" cy="4154487"/>
-        </p:xfrm>
-        <a:graphic>
-          <a:graphicData uri="http://schemas.openxmlformats.org/drawingml/2006/diagram">
-            <dgm:relIds xmlns:dgm="http://schemas.openxmlformats.org/drawingml/2006/diagram" xmlns:r="http://schemas.openxmlformats.org/officeDocument/2006/relationships" r:dm="rId3" r:lo="rId4" r:qs="rId5" r:cs="rId6"/>
-          </a:graphicData>
-        </a:graphic>
-      </p:graphicFrame>
-      <p:sp>
-        <p:nvSpPr>
-          <p:cNvPr id="5" name="Date Placeholder 4">
-            <a:extLst>
-              <a:ext uri="{FF2B5EF4-FFF2-40B4-BE49-F238E27FC236}">
-                <a16:creationId xmlns:a16="http://schemas.microsoft.com/office/drawing/2014/main" id="{33579941-CC56-4700-B032-DD38318272E4}"/>
-              </a:ext>
-            </a:extLst>
-          </p:cNvPr>
-          <p:cNvSpPr>
-            <a:spLocks noGrp="1"/>
-          </p:cNvSpPr>
-          <p:nvPr>
-            <p:ph type="dt" sz="half" idx="10"/>
-          </p:nvPr>
-        </p:nvSpPr>
-        <p:spPr>
-          <a:xfrm>
-            <a:off x="450000" y="6357168"/>
-            <a:ext cx="1760150" cy="461665"/>
-          </a:xfrm>
-        </p:spPr>
-        <p:txBody>
-          <a:bodyPr rtlCol="0"/>
-          <a:lstStyle/>
-          <a:p>
-            <a:pPr rtl="0"/>
-            <a:r>
-              <a:rPr lang="en-GB" dirty="0"/>
-              <a:t>20XX</a:t>
-            </a:r>
-          </a:p>
-        </p:txBody>
-      </p:sp>
-      <p:sp>
-        <p:nvSpPr>
-          <p:cNvPr id="6" name="Footer Placeholder 5">
-            <a:extLst>
-              <a:ext uri="{FF2B5EF4-FFF2-40B4-BE49-F238E27FC236}">
-                <a16:creationId xmlns:a16="http://schemas.microsoft.com/office/drawing/2014/main" id="{5E388C9B-5E77-4A32-9230-CF42155BCB0B}"/>
-              </a:ext>
-            </a:extLst>
-          </p:cNvPr>
-          <p:cNvSpPr>
-            <a:spLocks noGrp="1"/>
-          </p:cNvSpPr>
-          <p:nvPr>
-            <p:ph type="ftr" sz="quarter" idx="11"/>
-          </p:nvPr>
-        </p:nvSpPr>
-        <p:spPr>
-          <a:xfrm>
-            <a:off x="2754312" y="6357600"/>
-            <a:ext cx="6683376" cy="460800"/>
-          </a:xfrm>
-        </p:spPr>
-        <p:txBody>
-          <a:bodyPr rtlCol="0"/>
-          <a:lstStyle/>
-          <a:p>
-            <a:pPr rtl="0"/>
-            <a:r>
-              <a:rPr lang="en-GB" dirty="0"/>
-              <a:t>Sample Footer Text </a:t>
-            </a:r>
-          </a:p>
-        </p:txBody>
-      </p:sp>
-      <p:sp>
-        <p:nvSpPr>
-          <p:cNvPr id="7" name="Slide Number Placeholder 6">
-            <a:extLst>
-              <a:ext uri="{FF2B5EF4-FFF2-40B4-BE49-F238E27FC236}">
-                <a16:creationId xmlns:a16="http://schemas.microsoft.com/office/drawing/2014/main" id="{2411E042-EBFC-45CD-939D-D5DD1426061C}"/>
-              </a:ext>
-            </a:extLst>
-          </p:cNvPr>
-          <p:cNvSpPr>
-            <a:spLocks noGrp="1"/>
-          </p:cNvSpPr>
-          <p:nvPr>
-            <p:ph type="sldNum" sz="quarter" idx="12"/>
-          </p:nvPr>
-        </p:nvSpPr>
-        <p:spPr>
-          <a:xfrm>
-            <a:off x="9982800" y="6357600"/>
-            <a:ext cx="1760150" cy="460800"/>
-          </a:xfrm>
-        </p:spPr>
-        <p:txBody>
-          <a:bodyPr rtlCol="0"/>
-          <a:lstStyle/>
-          <a:p>
-            <a:pPr rtl="0"/>
-            <a:fld id="{FF2BD96E-3838-45D2-9031-D3AF67C920A5}" type="slidenum">
-              <a:rPr lang="en-GB" smtClean="0"/>
-              <a:pPr/>
-              <a:t>9</a:t>
-            </a:fld>
-            <a:endParaRPr lang="en-GB" dirty="0"/>
-          </a:p>
-        </p:txBody>
-      </p:sp>
-    </p:spTree>
-    <p:extLst>
-      <p:ext uri="{BB962C8B-B14F-4D97-AF65-F5344CB8AC3E}">
-        <p14:creationId xmlns:p14="http://schemas.microsoft.com/office/powerpoint/2010/main" val="804806354"/>
       </p:ext>
     </p:extLst>
   </p:cSld>

</xml_diff>